<commit_message>
Formatted exact and added TODO to powerpoiint
</commit_message>
<xml_diff>
--- a/presentations/TeamNAMETSP.pptx
+++ b/presentations/TeamNAMETSP.pptx
@@ -5,25 +5,26 @@
     <p:sldMasterId id="2147483666" r:id="rId4"/>
   </p:sldMasterIdLst>
   <p:notesMasterIdLst>
-    <p:notesMasterId r:id="rId18"/>
+    <p:notesMasterId r:id="rId19"/>
   </p:notesMasterIdLst>
   <p:handoutMasterIdLst>
-    <p:handoutMasterId r:id="rId19"/>
+    <p:handoutMasterId r:id="rId20"/>
   </p:handoutMasterIdLst>
   <p:sldIdLst>
     <p:sldId id="314" r:id="rId5"/>
-    <p:sldId id="315" r:id="rId6"/>
-    <p:sldId id="316" r:id="rId7"/>
-    <p:sldId id="317" r:id="rId8"/>
-    <p:sldId id="318" r:id="rId9"/>
-    <p:sldId id="319" r:id="rId10"/>
-    <p:sldId id="320" r:id="rId11"/>
-    <p:sldId id="321" r:id="rId12"/>
-    <p:sldId id="322" r:id="rId13"/>
-    <p:sldId id="323" r:id="rId14"/>
-    <p:sldId id="324" r:id="rId15"/>
-    <p:sldId id="325" r:id="rId16"/>
-    <p:sldId id="309" r:id="rId17"/>
+    <p:sldId id="326" r:id="rId6"/>
+    <p:sldId id="315" r:id="rId7"/>
+    <p:sldId id="316" r:id="rId8"/>
+    <p:sldId id="317" r:id="rId9"/>
+    <p:sldId id="318" r:id="rId10"/>
+    <p:sldId id="319" r:id="rId11"/>
+    <p:sldId id="320" r:id="rId12"/>
+    <p:sldId id="321" r:id="rId13"/>
+    <p:sldId id="322" r:id="rId14"/>
+    <p:sldId id="323" r:id="rId15"/>
+    <p:sldId id="324" r:id="rId16"/>
+    <p:sldId id="325" r:id="rId17"/>
+    <p:sldId id="309" r:id="rId18"/>
   </p:sldIdLst>
   <p:sldSz cx="12192000" cy="6858000"/>
   <p:notesSz cx="6858000" cy="9144000"/>
@@ -843,7 +844,7 @@
           <a:p>
             <a:fld id="{D4B9A9E5-4F7F-4A7D-9DE1-899232329269}" type="slidenum">
               <a:rPr lang="en-US" smtClean="0"/>
-              <a:t>10</a:t>
+              <a:t>11</a:t>
             </a:fld>
             <a:endParaRPr lang="en-US" dirty="0"/>
           </a:p>
@@ -927,7 +928,7 @@
           <a:p>
             <a:fld id="{D4B9A9E5-4F7F-4A7D-9DE1-899232329269}" type="slidenum">
               <a:rPr lang="en-US" smtClean="0"/>
-              <a:t>11</a:t>
+              <a:t>12</a:t>
             </a:fld>
             <a:endParaRPr lang="en-US" dirty="0"/>
           </a:p>
@@ -1011,7 +1012,7 @@
           <a:p>
             <a:fld id="{D4B9A9E5-4F7F-4A7D-9DE1-899232329269}" type="slidenum">
               <a:rPr lang="en-US" smtClean="0"/>
-              <a:t>12</a:t>
+              <a:t>13</a:t>
             </a:fld>
             <a:endParaRPr lang="en-US" dirty="0"/>
           </a:p>
@@ -1095,7 +1096,7 @@
           <a:p>
             <a:fld id="{D4B9A9E5-4F7F-4A7D-9DE1-899232329269}" type="slidenum">
               <a:rPr lang="en-US" smtClean="0"/>
-              <a:t>13</a:t>
+              <a:t>14</a:t>
             </a:fld>
             <a:endParaRPr lang="en-US" dirty="0"/>
           </a:p>
@@ -1179,7 +1180,7 @@
           <a:p>
             <a:fld id="{D4B9A9E5-4F7F-4A7D-9DE1-899232329269}" type="slidenum">
               <a:rPr lang="en-US" smtClean="0"/>
-              <a:t>2</a:t>
+              <a:t>3</a:t>
             </a:fld>
             <a:endParaRPr lang="en-US" dirty="0"/>
           </a:p>
@@ -1263,7 +1264,7 @@
           <a:p>
             <a:fld id="{D4B9A9E5-4F7F-4A7D-9DE1-899232329269}" type="slidenum">
               <a:rPr lang="en-US" smtClean="0"/>
-              <a:t>3</a:t>
+              <a:t>4</a:t>
             </a:fld>
             <a:endParaRPr lang="en-US" dirty="0"/>
           </a:p>
@@ -1347,7 +1348,7 @@
           <a:p>
             <a:fld id="{D4B9A9E5-4F7F-4A7D-9DE1-899232329269}" type="slidenum">
               <a:rPr lang="en-US" smtClean="0"/>
-              <a:t>4</a:t>
+              <a:t>5</a:t>
             </a:fld>
             <a:endParaRPr lang="en-US" dirty="0"/>
           </a:p>
@@ -1431,7 +1432,7 @@
           <a:p>
             <a:fld id="{D4B9A9E5-4F7F-4A7D-9DE1-899232329269}" type="slidenum">
               <a:rPr lang="en-US" smtClean="0"/>
-              <a:t>5</a:t>
+              <a:t>6</a:t>
             </a:fld>
             <a:endParaRPr lang="en-US" dirty="0"/>
           </a:p>
@@ -1515,7 +1516,7 @@
           <a:p>
             <a:fld id="{D4B9A9E5-4F7F-4A7D-9DE1-899232329269}" type="slidenum">
               <a:rPr lang="en-US" smtClean="0"/>
-              <a:t>6</a:t>
+              <a:t>7</a:t>
             </a:fld>
             <a:endParaRPr lang="en-US" dirty="0"/>
           </a:p>
@@ -1599,7 +1600,7 @@
           <a:p>
             <a:fld id="{D4B9A9E5-4F7F-4A7D-9DE1-899232329269}" type="slidenum">
               <a:rPr lang="en-US" smtClean="0"/>
-              <a:t>7</a:t>
+              <a:t>8</a:t>
             </a:fld>
             <a:endParaRPr lang="en-US" dirty="0"/>
           </a:p>
@@ -1683,7 +1684,7 @@
           <a:p>
             <a:fld id="{D4B9A9E5-4F7F-4A7D-9DE1-899232329269}" type="slidenum">
               <a:rPr lang="en-US" smtClean="0"/>
-              <a:t>8</a:t>
+              <a:t>9</a:t>
             </a:fld>
             <a:endParaRPr lang="en-US" dirty="0"/>
           </a:p>
@@ -1767,7 +1768,7 @@
           <a:p>
             <a:fld id="{D4B9A9E5-4F7F-4A7D-9DE1-899232329269}" type="slidenum">
               <a:rPr lang="en-US" smtClean="0"/>
-              <a:t>9</a:t>
+              <a:t>10</a:t>
             </a:fld>
             <a:endParaRPr lang="en-US" dirty="0"/>
           </a:p>
@@ -6690,6 +6691,189 @@
 </file>
 
 <file path=ppt/slides/slide10.xml><?xml version="1.0" encoding="utf-8"?>
+<p:sld xmlns:a="http://schemas.openxmlformats.org/drawingml/2006/main" xmlns:r="http://schemas.openxmlformats.org/officeDocument/2006/relationships" xmlns:p="http://schemas.openxmlformats.org/presentationml/2006/main">
+  <p:cSld>
+    <p:spTree>
+      <p:nvGrpSpPr>
+        <p:cNvPr id="1" name=""/>
+        <p:cNvGrpSpPr/>
+        <p:nvPr/>
+      </p:nvGrpSpPr>
+      <p:grpSpPr>
+        <a:xfrm>
+          <a:off x="0" y="0"/>
+          <a:ext cx="0" cy="0"/>
+          <a:chOff x="0" y="0"/>
+          <a:chExt cx="0" cy="0"/>
+        </a:xfrm>
+      </p:grpSpPr>
+      <p:sp>
+        <p:nvSpPr>
+          <p:cNvPr id="2" name="Title 1">
+            <a:extLst>
+              <a:ext uri="{FF2B5EF4-FFF2-40B4-BE49-F238E27FC236}">
+                <a16:creationId xmlns:a16="http://schemas.microsoft.com/office/drawing/2014/main" id="{56FEAA13-E02F-EB47-E510-E3F48A95F847}"/>
+              </a:ext>
+            </a:extLst>
+          </p:cNvPr>
+          <p:cNvSpPr>
+            <a:spLocks noGrp="1"/>
+          </p:cNvSpPr>
+          <p:nvPr>
+            <p:ph type="title"/>
+          </p:nvPr>
+        </p:nvSpPr>
+        <p:spPr>
+          <a:xfrm>
+            <a:off x="916385" y="446313"/>
+            <a:ext cx="5179615" cy="1448747"/>
+          </a:xfrm>
+        </p:spPr>
+        <p:txBody>
+          <a:bodyPr/>
+          <a:lstStyle/>
+          <a:p>
+            <a:r>
+              <a:rPr lang="en-US" dirty="0"/>
+              <a:t>Growth strategy</a:t>
+            </a:r>
+          </a:p>
+        </p:txBody>
+      </p:sp>
+      <p:sp>
+        <p:nvSpPr>
+          <p:cNvPr id="3" name="Content Placeholder 2">
+            <a:extLst>
+              <a:ext uri="{FF2B5EF4-FFF2-40B4-BE49-F238E27FC236}">
+                <a16:creationId xmlns:a16="http://schemas.microsoft.com/office/drawing/2014/main" id="{05E26637-007F-EC9E-F644-AAFBA0900F3C}"/>
+              </a:ext>
+            </a:extLst>
+          </p:cNvPr>
+          <p:cNvSpPr>
+            <a:spLocks noGrp="1"/>
+          </p:cNvSpPr>
+          <p:nvPr>
+            <p:ph sz="quarter" idx="10"/>
+          </p:nvPr>
+        </p:nvSpPr>
+        <p:spPr>
+          <a:xfrm>
+            <a:off x="914399" y="2022250"/>
+            <a:ext cx="5181600" cy="3747180"/>
+          </a:xfrm>
+        </p:spPr>
+        <p:txBody>
+          <a:bodyPr/>
+          <a:lstStyle/>
+          <a:p>
+            <a:r>
+              <a:rPr lang="en-US" b="1" dirty="0"/>
+              <a:t>Feb 20XX: </a:t>
+            </a:r>
+            <a:r>
+              <a:rPr lang="en-US" dirty="0"/>
+              <a:t>roll out product to high profile or top-level participants to help establish the product</a:t>
+            </a:r>
+          </a:p>
+          <a:p>
+            <a:r>
+              <a:rPr lang="en-US" b="1" dirty="0"/>
+              <a:t>May 20XX: </a:t>
+            </a:r>
+            <a:r>
+              <a:rPr lang="en-US" dirty="0"/>
+              <a:t>release the product to the public and monitor press release and social media accounts</a:t>
+            </a:r>
+          </a:p>
+          <a:p>
+            <a:r>
+              <a:rPr lang="en-US" b="1" dirty="0"/>
+              <a:t>Oct 20XX: </a:t>
+            </a:r>
+            <a:r>
+              <a:rPr lang="en-US" dirty="0"/>
+              <a:t>gather feedback and adjust product design as necessary</a:t>
+            </a:r>
+          </a:p>
+        </p:txBody>
+      </p:sp>
+      <p:sp>
+        <p:nvSpPr>
+          <p:cNvPr id="5" name="Slide Number Placeholder 4">
+            <a:extLst>
+              <a:ext uri="{FF2B5EF4-FFF2-40B4-BE49-F238E27FC236}">
+                <a16:creationId xmlns:a16="http://schemas.microsoft.com/office/drawing/2014/main" id="{1DDD930B-FB1B-543D-6828-8C31F30BBD28}"/>
+              </a:ext>
+            </a:extLst>
+          </p:cNvPr>
+          <p:cNvSpPr>
+            <a:spLocks noGrp="1"/>
+          </p:cNvSpPr>
+          <p:nvPr>
+            <p:ph type="sldNum" sz="quarter" idx="4"/>
+          </p:nvPr>
+        </p:nvSpPr>
+        <p:spPr>
+          <a:xfrm>
+            <a:off x="914400" y="6246254"/>
+            <a:ext cx="631065" cy="296214"/>
+          </a:xfrm>
+        </p:spPr>
+        <p:txBody>
+          <a:bodyPr/>
+          <a:lstStyle/>
+          <a:p>
+            <a:fld id="{B5CEABB6-07DC-46E8-9B57-56EC44A396E5}" type="slidenum">
+              <a:rPr lang="en-US" smtClean="0"/>
+              <a:pPr/>
+              <a:t>10</a:t>
+            </a:fld>
+            <a:endParaRPr lang="en-US" dirty="0"/>
+          </a:p>
+        </p:txBody>
+      </p:sp>
+      <p:pic>
+        <p:nvPicPr>
+          <p:cNvPr id="18" name="Picture Placeholder 17" descr="Two people looking at their phones">
+            <a:extLst>
+              <a:ext uri="{FF2B5EF4-FFF2-40B4-BE49-F238E27FC236}">
+                <a16:creationId xmlns:a16="http://schemas.microsoft.com/office/drawing/2014/main" id="{1609D79A-E8EF-302E-E8CA-07C644CE0E0F}"/>
+              </a:ext>
+            </a:extLst>
+          </p:cNvPr>
+          <p:cNvPicPr>
+            <a:picLocks noGrp="1" noChangeAspect="1"/>
+          </p:cNvPicPr>
+          <p:nvPr>
+            <p:ph type="pic" sz="quarter" idx="11"/>
+          </p:nvPr>
+        </p:nvPicPr>
+        <p:blipFill>
+          <a:blip r:embed="rId3"/>
+          <a:srcRect l="81" r="81"/>
+          <a:stretch/>
+        </p:blipFill>
+        <p:spPr>
+          <a:xfrm>
+            <a:off x="6076950" y="0"/>
+            <a:ext cx="6115050" cy="6868886"/>
+          </a:xfrm>
+        </p:spPr>
+      </p:pic>
+    </p:spTree>
+    <p:extLst>
+      <p:ext uri="{BB962C8B-B14F-4D97-AF65-F5344CB8AC3E}">
+        <p14:creationId xmlns:p14="http://schemas.microsoft.com/office/powerpoint/2010/main" val="1517447069"/>
+      </p:ext>
+    </p:extLst>
+  </p:cSld>
+  <p:clrMapOvr>
+    <a:masterClrMapping/>
+  </p:clrMapOvr>
+</p:sld>
+</file>
+
+<file path=ppt/slides/slide11.xml><?xml version="1.0" encoding="utf-8"?>
 <p:sld xmlns:a="http://schemas.openxmlformats.org/drawingml/2006/main" xmlns:r="http://schemas.openxmlformats.org/officeDocument/2006/relationships" xmlns:p="http://schemas.openxmlformats.org/presentationml/2006/main">
   <p:cSld>
     <p:spTree>
@@ -7602,7 +7786,7 @@
             <a:fld id="{B5CEABB6-07DC-46E8-9B57-56EC44A396E5}" type="slidenum">
               <a:rPr lang="en-US" smtClean="0"/>
               <a:pPr/>
-              <a:t>10</a:t>
+              <a:t>11</a:t>
             </a:fld>
             <a:endParaRPr lang="en-US" dirty="0"/>
           </a:p>
@@ -7621,7 +7805,7 @@
 </p:sld>
 </file>
 
-<file path=ppt/slides/slide11.xml><?xml version="1.0" encoding="utf-8"?>
+<file path=ppt/slides/slide12.xml><?xml version="1.0" encoding="utf-8"?>
 <p:sld xmlns:a="http://schemas.openxmlformats.org/drawingml/2006/main" xmlns:r="http://schemas.openxmlformats.org/officeDocument/2006/relationships" xmlns:p="http://schemas.openxmlformats.org/presentationml/2006/main">
   <p:cSld>
     <p:spTree>
@@ -7811,7 +7995,7 @@
             <a:fld id="{B5CEABB6-07DC-46E8-9B57-56EC44A396E5}" type="slidenum">
               <a:rPr lang="en-US" smtClean="0"/>
               <a:pPr/>
-              <a:t>11</a:t>
+              <a:t>12</a:t>
             </a:fld>
             <a:endParaRPr lang="en-US" dirty="0"/>
           </a:p>
@@ -7830,7 +8014,7 @@
 </p:sld>
 </file>
 
-<file path=ppt/slides/slide12.xml><?xml version="1.0" encoding="utf-8"?>
+<file path=ppt/slides/slide13.xml><?xml version="1.0" encoding="utf-8"?>
 <p:sld xmlns:a="http://schemas.openxmlformats.org/drawingml/2006/main" xmlns:r="http://schemas.openxmlformats.org/officeDocument/2006/relationships" xmlns:p="http://schemas.openxmlformats.org/presentationml/2006/main">
   <p:cSld>
     <p:spTree>
@@ -8715,7 +8899,7 @@
             <a:fld id="{B5CEABB6-07DC-46E8-9B57-56EC44A396E5}" type="slidenum">
               <a:rPr lang="en-US" smtClean="0"/>
               <a:pPr/>
-              <a:t>12</a:t>
+              <a:t>13</a:t>
             </a:fld>
             <a:endParaRPr lang="en-US" dirty="0"/>
           </a:p>
@@ -8734,7 +8918,7 @@
 </p:sld>
 </file>
 
-<file path=ppt/slides/slide13.xml><?xml version="1.0" encoding="utf-8"?>
+<file path=ppt/slides/slide14.xml><?xml version="1.0" encoding="utf-8"?>
 <p:sld xmlns:a="http://schemas.openxmlformats.org/drawingml/2006/main" xmlns:r="http://schemas.openxmlformats.org/officeDocument/2006/relationships" xmlns:p="http://schemas.openxmlformats.org/presentationml/2006/main">
   <p:cSld>
     <p:bg>
@@ -8913,10 +9097,10 @@
       </p:grpSpPr>
       <p:sp>
         <p:nvSpPr>
-          <p:cNvPr id="3" name="Title 2">
+          <p:cNvPr id="2" name="Title 1">
             <a:extLst>
               <a:ext uri="{FF2B5EF4-FFF2-40B4-BE49-F238E27FC236}">
-                <a16:creationId xmlns:a16="http://schemas.microsoft.com/office/drawing/2014/main" id="{3474D05E-8A36-8D9F-519E-DB514A69D886}"/>
+                <a16:creationId xmlns:a16="http://schemas.microsoft.com/office/drawing/2014/main" id="{4F6B0423-4DFE-C5C0-A020-8A7CA5CDDE7D}"/>
               </a:ext>
             </a:extLst>
           </p:cNvPr>
@@ -8927,29 +9111,167 @@
             <p:ph type="title"/>
           </p:nvPr>
         </p:nvSpPr>
-        <p:spPr>
-          <a:xfrm>
-            <a:off x="914400" y="315533"/>
-            <a:ext cx="5181600" cy="2376868"/>
-          </a:xfrm>
-        </p:spPr>
+        <p:spPr/>
         <p:txBody>
           <a:bodyPr/>
           <a:lstStyle/>
           <a:p>
             <a:r>
-              <a:rPr lang="en-US"/>
-              <a:t>About us</a:t>
+              <a:rPr lang="en-US" dirty="0"/>
+              <a:t>TODO</a:t>
             </a:r>
           </a:p>
         </p:txBody>
       </p:sp>
-      <p:sp>
-        <p:nvSpPr>
-          <p:cNvPr id="4" name="Content Placeholder 3">
+      <mc:AlternateContent xmlns:mc="http://schemas.openxmlformats.org/markup-compatibility/2006">
+        <mc:Choice xmlns:a14="http://schemas.microsoft.com/office/drawing/2010/main" Requires="a14">
+          <p:sp>
+            <p:nvSpPr>
+              <p:cNvPr id="3" name="Content Placeholder 2">
+                <a:extLst>
+                  <a:ext uri="{FF2B5EF4-FFF2-40B4-BE49-F238E27FC236}">
+                    <a16:creationId xmlns:a16="http://schemas.microsoft.com/office/drawing/2014/main" id="{AA0D1C1B-E6FF-3AAE-027B-885F3E0D8395}"/>
+                  </a:ext>
+                </a:extLst>
+              </p:cNvPr>
+              <p:cNvSpPr>
+                <a:spLocks noGrp="1"/>
+              </p:cNvSpPr>
+              <p:nvPr>
+                <p:ph sz="quarter" idx="10"/>
+              </p:nvPr>
+            </p:nvSpPr>
+            <p:spPr>
+              <a:xfrm>
+                <a:off x="187725" y="1968587"/>
+                <a:ext cx="3995409" cy="4470625"/>
+              </a:xfrm>
+            </p:spPr>
+            <p:txBody>
+              <a:bodyPr>
+                <a:normAutofit/>
+              </a:bodyPr>
+              <a:lstStyle/>
+              <a:p>
+                <a:pPr marL="0" indent="0">
+                  <a:buNone/>
+                </a:pPr>
+                <a:r>
+                  <a:rPr lang="en-US" sz="1200" b="1" dirty="0"/>
+                  <a:t>Exact Part:</a:t>
+                </a:r>
+              </a:p>
+              <a:p>
+                <a:r>
+                  <a:rPr lang="en-US" sz="1200" dirty="0"/>
+                  <a:t>a description of the problem being solved. Show the difference between the decision and optimization version of the problem. An example of inputs and outputs is a good idea. (1.5 mins)</a:t>
+                </a:r>
+              </a:p>
+              <a:p>
+                <a:r>
+                  <a:rPr lang="en-US" sz="1200" dirty="0"/>
+                  <a:t>an explanation of the certifier process being polynomial. Including pseudo-code here is a good idea but make sure its clear that the </a:t>
+                </a:r>
+                <a:r>
+                  <a:rPr lang="en-US" sz="1200" i="1" dirty="0"/>
+                  <a:t>certificate</a:t>
+                </a:r>
+                <a:r>
+                  <a:rPr lang="en-US" sz="1200" dirty="0"/>
+                  <a:t> can be verified in polynomial time.</a:t>
+                </a:r>
+              </a:p>
+              <a:p>
+                <a:r>
+                  <a:rPr lang="en-US" sz="1200" dirty="0"/>
+                  <a:t>a reduction from a known/accepted NP-hard problem (with examples graphically shown). It must be clear that the reduction takes place in a polynomial number of steps with respect to the problem’s input size.</a:t>
+                </a:r>
+              </a:p>
+              <a:p>
+                <a:r>
+                  <a:rPr lang="en-US" sz="1200" dirty="0"/>
+                  <a:t>an analytical (big </a:t>
+                </a:r>
+                <a14:m>
+                  <m:oMath xmlns:m="http://schemas.openxmlformats.org/officeDocument/2006/math">
+                    <m:r>
+                      <a:rPr lang="en-US" sz="1200"/>
+                      <m:t>𝒪</m:t>
+                    </m:r>
+                  </m:oMath>
+                </a14:m>
+                <a:r>
+                  <a:rPr lang="en-US" sz="1200" dirty="0"/>
+                  <a:t>) runtime analysis of your coded solution and showcase the code that is the dominant term (the code that drives the highest order term).</a:t>
+                </a:r>
+              </a:p>
+              <a:p>
+                <a:r>
+                  <a:rPr lang="en-US" sz="1200" dirty="0"/>
+                  <a:t>a </a:t>
+                </a:r>
+                <a:r>
+                  <a:rPr lang="en-US" sz="1200" dirty="0" err="1"/>
+                  <a:t>wallclock</a:t>
+                </a:r>
+                <a:r>
+                  <a:rPr lang="en-US" sz="1200" dirty="0"/>
+                  <a:t> (empirical) runtime analysis of your code on your test cases. This analysis must show input size on the X axis and runtime on the Y axis</a:t>
+                </a:r>
+              </a:p>
+            </p:txBody>
+          </p:sp>
+        </mc:Choice>
+        <mc:Fallback>
+          <p:sp>
+            <p:nvSpPr>
+              <p:cNvPr id="3" name="Content Placeholder 2">
+                <a:extLst>
+                  <a:ext uri="{FF2B5EF4-FFF2-40B4-BE49-F238E27FC236}">
+                    <a16:creationId xmlns:a16="http://schemas.microsoft.com/office/drawing/2014/main" id="{AA0D1C1B-E6FF-3AAE-027B-885F3E0D8395}"/>
+                  </a:ext>
+                </a:extLst>
+              </p:cNvPr>
+              <p:cNvSpPr>
+                <a:spLocks noGrp="1" noRot="1" noChangeAspect="1" noMove="1" noResize="1" noEditPoints="1" noAdjustHandles="1" noChangeArrowheads="1" noChangeShapeType="1" noTextEdit="1"/>
+              </p:cNvSpPr>
+              <p:nvPr>
+                <p:ph sz="quarter" idx="10"/>
+              </p:nvPr>
+            </p:nvSpPr>
+            <p:spPr>
+              <a:xfrm>
+                <a:off x="187725" y="1968587"/>
+                <a:ext cx="3995409" cy="4470625"/>
+              </a:xfrm>
+              <a:blipFill>
+                <a:blip r:embed="rId2"/>
+                <a:stretch>
+                  <a:fillRect l="-153" t="-546" r="-458"/>
+                </a:stretch>
+              </a:blipFill>
+            </p:spPr>
+            <p:txBody>
+              <a:bodyPr/>
+              <a:lstStyle/>
+              <a:p>
+                <a:r>
+                  <a:rPr lang="en-US">
+                    <a:noFill/>
+                  </a:rPr>
+                  <a:t> </a:t>
+                </a:r>
+              </a:p>
+            </p:txBody>
+          </p:sp>
+        </mc:Fallback>
+      </mc:AlternateContent>
+      <p:sp>
+        <p:nvSpPr>
+          <p:cNvPr id="5" name="Slide Number Placeholder 4">
             <a:extLst>
               <a:ext uri="{FF2B5EF4-FFF2-40B4-BE49-F238E27FC236}">
-                <a16:creationId xmlns:a16="http://schemas.microsoft.com/office/drawing/2014/main" id="{B20C1E08-E337-110E-DB8E-41BA4A3341A1}"/>
+                <a16:creationId xmlns:a16="http://schemas.microsoft.com/office/drawing/2014/main" id="{087B1B0E-8A52-9A56-0B8A-CAAA1A2BA6D5}"/>
               </a:ext>
             </a:extLst>
           </p:cNvPr>
@@ -8957,51 +9279,10 @@
             <a:spLocks noGrp="1"/>
           </p:cNvSpPr>
           <p:nvPr>
-            <p:ph sz="quarter" idx="10"/>
-          </p:nvPr>
-        </p:nvSpPr>
-        <p:spPr>
-          <a:xfrm>
-            <a:off x="914400" y="2844800"/>
-            <a:ext cx="5181600" cy="3128963"/>
-          </a:xfrm>
-        </p:spPr>
-        <p:txBody>
-          <a:bodyPr/>
-          <a:lstStyle/>
-          <a:p>
-            <a:r>
-              <a:rPr lang="en-US" dirty="0"/>
-              <a:t>At Contoso, we empower organizations to foster collaborative thinking to further drive workplace innovation. By closing the loop and leveraging agile frameworks, we help business grow organically and foster a consumer first mindset.</a:t>
-            </a:r>
-          </a:p>
-          <a:p>
-            <a:endParaRPr lang="en-US" dirty="0"/>
-          </a:p>
-        </p:txBody>
-      </p:sp>
-      <p:sp>
-        <p:nvSpPr>
-          <p:cNvPr id="2" name="Slide Number Placeholder 1">
-            <a:extLst>
-              <a:ext uri="{FF2B5EF4-FFF2-40B4-BE49-F238E27FC236}">
-                <a16:creationId xmlns:a16="http://schemas.microsoft.com/office/drawing/2014/main" id="{00255621-1D81-03E6-507B-CB20E070356A}"/>
-              </a:ext>
-            </a:extLst>
-          </p:cNvPr>
-          <p:cNvSpPr>
-            <a:spLocks noGrp="1"/>
-          </p:cNvSpPr>
-          <p:nvPr>
             <p:ph type="sldNum" sz="quarter" idx="4"/>
           </p:nvPr>
         </p:nvSpPr>
-        <p:spPr>
-          <a:xfrm>
-            <a:off x="914400" y="6246254"/>
-            <a:ext cx="631065" cy="296214"/>
-          </a:xfrm>
-        </p:spPr>
+        <p:spPr/>
         <p:txBody>
           <a:bodyPr/>
           <a:lstStyle/>
@@ -9015,10 +9296,566 @@
           </a:p>
         </p:txBody>
       </p:sp>
+      <mc:AlternateContent xmlns:mc="http://schemas.openxmlformats.org/markup-compatibility/2006">
+        <mc:Choice xmlns:a14="http://schemas.microsoft.com/office/drawing/2010/main" Requires="a14">
+          <p:sp>
+            <p:nvSpPr>
+              <p:cNvPr id="6" name="Content Placeholder 2">
+                <a:extLst>
+                  <a:ext uri="{FF2B5EF4-FFF2-40B4-BE49-F238E27FC236}">
+                    <a16:creationId xmlns:a16="http://schemas.microsoft.com/office/drawing/2014/main" id="{98EF6A66-689C-BB34-0368-A52C0A290219}"/>
+                  </a:ext>
+                </a:extLst>
+              </p:cNvPr>
+              <p:cNvSpPr txBox="1">
+                <a:spLocks/>
+              </p:cNvSpPr>
+              <p:nvPr/>
+            </p:nvSpPr>
+            <p:spPr>
+              <a:xfrm>
+                <a:off x="4288395" y="2022249"/>
+                <a:ext cx="3995409" cy="4470625"/>
+              </a:xfrm>
+              <a:prstGeom prst="rect">
+                <a:avLst/>
+              </a:prstGeom>
+            </p:spPr>
+            <p:txBody>
+              <a:bodyPr vert="horz" lIns="91440" tIns="45720" rIns="91440" bIns="45720" rtlCol="0">
+                <a:normAutofit/>
+              </a:bodyPr>
+              <a:lstStyle>
+                <a:lvl1pPr marL="228600" indent="-228600" algn="l" defTabSz="914400" rtl="0" eaLnBrk="1" latinLnBrk="0" hangingPunct="1">
+                  <a:lnSpc>
+                    <a:spcPct val="90000"/>
+                  </a:lnSpc>
+                  <a:spcBef>
+                    <a:spcPts val="0"/>
+                  </a:spcBef>
+                  <a:spcAft>
+                    <a:spcPts val="1200"/>
+                  </a:spcAft>
+                  <a:buFont typeface="Arial" panose="020B0604020202020204" pitchFamily="34" charset="0"/>
+                  <a:buChar char="•"/>
+                  <a:defRPr sz="2000" b="0" kern="1200">
+                    <a:solidFill>
+                      <a:schemeClr val="tx1"/>
+                    </a:solidFill>
+                    <a:latin typeface="+mn-lt"/>
+                    <a:ea typeface="+mn-ea"/>
+                    <a:cs typeface="+mn-cs"/>
+                  </a:defRPr>
+                </a:lvl1pPr>
+                <a:lvl2pPr marL="685800" indent="-228600" algn="l" defTabSz="914400" rtl="0" eaLnBrk="1" latinLnBrk="0" hangingPunct="1">
+                  <a:lnSpc>
+                    <a:spcPct val="90000"/>
+                  </a:lnSpc>
+                  <a:spcBef>
+                    <a:spcPts val="0"/>
+                  </a:spcBef>
+                  <a:spcAft>
+                    <a:spcPts val="1200"/>
+                  </a:spcAft>
+                  <a:buFont typeface="Arial" panose="020B0604020202020204" pitchFamily="34" charset="0"/>
+                  <a:buChar char="•"/>
+                  <a:defRPr sz="1800" b="0" kern="1200">
+                    <a:solidFill>
+                      <a:schemeClr val="tx1"/>
+                    </a:solidFill>
+                    <a:latin typeface="+mn-lt"/>
+                    <a:ea typeface="+mn-ea"/>
+                    <a:cs typeface="+mn-cs"/>
+                  </a:defRPr>
+                </a:lvl2pPr>
+                <a:lvl3pPr marL="1143000" indent="-228600" algn="l" defTabSz="914400" rtl="0" eaLnBrk="1" latinLnBrk="0" hangingPunct="1">
+                  <a:lnSpc>
+                    <a:spcPct val="90000"/>
+                  </a:lnSpc>
+                  <a:spcBef>
+                    <a:spcPts val="0"/>
+                  </a:spcBef>
+                  <a:spcAft>
+                    <a:spcPts val="1200"/>
+                  </a:spcAft>
+                  <a:buFont typeface="Arial" panose="020B0604020202020204" pitchFamily="34" charset="0"/>
+                  <a:buChar char="•"/>
+                  <a:defRPr sz="1600" b="0" kern="1200">
+                    <a:solidFill>
+                      <a:schemeClr val="tx1"/>
+                    </a:solidFill>
+                    <a:latin typeface="+mn-lt"/>
+                    <a:ea typeface="+mn-ea"/>
+                    <a:cs typeface="+mn-cs"/>
+                  </a:defRPr>
+                </a:lvl3pPr>
+                <a:lvl4pPr marL="1600200" indent="-228600" algn="l" defTabSz="914400" rtl="0" eaLnBrk="1" latinLnBrk="0" hangingPunct="1">
+                  <a:lnSpc>
+                    <a:spcPct val="90000"/>
+                  </a:lnSpc>
+                  <a:spcBef>
+                    <a:spcPts val="0"/>
+                  </a:spcBef>
+                  <a:spcAft>
+                    <a:spcPts val="1200"/>
+                  </a:spcAft>
+                  <a:buFont typeface="Arial" panose="020B0604020202020204" pitchFamily="34" charset="0"/>
+                  <a:buChar char="•"/>
+                  <a:defRPr sz="1400" b="0" kern="1200">
+                    <a:solidFill>
+                      <a:schemeClr val="tx1"/>
+                    </a:solidFill>
+                    <a:latin typeface="+mn-lt"/>
+                    <a:ea typeface="+mn-ea"/>
+                    <a:cs typeface="+mn-cs"/>
+                  </a:defRPr>
+                </a:lvl4pPr>
+                <a:lvl5pPr marL="2057400" indent="-228600" algn="l" defTabSz="914400" rtl="0" eaLnBrk="1" latinLnBrk="0" hangingPunct="1">
+                  <a:lnSpc>
+                    <a:spcPct val="90000"/>
+                  </a:lnSpc>
+                  <a:spcBef>
+                    <a:spcPts val="0"/>
+                  </a:spcBef>
+                  <a:spcAft>
+                    <a:spcPts val="1200"/>
+                  </a:spcAft>
+                  <a:buFont typeface="Arial" panose="020B0604020202020204" pitchFamily="34" charset="0"/>
+                  <a:buChar char="•"/>
+                  <a:defRPr sz="1400" b="0" kern="1200">
+                    <a:solidFill>
+                      <a:schemeClr val="tx1"/>
+                    </a:solidFill>
+                    <a:latin typeface="+mn-lt"/>
+                    <a:ea typeface="+mn-ea"/>
+                    <a:cs typeface="+mn-cs"/>
+                  </a:defRPr>
+                </a:lvl5pPr>
+                <a:lvl6pPr marL="2514600" indent="-228600" algn="l" defTabSz="914400" rtl="0" eaLnBrk="1" latinLnBrk="0" hangingPunct="1">
+                  <a:lnSpc>
+                    <a:spcPct val="90000"/>
+                  </a:lnSpc>
+                  <a:spcBef>
+                    <a:spcPts val="500"/>
+                  </a:spcBef>
+                  <a:buFont typeface="Arial" panose="020B0604020202020204" pitchFamily="34" charset="0"/>
+                  <a:buChar char="•"/>
+                  <a:defRPr sz="1800" kern="1200">
+                    <a:solidFill>
+                      <a:schemeClr val="tx1"/>
+                    </a:solidFill>
+                    <a:latin typeface="+mn-lt"/>
+                    <a:ea typeface="+mn-ea"/>
+                    <a:cs typeface="+mn-cs"/>
+                  </a:defRPr>
+                </a:lvl6pPr>
+                <a:lvl7pPr marL="2971800" indent="-228600" algn="l" defTabSz="914400" rtl="0" eaLnBrk="1" latinLnBrk="0" hangingPunct="1">
+                  <a:lnSpc>
+                    <a:spcPct val="90000"/>
+                  </a:lnSpc>
+                  <a:spcBef>
+                    <a:spcPts val="500"/>
+                  </a:spcBef>
+                  <a:buFont typeface="Arial" panose="020B0604020202020204" pitchFamily="34" charset="0"/>
+                  <a:buChar char="•"/>
+                  <a:defRPr sz="1800" kern="1200">
+                    <a:solidFill>
+                      <a:schemeClr val="tx1"/>
+                    </a:solidFill>
+                    <a:latin typeface="+mn-lt"/>
+                    <a:ea typeface="+mn-ea"/>
+                    <a:cs typeface="+mn-cs"/>
+                  </a:defRPr>
+                </a:lvl7pPr>
+                <a:lvl8pPr marL="3429000" indent="-228600" algn="l" defTabSz="914400" rtl="0" eaLnBrk="1" latinLnBrk="0" hangingPunct="1">
+                  <a:lnSpc>
+                    <a:spcPct val="90000"/>
+                  </a:lnSpc>
+                  <a:spcBef>
+                    <a:spcPts val="500"/>
+                  </a:spcBef>
+                  <a:buFont typeface="Arial" panose="020B0604020202020204" pitchFamily="34" charset="0"/>
+                  <a:buChar char="•"/>
+                  <a:defRPr sz="1800" kern="1200">
+                    <a:solidFill>
+                      <a:schemeClr val="tx1"/>
+                    </a:solidFill>
+                    <a:latin typeface="+mn-lt"/>
+                    <a:ea typeface="+mn-ea"/>
+                    <a:cs typeface="+mn-cs"/>
+                  </a:defRPr>
+                </a:lvl8pPr>
+                <a:lvl9pPr marL="3886200" indent="-228600" algn="l" defTabSz="914400" rtl="0" eaLnBrk="1" latinLnBrk="0" hangingPunct="1">
+                  <a:lnSpc>
+                    <a:spcPct val="90000"/>
+                  </a:lnSpc>
+                  <a:spcBef>
+                    <a:spcPts val="500"/>
+                  </a:spcBef>
+                  <a:buFont typeface="Arial" panose="020B0604020202020204" pitchFamily="34" charset="0"/>
+                  <a:buChar char="•"/>
+                  <a:defRPr sz="1800" kern="1200">
+                    <a:solidFill>
+                      <a:schemeClr val="tx1"/>
+                    </a:solidFill>
+                    <a:latin typeface="+mn-lt"/>
+                    <a:ea typeface="+mn-ea"/>
+                    <a:cs typeface="+mn-cs"/>
+                  </a:defRPr>
+                </a:lvl9pPr>
+              </a:lstStyle>
+              <a:p>
+                <a:pPr marL="0" indent="0">
+                  <a:buNone/>
+                </a:pPr>
+                <a:r>
+                  <a:rPr lang="en-US" sz="1200" b="1" dirty="0"/>
+                  <a:t>Approximation Part:</a:t>
+                </a:r>
+              </a:p>
+              <a:p>
+                <a:r>
+                  <a:rPr lang="en-US" sz="1200" dirty="0"/>
+                  <a:t>pseudocode for the approximation and a discussion of the strategy used (greedy, random, etc.)</a:t>
+                </a:r>
+              </a:p>
+              <a:p>
+                <a:r>
+                  <a:rPr lang="en-US" sz="1200" dirty="0"/>
+                  <a:t>analytical run time analysis (the worse case </a:t>
+                </a:r>
+                <a14:m>
+                  <m:oMath xmlns:m="http://schemas.openxmlformats.org/officeDocument/2006/math">
+                    <m:r>
+                      <a:rPr lang="en-US" sz="1200"/>
+                      <m:t>𝒪</m:t>
+                    </m:r>
+                  </m:oMath>
+                </a14:m>
+                <a:r>
+                  <a:rPr lang="en-US" sz="1200" dirty="0"/>
+                  <a:t> time) of your approximation algorithm</a:t>
+                </a:r>
+              </a:p>
+              <a:p>
+                <a:r>
+                  <a:rPr lang="en-US" sz="1200" dirty="0"/>
+                  <a:t>plots that illustrate the run-time (wall clock) performance of your exact solution versus the approximation solution on your test cases</a:t>
+                </a:r>
+              </a:p>
+              <a:p>
+                <a:r>
+                  <a:rPr lang="en-US" sz="1200" dirty="0"/>
+                  <a:t>plots that compare the result/solution of your exact solution versus the approximation on your test cases. This is where you show the </a:t>
+                </a:r>
+                <a:r>
+                  <a:rPr lang="en-US" sz="1200" b="1" dirty="0"/>
+                  <a:t>value</a:t>
+                </a:r>
+                <a:r>
+                  <a:rPr lang="en-US" sz="1200" dirty="0"/>
+                  <a:t> achieved by both and see how well your approximation did versus the optimal solution.</a:t>
+                </a:r>
+              </a:p>
+            </p:txBody>
+          </p:sp>
+        </mc:Choice>
+        <mc:Fallback>
+          <p:sp>
+            <p:nvSpPr>
+              <p:cNvPr id="6" name="Content Placeholder 2">
+                <a:extLst>
+                  <a:ext uri="{FF2B5EF4-FFF2-40B4-BE49-F238E27FC236}">
+                    <a16:creationId xmlns:a16="http://schemas.microsoft.com/office/drawing/2014/main" id="{98EF6A66-689C-BB34-0368-A52C0A290219}"/>
+                  </a:ext>
+                </a:extLst>
+              </p:cNvPr>
+              <p:cNvSpPr txBox="1">
+                <a:spLocks noRot="1" noChangeAspect="1" noMove="1" noResize="1" noEditPoints="1" noAdjustHandles="1" noChangeArrowheads="1" noChangeShapeType="1" noTextEdit="1"/>
+              </p:cNvSpPr>
+              <p:nvPr/>
+            </p:nvSpPr>
+            <p:spPr>
+              <a:xfrm>
+                <a:off x="4288395" y="2022249"/>
+                <a:ext cx="3995409" cy="4470625"/>
+              </a:xfrm>
+              <a:prstGeom prst="rect">
+                <a:avLst/>
+              </a:prstGeom>
+              <a:blipFill>
+                <a:blip r:embed="rId3"/>
+                <a:stretch>
+                  <a:fillRect t="-546" r="-762"/>
+                </a:stretch>
+              </a:blipFill>
+            </p:spPr>
+            <p:txBody>
+              <a:bodyPr/>
+              <a:lstStyle/>
+              <a:p>
+                <a:r>
+                  <a:rPr lang="en-US">
+                    <a:noFill/>
+                  </a:rPr>
+                  <a:t> </a:t>
+                </a:r>
+              </a:p>
+            </p:txBody>
+          </p:sp>
+        </mc:Fallback>
+      </mc:AlternateContent>
+      <p:sp>
+        <p:nvSpPr>
+          <p:cNvPr id="7" name="Content Placeholder 2">
+            <a:extLst>
+              <a:ext uri="{FF2B5EF4-FFF2-40B4-BE49-F238E27FC236}">
+                <a16:creationId xmlns:a16="http://schemas.microsoft.com/office/drawing/2014/main" id="{64A11258-D99F-94B9-81DB-4513FB9612A3}"/>
+              </a:ext>
+            </a:extLst>
+          </p:cNvPr>
+          <p:cNvSpPr txBox="1">
+            <a:spLocks/>
+          </p:cNvSpPr>
+          <p:nvPr/>
+        </p:nvSpPr>
+        <p:spPr>
+          <a:xfrm>
+            <a:off x="8196591" y="2022249"/>
+            <a:ext cx="3995409" cy="4470625"/>
+          </a:xfrm>
+          <a:prstGeom prst="rect">
+            <a:avLst/>
+          </a:prstGeom>
+        </p:spPr>
+        <p:txBody>
+          <a:bodyPr vert="horz" lIns="91440" tIns="45720" rIns="91440" bIns="45720" rtlCol="0">
+            <a:normAutofit/>
+          </a:bodyPr>
+          <a:lstStyle>
+            <a:lvl1pPr marL="228600" indent="-228600" algn="l" defTabSz="914400" rtl="0" eaLnBrk="1" latinLnBrk="0" hangingPunct="1">
+              <a:lnSpc>
+                <a:spcPct val="90000"/>
+              </a:lnSpc>
+              <a:spcBef>
+                <a:spcPts val="0"/>
+              </a:spcBef>
+              <a:spcAft>
+                <a:spcPts val="1200"/>
+              </a:spcAft>
+              <a:buFont typeface="Arial" panose="020B0604020202020204" pitchFamily="34" charset="0"/>
+              <a:buChar char="•"/>
+              <a:defRPr sz="2000" b="0" kern="1200">
+                <a:solidFill>
+                  <a:schemeClr val="tx1"/>
+                </a:solidFill>
+                <a:latin typeface="+mn-lt"/>
+                <a:ea typeface="+mn-ea"/>
+                <a:cs typeface="+mn-cs"/>
+              </a:defRPr>
+            </a:lvl1pPr>
+            <a:lvl2pPr marL="685800" indent="-228600" algn="l" defTabSz="914400" rtl="0" eaLnBrk="1" latinLnBrk="0" hangingPunct="1">
+              <a:lnSpc>
+                <a:spcPct val="90000"/>
+              </a:lnSpc>
+              <a:spcBef>
+                <a:spcPts val="0"/>
+              </a:spcBef>
+              <a:spcAft>
+                <a:spcPts val="1200"/>
+              </a:spcAft>
+              <a:buFont typeface="Arial" panose="020B0604020202020204" pitchFamily="34" charset="0"/>
+              <a:buChar char="•"/>
+              <a:defRPr sz="1800" b="0" kern="1200">
+                <a:solidFill>
+                  <a:schemeClr val="tx1"/>
+                </a:solidFill>
+                <a:latin typeface="+mn-lt"/>
+                <a:ea typeface="+mn-ea"/>
+                <a:cs typeface="+mn-cs"/>
+              </a:defRPr>
+            </a:lvl2pPr>
+            <a:lvl3pPr marL="1143000" indent="-228600" algn="l" defTabSz="914400" rtl="0" eaLnBrk="1" latinLnBrk="0" hangingPunct="1">
+              <a:lnSpc>
+                <a:spcPct val="90000"/>
+              </a:lnSpc>
+              <a:spcBef>
+                <a:spcPts val="0"/>
+              </a:spcBef>
+              <a:spcAft>
+                <a:spcPts val="1200"/>
+              </a:spcAft>
+              <a:buFont typeface="Arial" panose="020B0604020202020204" pitchFamily="34" charset="0"/>
+              <a:buChar char="•"/>
+              <a:defRPr sz="1600" b="0" kern="1200">
+                <a:solidFill>
+                  <a:schemeClr val="tx1"/>
+                </a:solidFill>
+                <a:latin typeface="+mn-lt"/>
+                <a:ea typeface="+mn-ea"/>
+                <a:cs typeface="+mn-cs"/>
+              </a:defRPr>
+            </a:lvl3pPr>
+            <a:lvl4pPr marL="1600200" indent="-228600" algn="l" defTabSz="914400" rtl="0" eaLnBrk="1" latinLnBrk="0" hangingPunct="1">
+              <a:lnSpc>
+                <a:spcPct val="90000"/>
+              </a:lnSpc>
+              <a:spcBef>
+                <a:spcPts val="0"/>
+              </a:spcBef>
+              <a:spcAft>
+                <a:spcPts val="1200"/>
+              </a:spcAft>
+              <a:buFont typeface="Arial" panose="020B0604020202020204" pitchFamily="34" charset="0"/>
+              <a:buChar char="•"/>
+              <a:defRPr sz="1400" b="0" kern="1200">
+                <a:solidFill>
+                  <a:schemeClr val="tx1"/>
+                </a:solidFill>
+                <a:latin typeface="+mn-lt"/>
+                <a:ea typeface="+mn-ea"/>
+                <a:cs typeface="+mn-cs"/>
+              </a:defRPr>
+            </a:lvl4pPr>
+            <a:lvl5pPr marL="2057400" indent="-228600" algn="l" defTabSz="914400" rtl="0" eaLnBrk="1" latinLnBrk="0" hangingPunct="1">
+              <a:lnSpc>
+                <a:spcPct val="90000"/>
+              </a:lnSpc>
+              <a:spcBef>
+                <a:spcPts val="0"/>
+              </a:spcBef>
+              <a:spcAft>
+                <a:spcPts val="1200"/>
+              </a:spcAft>
+              <a:buFont typeface="Arial" panose="020B0604020202020204" pitchFamily="34" charset="0"/>
+              <a:buChar char="•"/>
+              <a:defRPr sz="1400" b="0" kern="1200">
+                <a:solidFill>
+                  <a:schemeClr val="tx1"/>
+                </a:solidFill>
+                <a:latin typeface="+mn-lt"/>
+                <a:ea typeface="+mn-ea"/>
+                <a:cs typeface="+mn-cs"/>
+              </a:defRPr>
+            </a:lvl5pPr>
+            <a:lvl6pPr marL="2514600" indent="-228600" algn="l" defTabSz="914400" rtl="0" eaLnBrk="1" latinLnBrk="0" hangingPunct="1">
+              <a:lnSpc>
+                <a:spcPct val="90000"/>
+              </a:lnSpc>
+              <a:spcBef>
+                <a:spcPts val="500"/>
+              </a:spcBef>
+              <a:buFont typeface="Arial" panose="020B0604020202020204" pitchFamily="34" charset="0"/>
+              <a:buChar char="•"/>
+              <a:defRPr sz="1800" kern="1200">
+                <a:solidFill>
+                  <a:schemeClr val="tx1"/>
+                </a:solidFill>
+                <a:latin typeface="+mn-lt"/>
+                <a:ea typeface="+mn-ea"/>
+                <a:cs typeface="+mn-cs"/>
+              </a:defRPr>
+            </a:lvl6pPr>
+            <a:lvl7pPr marL="2971800" indent="-228600" algn="l" defTabSz="914400" rtl="0" eaLnBrk="1" latinLnBrk="0" hangingPunct="1">
+              <a:lnSpc>
+                <a:spcPct val="90000"/>
+              </a:lnSpc>
+              <a:spcBef>
+                <a:spcPts val="500"/>
+              </a:spcBef>
+              <a:buFont typeface="Arial" panose="020B0604020202020204" pitchFamily="34" charset="0"/>
+              <a:buChar char="•"/>
+              <a:defRPr sz="1800" kern="1200">
+                <a:solidFill>
+                  <a:schemeClr val="tx1"/>
+                </a:solidFill>
+                <a:latin typeface="+mn-lt"/>
+                <a:ea typeface="+mn-ea"/>
+                <a:cs typeface="+mn-cs"/>
+              </a:defRPr>
+            </a:lvl7pPr>
+            <a:lvl8pPr marL="3429000" indent="-228600" algn="l" defTabSz="914400" rtl="0" eaLnBrk="1" latinLnBrk="0" hangingPunct="1">
+              <a:lnSpc>
+                <a:spcPct val="90000"/>
+              </a:lnSpc>
+              <a:spcBef>
+                <a:spcPts val="500"/>
+              </a:spcBef>
+              <a:buFont typeface="Arial" panose="020B0604020202020204" pitchFamily="34" charset="0"/>
+              <a:buChar char="•"/>
+              <a:defRPr sz="1800" kern="1200">
+                <a:solidFill>
+                  <a:schemeClr val="tx1"/>
+                </a:solidFill>
+                <a:latin typeface="+mn-lt"/>
+                <a:ea typeface="+mn-ea"/>
+                <a:cs typeface="+mn-cs"/>
+              </a:defRPr>
+            </a:lvl8pPr>
+            <a:lvl9pPr marL="3886200" indent="-228600" algn="l" defTabSz="914400" rtl="0" eaLnBrk="1" latinLnBrk="0" hangingPunct="1">
+              <a:lnSpc>
+                <a:spcPct val="90000"/>
+              </a:lnSpc>
+              <a:spcBef>
+                <a:spcPts val="500"/>
+              </a:spcBef>
+              <a:buFont typeface="Arial" panose="020B0604020202020204" pitchFamily="34" charset="0"/>
+              <a:buChar char="•"/>
+              <a:defRPr sz="1800" kern="1200">
+                <a:solidFill>
+                  <a:schemeClr val="tx1"/>
+                </a:solidFill>
+                <a:latin typeface="+mn-lt"/>
+                <a:ea typeface="+mn-ea"/>
+                <a:cs typeface="+mn-cs"/>
+              </a:defRPr>
+            </a:lvl9pPr>
+          </a:lstStyle>
+          <a:p>
+            <a:pPr marL="0" indent="0">
+              <a:buNone/>
+            </a:pPr>
+            <a:r>
+              <a:rPr lang="en-US" sz="1200" b="1" dirty="0"/>
+              <a:t>Part E:</a:t>
+            </a:r>
+          </a:p>
+          <a:p>
+            <a:r>
+              <a:rPr lang="en-US" sz="1200" dirty="0"/>
+              <a:t>Talk about how you broke things</a:t>
+            </a:r>
+          </a:p>
+          <a:p>
+            <a:r>
+              <a:rPr lang="en-US" sz="1200" dirty="0"/>
+              <a:t>Talk about how you fixed things</a:t>
+            </a:r>
+          </a:p>
+          <a:p>
+            <a:r>
+              <a:rPr lang="en-US" sz="1200" dirty="0"/>
+              <a:t>What is your approximation weak on</a:t>
+            </a:r>
+          </a:p>
+          <a:p>
+            <a:r>
+              <a:rPr lang="en-US" sz="1200" dirty="0"/>
+              <a:t>How does adding more time improve things?</a:t>
+            </a:r>
+          </a:p>
+          <a:p>
+            <a:r>
+              <a:rPr lang="en-US" sz="1200" dirty="0"/>
+              <a:t>Conclude everything</a:t>
+            </a:r>
+          </a:p>
+        </p:txBody>
+      </p:sp>
     </p:spTree>
     <p:extLst>
       <p:ext uri="{BB962C8B-B14F-4D97-AF65-F5344CB8AC3E}">
-        <p14:creationId xmlns:p14="http://schemas.microsoft.com/office/powerpoint/2010/main" val="542059410"/>
+        <p14:creationId xmlns:p14="http://schemas.microsoft.com/office/powerpoint/2010/main" val="1072026155"/>
       </p:ext>
     </p:extLst>
   </p:cSld>
@@ -9047,6 +9884,140 @@
       </p:grpSpPr>
       <p:sp>
         <p:nvSpPr>
+          <p:cNvPr id="3" name="Title 2">
+            <a:extLst>
+              <a:ext uri="{FF2B5EF4-FFF2-40B4-BE49-F238E27FC236}">
+                <a16:creationId xmlns:a16="http://schemas.microsoft.com/office/drawing/2014/main" id="{3474D05E-8A36-8D9F-519E-DB514A69D886}"/>
+              </a:ext>
+            </a:extLst>
+          </p:cNvPr>
+          <p:cNvSpPr>
+            <a:spLocks noGrp="1"/>
+          </p:cNvSpPr>
+          <p:nvPr>
+            <p:ph type="title"/>
+          </p:nvPr>
+        </p:nvSpPr>
+        <p:spPr>
+          <a:xfrm>
+            <a:off x="914400" y="315533"/>
+            <a:ext cx="5181600" cy="2376868"/>
+          </a:xfrm>
+        </p:spPr>
+        <p:txBody>
+          <a:bodyPr/>
+          <a:lstStyle/>
+          <a:p>
+            <a:r>
+              <a:rPr lang="en-US"/>
+              <a:t>About us</a:t>
+            </a:r>
+          </a:p>
+        </p:txBody>
+      </p:sp>
+      <p:sp>
+        <p:nvSpPr>
+          <p:cNvPr id="4" name="Content Placeholder 3">
+            <a:extLst>
+              <a:ext uri="{FF2B5EF4-FFF2-40B4-BE49-F238E27FC236}">
+                <a16:creationId xmlns:a16="http://schemas.microsoft.com/office/drawing/2014/main" id="{B20C1E08-E337-110E-DB8E-41BA4A3341A1}"/>
+              </a:ext>
+            </a:extLst>
+          </p:cNvPr>
+          <p:cNvSpPr>
+            <a:spLocks noGrp="1"/>
+          </p:cNvSpPr>
+          <p:nvPr>
+            <p:ph sz="quarter" idx="10"/>
+          </p:nvPr>
+        </p:nvSpPr>
+        <p:spPr>
+          <a:xfrm>
+            <a:off x="914400" y="2844800"/>
+            <a:ext cx="5181600" cy="3128963"/>
+          </a:xfrm>
+        </p:spPr>
+        <p:txBody>
+          <a:bodyPr/>
+          <a:lstStyle/>
+          <a:p>
+            <a:r>
+              <a:rPr lang="en-US" dirty="0"/>
+              <a:t>At Contoso, we empower organizations to foster collaborative thinking to further drive workplace innovation. By closing the loop and leveraging agile frameworks, we help business grow organically and foster a consumer first mindset.</a:t>
+            </a:r>
+          </a:p>
+          <a:p>
+            <a:endParaRPr lang="en-US" dirty="0"/>
+          </a:p>
+        </p:txBody>
+      </p:sp>
+      <p:sp>
+        <p:nvSpPr>
+          <p:cNvPr id="2" name="Slide Number Placeholder 1">
+            <a:extLst>
+              <a:ext uri="{FF2B5EF4-FFF2-40B4-BE49-F238E27FC236}">
+                <a16:creationId xmlns:a16="http://schemas.microsoft.com/office/drawing/2014/main" id="{00255621-1D81-03E6-507B-CB20E070356A}"/>
+              </a:ext>
+            </a:extLst>
+          </p:cNvPr>
+          <p:cNvSpPr>
+            <a:spLocks noGrp="1"/>
+          </p:cNvSpPr>
+          <p:nvPr>
+            <p:ph type="sldNum" sz="quarter" idx="4"/>
+          </p:nvPr>
+        </p:nvSpPr>
+        <p:spPr>
+          <a:xfrm>
+            <a:off x="914400" y="6246254"/>
+            <a:ext cx="631065" cy="296214"/>
+          </a:xfrm>
+        </p:spPr>
+        <p:txBody>
+          <a:bodyPr/>
+          <a:lstStyle/>
+          <a:p>
+            <a:fld id="{B5CEABB6-07DC-46E8-9B57-56EC44A396E5}" type="slidenum">
+              <a:rPr lang="en-US" smtClean="0"/>
+              <a:pPr/>
+              <a:t>3</a:t>
+            </a:fld>
+            <a:endParaRPr lang="en-US" dirty="0"/>
+          </a:p>
+        </p:txBody>
+      </p:sp>
+    </p:spTree>
+    <p:extLst>
+      <p:ext uri="{BB962C8B-B14F-4D97-AF65-F5344CB8AC3E}">
+        <p14:creationId xmlns:p14="http://schemas.microsoft.com/office/powerpoint/2010/main" val="542059410"/>
+      </p:ext>
+    </p:extLst>
+  </p:cSld>
+  <p:clrMapOvr>
+    <a:masterClrMapping/>
+  </p:clrMapOvr>
+</p:sld>
+</file>
+
+<file path=ppt/slides/slide4.xml><?xml version="1.0" encoding="utf-8"?>
+<p:sld xmlns:a="http://schemas.openxmlformats.org/drawingml/2006/main" xmlns:r="http://schemas.openxmlformats.org/officeDocument/2006/relationships" xmlns:p="http://schemas.openxmlformats.org/presentationml/2006/main">
+  <p:cSld>
+    <p:spTree>
+      <p:nvGrpSpPr>
+        <p:cNvPr id="1" name=""/>
+        <p:cNvGrpSpPr/>
+        <p:nvPr/>
+      </p:nvGrpSpPr>
+      <p:grpSpPr>
+        <a:xfrm>
+          <a:off x="0" y="0"/>
+          <a:ext cx="0" cy="0"/>
+          <a:chOff x="0" y="0"/>
+          <a:chExt cx="0" cy="0"/>
+        </a:xfrm>
+      </p:grpSpPr>
+      <p:sp>
+        <p:nvSpPr>
           <p:cNvPr id="2" name="Title 1">
             <a:extLst>
               <a:ext uri="{FF2B5EF4-FFF2-40B4-BE49-F238E27FC236}">
@@ -9119,130 +10090,6 @@
 </p:sld>
 </file>
 
-<file path=ppt/slides/slide4.xml><?xml version="1.0" encoding="utf-8"?>
-<p:sld xmlns:a="http://schemas.openxmlformats.org/drawingml/2006/main" xmlns:r="http://schemas.openxmlformats.org/officeDocument/2006/relationships" xmlns:p="http://schemas.openxmlformats.org/presentationml/2006/main">
-  <p:cSld>
-    <p:spTree>
-      <p:nvGrpSpPr>
-        <p:cNvPr id="1" name=""/>
-        <p:cNvGrpSpPr/>
-        <p:nvPr/>
-      </p:nvGrpSpPr>
-      <p:grpSpPr>
-        <a:xfrm>
-          <a:off x="0" y="0"/>
-          <a:ext cx="0" cy="0"/>
-          <a:chOff x="0" y="0"/>
-          <a:chExt cx="0" cy="0"/>
-        </a:xfrm>
-      </p:grpSpPr>
-      <p:sp>
-        <p:nvSpPr>
-          <p:cNvPr id="7" name="Title 6">
-            <a:extLst>
-              <a:ext uri="{FF2B5EF4-FFF2-40B4-BE49-F238E27FC236}">
-                <a16:creationId xmlns:a16="http://schemas.microsoft.com/office/drawing/2014/main" id="{ADD59383-E6CD-CF57-B9CF-5820B1CECE61}"/>
-              </a:ext>
-            </a:extLst>
-          </p:cNvPr>
-          <p:cNvSpPr>
-            <a:spLocks noGrp="1"/>
-          </p:cNvSpPr>
-          <p:nvPr>
-            <p:ph type="title"/>
-          </p:nvPr>
-        </p:nvSpPr>
-        <p:spPr>
-          <a:xfrm>
-            <a:off x="6126480" y="1310639"/>
-            <a:ext cx="4805997" cy="2689629"/>
-          </a:xfrm>
-        </p:spPr>
-        <p:txBody>
-          <a:bodyPr/>
-          <a:lstStyle/>
-          <a:p>
-            <a:r>
-              <a:rPr lang="en-US" dirty="0"/>
-              <a:t>Product overview</a:t>
-            </a:r>
-          </a:p>
-        </p:txBody>
-      </p:sp>
-      <p:pic>
-        <p:nvPicPr>
-          <p:cNvPr id="5" name="Picture Placeholder 4" descr="A person smelling a small glass bottle">
-            <a:extLst>
-              <a:ext uri="{FF2B5EF4-FFF2-40B4-BE49-F238E27FC236}">
-                <a16:creationId xmlns:a16="http://schemas.microsoft.com/office/drawing/2014/main" id="{95D91661-037A-ECB3-7904-2C3843A98D95}"/>
-              </a:ext>
-            </a:extLst>
-          </p:cNvPr>
-          <p:cNvPicPr>
-            <a:picLocks noGrp="1" noChangeAspect="1"/>
-          </p:cNvPicPr>
-          <p:nvPr>
-            <p:ph type="pic" sz="quarter" idx="11"/>
-          </p:nvPr>
-        </p:nvPicPr>
-        <p:blipFill>
-          <a:blip r:embed="rId3"/>
-          <a:srcRect l="20394" r="20394"/>
-          <a:stretch/>
-        </p:blipFill>
-        <p:spPr>
-          <a:xfrm>
-            <a:off x="0" y="-10160"/>
-            <a:ext cx="6096000" cy="6858000"/>
-          </a:xfrm>
-        </p:spPr>
-      </p:pic>
-      <p:sp>
-        <p:nvSpPr>
-          <p:cNvPr id="8" name="Content Placeholder 7">
-            <a:extLst>
-              <a:ext uri="{FF2B5EF4-FFF2-40B4-BE49-F238E27FC236}">
-                <a16:creationId xmlns:a16="http://schemas.microsoft.com/office/drawing/2014/main" id="{8B672BC8-D7EC-066C-9025-5F29713D8495}"/>
-              </a:ext>
-            </a:extLst>
-          </p:cNvPr>
-          <p:cNvSpPr>
-            <a:spLocks noGrp="1"/>
-          </p:cNvSpPr>
-          <p:nvPr>
-            <p:ph sz="quarter" idx="10"/>
-          </p:nvPr>
-        </p:nvSpPr>
-        <p:spPr>
-          <a:xfrm>
-            <a:off x="6126163" y="4172990"/>
-            <a:ext cx="4805997" cy="2389736"/>
-          </a:xfrm>
-        </p:spPr>
-        <p:txBody>
-          <a:bodyPr/>
-          <a:lstStyle/>
-          <a:p>
-            <a:r>
-              <a:rPr lang="en-US" dirty="0"/>
-              <a:t>First beautifully designed product that's both stylish and functional</a:t>
-            </a:r>
-          </a:p>
-        </p:txBody>
-      </p:sp>
-    </p:spTree>
-    <p:extLst>
-      <p:ext uri="{BB962C8B-B14F-4D97-AF65-F5344CB8AC3E}">
-        <p14:creationId xmlns:p14="http://schemas.microsoft.com/office/powerpoint/2010/main" val="56176599"/>
-      </p:ext>
-    </p:extLst>
-  </p:cSld>
-  <p:clrMapOvr>
-    <a:masterClrMapping/>
-  </p:clrMapOvr>
-</p:sld>
-</file>
-
 <file path=ppt/slides/slide5.xml><?xml version="1.0" encoding="utf-8"?>
 <p:sld xmlns:a="http://schemas.openxmlformats.org/drawingml/2006/main" xmlns:r="http://schemas.openxmlformats.org/officeDocument/2006/relationships" xmlns:p="http://schemas.openxmlformats.org/presentationml/2006/main">
   <p:cSld>
@@ -9262,10 +10109,10 @@
       </p:grpSpPr>
       <p:sp>
         <p:nvSpPr>
-          <p:cNvPr id="2" name="Title 1">
+          <p:cNvPr id="7" name="Title 6">
             <a:extLst>
               <a:ext uri="{FF2B5EF4-FFF2-40B4-BE49-F238E27FC236}">
-                <a16:creationId xmlns:a16="http://schemas.microsoft.com/office/drawing/2014/main" id="{018E4F0B-A6EB-861C-1C34-CAA9BDE47858}"/>
+                <a16:creationId xmlns:a16="http://schemas.microsoft.com/office/drawing/2014/main" id="{ADD59383-E6CD-CF57-B9CF-5820B1CECE61}"/>
               </a:ext>
             </a:extLst>
           </p:cNvPr>
@@ -9276,27 +10123,60 @@
             <p:ph type="title"/>
           </p:nvPr>
         </p:nvSpPr>
-        <p:spPr/>
+        <p:spPr>
+          <a:xfrm>
+            <a:off x="6126480" y="1310639"/>
+            <a:ext cx="4805997" cy="2689629"/>
+          </a:xfrm>
+        </p:spPr>
         <p:txBody>
           <a:bodyPr/>
           <a:lstStyle/>
           <a:p>
             <a:r>
-              <a:rPr lang="en-US" sz="3200" dirty="0"/>
-              <a:t>Problem </a:t>
+              <a:rPr lang="en-US" dirty="0"/>
+              <a:t>Product overview</a:t>
             </a:r>
           </a:p>
         </p:txBody>
       </p:sp>
-      <p:sp>
-        <p:nvSpPr>
-          <p:cNvPr id="3" name="Content Placeholder 2">
+      <p:pic>
+        <p:nvPicPr>
+          <p:cNvPr id="5" name="Picture Placeholder 4" descr="A person smelling a small glass bottle">
             <a:extLst>
               <a:ext uri="{FF2B5EF4-FFF2-40B4-BE49-F238E27FC236}">
-                <a16:creationId xmlns:a16="http://schemas.microsoft.com/office/drawing/2014/main" id="{59F97739-E0DF-24F3-7886-013A799A52C3}"/>
+                <a16:creationId xmlns:a16="http://schemas.microsoft.com/office/drawing/2014/main" id="{95D91661-037A-ECB3-7904-2C3843A98D95}"/>
               </a:ext>
             </a:extLst>
           </p:cNvPr>
+          <p:cNvPicPr>
+            <a:picLocks noGrp="1" noChangeAspect="1"/>
+          </p:cNvPicPr>
+          <p:nvPr>
+            <p:ph type="pic" sz="quarter" idx="11"/>
+          </p:nvPr>
+        </p:nvPicPr>
+        <p:blipFill>
+          <a:blip r:embed="rId3"/>
+          <a:srcRect l="20394" r="20394"/>
+          <a:stretch/>
+        </p:blipFill>
+        <p:spPr>
+          <a:xfrm>
+            <a:off x="0" y="-10160"/>
+            <a:ext cx="6096000" cy="6858000"/>
+          </a:xfrm>
+        </p:spPr>
+      </p:pic>
+      <p:sp>
+        <p:nvSpPr>
+          <p:cNvPr id="8" name="Content Placeholder 7">
+            <a:extLst>
+              <a:ext uri="{FF2B5EF4-FFF2-40B4-BE49-F238E27FC236}">
+                <a16:creationId xmlns:a16="http://schemas.microsoft.com/office/drawing/2014/main" id="{8B672BC8-D7EC-066C-9025-5F29713D8495}"/>
+              </a:ext>
+            </a:extLst>
+          </p:cNvPr>
           <p:cNvSpPr>
             <a:spLocks noGrp="1"/>
           </p:cNvSpPr>
@@ -9304,165 +10184,27 @@
             <p:ph sz="quarter" idx="10"/>
           </p:nvPr>
         </p:nvSpPr>
-        <p:spPr/>
+        <p:spPr>
+          <a:xfrm>
+            <a:off x="6126163" y="4172990"/>
+            <a:ext cx="4805997" cy="2389736"/>
+          </a:xfrm>
+        </p:spPr>
         <p:txBody>
           <a:bodyPr/>
           <a:lstStyle/>
           <a:p>
-            <a:pPr marL="228600" indent="-228600">
-              <a:spcBef>
-                <a:spcPts val="0"/>
-              </a:spcBef>
-              <a:spcAft>
-                <a:spcPts val="1200"/>
-              </a:spcAft>
-              <a:buFont typeface="Arial" panose="020B0604020202020204" pitchFamily="34" charset="0"/>
-              <a:buChar char="•"/>
-            </a:pPr>
-            <a:r>
-              <a:rPr lang="en-US" sz="2000" b="1" cap="none" dirty="0"/>
-              <a:t>Market gap</a:t>
-            </a:r>
-            <a:r>
-              <a:rPr lang="en-US" sz="2000" cap="none" dirty="0"/>
-              <a:t>: few, if any, products on the market help customers like we do</a:t>
-            </a:r>
-            <a:endParaRPr lang="en-US" sz="2000" cap="none" dirty="0">
-              <a:cs typeface="Calibri"/>
-            </a:endParaRPr>
-          </a:p>
-          <a:p>
-            <a:pPr marL="228600" indent="-228600">
-              <a:spcBef>
-                <a:spcPts val="0"/>
-              </a:spcBef>
-              <a:spcAft>
-                <a:spcPts val="1200"/>
-              </a:spcAft>
-              <a:buFont typeface="Arial" panose="020B0604020202020204" pitchFamily="34" charset="0"/>
-              <a:buChar char="•"/>
-            </a:pPr>
-            <a:r>
-              <a:rPr lang="en-US" sz="2000" b="1" cap="none" dirty="0"/>
-              <a:t>Customers</a:t>
-            </a:r>
-            <a:r>
-              <a:rPr lang="en-US" sz="2000" cap="none" dirty="0"/>
-              <a:t>: 66% of US consumers spend money on multiple products that only partially resolves their issue</a:t>
-            </a:r>
-          </a:p>
-          <a:p>
-            <a:pPr marL="228600" indent="-228600">
-              <a:spcBef>
-                <a:spcPts val="0"/>
-              </a:spcBef>
-              <a:spcAft>
-                <a:spcPts val="1200"/>
-              </a:spcAft>
-              <a:buFont typeface="Arial" panose="020B0604020202020204" pitchFamily="34" charset="0"/>
-              <a:buChar char="•"/>
-            </a:pPr>
-            <a:r>
-              <a:rPr lang="en-US" sz="2000" b="1" cap="none" dirty="0"/>
-              <a:t>Financials</a:t>
-            </a:r>
-            <a:r>
-              <a:rPr lang="en-US" sz="2000" cap="none" dirty="0"/>
-              <a:t>: </a:t>
-            </a:r>
-            <a:r>
-              <a:rPr lang="en-US" sz="2000" cap="none" dirty="0">
-                <a:ea typeface="+mn-lt"/>
-                <a:cs typeface="+mn-lt"/>
-              </a:rPr>
-              <a:t>millennials account for about a quarter of the $48 billion spent on other products in 2018</a:t>
-            </a:r>
-            <a:endParaRPr lang="en-US" sz="2000" cap="none" dirty="0">
-              <a:cs typeface="Calibri" panose="020F0502020204030204"/>
-            </a:endParaRPr>
-          </a:p>
-          <a:p>
-            <a:pPr marL="228600" indent="-228600">
-              <a:spcBef>
-                <a:spcPts val="0"/>
-              </a:spcBef>
-              <a:spcAft>
-                <a:spcPts val="1200"/>
-              </a:spcAft>
-              <a:buFont typeface="Arial" panose="020B0604020202020204" pitchFamily="34" charset="0"/>
-              <a:buChar char="•"/>
-            </a:pPr>
-            <a:r>
-              <a:rPr lang="en-US" sz="2000" b="1" cap="none" dirty="0"/>
-              <a:t>Costs</a:t>
-            </a:r>
-            <a:r>
-              <a:rPr lang="en-US" sz="2000" cap="none" dirty="0"/>
-              <a:t>: loss of productivity costing consumers thousands of dollars </a:t>
-            </a:r>
-            <a:endParaRPr lang="en-US" sz="2000" cap="none" dirty="0">
-              <a:cs typeface="Calibri" panose="020F0502020204030204"/>
-            </a:endParaRPr>
-          </a:p>
-          <a:p>
-            <a:pPr marL="228600" indent="-228600">
-              <a:spcBef>
-                <a:spcPts val="0"/>
-              </a:spcBef>
-              <a:spcAft>
-                <a:spcPts val="1200"/>
-              </a:spcAft>
-              <a:buFont typeface="Arial" panose="020B0604020202020204" pitchFamily="34" charset="0"/>
-              <a:buChar char="•"/>
-            </a:pPr>
-            <a:r>
-              <a:rPr lang="en-US" sz="2000" b="1" cap="none" dirty="0"/>
-              <a:t>Usability</a:t>
-            </a:r>
-            <a:r>
-              <a:rPr lang="en-US" sz="2000" cap="none" dirty="0"/>
-              <a:t>: customers want something easy to use that helps make their life easier </a:t>
-            </a:r>
-            <a:endParaRPr lang="en-US" sz="2000" cap="none" dirty="0">
-              <a:cs typeface="Calibri"/>
-            </a:endParaRPr>
-          </a:p>
-        </p:txBody>
-      </p:sp>
-      <p:sp>
-        <p:nvSpPr>
-          <p:cNvPr id="4" name="Slide Number Placeholder 3">
-            <a:extLst>
-              <a:ext uri="{FF2B5EF4-FFF2-40B4-BE49-F238E27FC236}">
-                <a16:creationId xmlns:a16="http://schemas.microsoft.com/office/drawing/2014/main" id="{6FE0D061-7327-A55C-AF6A-A95C24DD8B72}"/>
-              </a:ext>
-            </a:extLst>
-          </p:cNvPr>
-          <p:cNvSpPr>
-            <a:spLocks noGrp="1"/>
-          </p:cNvSpPr>
-          <p:nvPr>
-            <p:ph type="sldNum" sz="quarter" idx="4"/>
-          </p:nvPr>
-        </p:nvSpPr>
-        <p:spPr/>
-        <p:txBody>
-          <a:bodyPr/>
-          <a:lstStyle/>
-          <a:p>
-            <a:fld id="{B5CEABB6-07DC-46E8-9B57-56EC44A396E5}" type="slidenum">
-              <a:rPr lang="en-US" smtClean="0"/>
-              <a:pPr/>
-              <a:t>5</a:t>
-            </a:fld>
-            <a:endParaRPr lang="en-US" dirty="0"/>
+            <a:r>
+              <a:rPr lang="en-US" dirty="0"/>
+              <a:t>First beautifully designed product that's both stylish and functional</a:t>
+            </a:r>
           </a:p>
         </p:txBody>
       </p:sp>
     </p:spTree>
     <p:extLst>
       <p:ext uri="{BB962C8B-B14F-4D97-AF65-F5344CB8AC3E}">
-        <p14:creationId xmlns:p14="http://schemas.microsoft.com/office/powerpoint/2010/main" val="412000632"/>
+        <p14:creationId xmlns:p14="http://schemas.microsoft.com/office/powerpoint/2010/main" val="56176599"/>
       </p:ext>
     </p:extLst>
   </p:cSld>
@@ -9494,7 +10236,7 @@
           <p:cNvPr id="2" name="Title 1">
             <a:extLst>
               <a:ext uri="{FF2B5EF4-FFF2-40B4-BE49-F238E27FC236}">
-                <a16:creationId xmlns:a16="http://schemas.microsoft.com/office/drawing/2014/main" id="{14808221-C29B-07A3-B569-B8B466B1020B}"/>
+                <a16:creationId xmlns:a16="http://schemas.microsoft.com/office/drawing/2014/main" id="{018E4F0B-A6EB-861C-1C34-CAA9BDE47858}"/>
               </a:ext>
             </a:extLst>
           </p:cNvPr>
@@ -9505,60 +10247,27 @@
             <p:ph type="title"/>
           </p:nvPr>
         </p:nvSpPr>
-        <p:spPr>
-          <a:xfrm>
-            <a:off x="6096000" y="375285"/>
-            <a:ext cx="4896678" cy="3624984"/>
-          </a:xfrm>
-        </p:spPr>
+        <p:spPr/>
         <p:txBody>
           <a:bodyPr/>
           <a:lstStyle/>
           <a:p>
             <a:r>
-              <a:rPr lang="en-US" dirty="0"/>
-              <a:t>Product benefits</a:t>
+              <a:rPr lang="en-US" sz="3200" dirty="0"/>
+              <a:t>Problem </a:t>
             </a:r>
           </a:p>
         </p:txBody>
       </p:sp>
-      <p:pic>
-        <p:nvPicPr>
-          <p:cNvPr id="5" name="Picture Placeholder 4" descr="A person standing in a greenhouse">
+      <p:sp>
+        <p:nvSpPr>
+          <p:cNvPr id="3" name="Content Placeholder 2">
             <a:extLst>
               <a:ext uri="{FF2B5EF4-FFF2-40B4-BE49-F238E27FC236}">
-                <a16:creationId xmlns:a16="http://schemas.microsoft.com/office/drawing/2014/main" id="{EE30546E-D63D-6DD8-4DA7-41DD51A44C2F}"/>
+                <a16:creationId xmlns:a16="http://schemas.microsoft.com/office/drawing/2014/main" id="{59F97739-E0DF-24F3-7886-013A799A52C3}"/>
               </a:ext>
             </a:extLst>
           </p:cNvPr>
-          <p:cNvPicPr>
-            <a:picLocks noGrp="1" noChangeAspect="1"/>
-          </p:cNvPicPr>
-          <p:nvPr>
-            <p:ph type="pic" sz="quarter" idx="11"/>
-          </p:nvPr>
-        </p:nvPicPr>
-        <p:blipFill>
-          <a:blip r:embed="rId3"/>
-          <a:srcRect t="12487" b="12487"/>
-          <a:stretch/>
-        </p:blipFill>
-        <p:spPr>
-          <a:xfrm>
-            <a:off x="0" y="0"/>
-            <a:ext cx="6096000" cy="6858000"/>
-          </a:xfrm>
-        </p:spPr>
-      </p:pic>
-      <p:sp>
-        <p:nvSpPr>
-          <p:cNvPr id="3" name="Content Placeholder 2">
-            <a:extLst>
-              <a:ext uri="{FF2B5EF4-FFF2-40B4-BE49-F238E27FC236}">
-                <a16:creationId xmlns:a16="http://schemas.microsoft.com/office/drawing/2014/main" id="{D6BEA7D4-8B96-5A0E-252E-6B8E8B1CF178}"/>
-              </a:ext>
-            </a:extLst>
-          </p:cNvPr>
           <p:cNvSpPr>
             <a:spLocks noGrp="1"/>
           </p:cNvSpPr>
@@ -9566,27 +10275,165 @@
             <p:ph sz="quarter" idx="10"/>
           </p:nvPr>
         </p:nvSpPr>
-        <p:spPr>
-          <a:xfrm>
-            <a:off x="6096000" y="4172990"/>
-            <a:ext cx="4896677" cy="2309726"/>
-          </a:xfrm>
-        </p:spPr>
+        <p:spPr/>
         <p:txBody>
           <a:bodyPr/>
           <a:lstStyle/>
           <a:p>
-            <a:r>
-              <a:rPr lang="en-US" noProof="1"/>
-              <a:t>Online store and market swap</a:t>
-            </a:r>
+            <a:pPr marL="228600" indent="-228600">
+              <a:spcBef>
+                <a:spcPts val="0"/>
+              </a:spcBef>
+              <a:spcAft>
+                <a:spcPts val="1200"/>
+              </a:spcAft>
+              <a:buFont typeface="Arial" panose="020B0604020202020204" pitchFamily="34" charset="0"/>
+              <a:buChar char="•"/>
+            </a:pPr>
+            <a:r>
+              <a:rPr lang="en-US" sz="2000" b="1" cap="none" dirty="0"/>
+              <a:t>Market gap</a:t>
+            </a:r>
+            <a:r>
+              <a:rPr lang="en-US" sz="2000" cap="none" dirty="0"/>
+              <a:t>: few, if any, products on the market help customers like we do</a:t>
+            </a:r>
+            <a:endParaRPr lang="en-US" sz="2000" cap="none" dirty="0">
+              <a:cs typeface="Calibri"/>
+            </a:endParaRPr>
+          </a:p>
+          <a:p>
+            <a:pPr marL="228600" indent="-228600">
+              <a:spcBef>
+                <a:spcPts val="0"/>
+              </a:spcBef>
+              <a:spcAft>
+                <a:spcPts val="1200"/>
+              </a:spcAft>
+              <a:buFont typeface="Arial" panose="020B0604020202020204" pitchFamily="34" charset="0"/>
+              <a:buChar char="•"/>
+            </a:pPr>
+            <a:r>
+              <a:rPr lang="en-US" sz="2000" b="1" cap="none" dirty="0"/>
+              <a:t>Customers</a:t>
+            </a:r>
+            <a:r>
+              <a:rPr lang="en-US" sz="2000" cap="none" dirty="0"/>
+              <a:t>: 66% of US consumers spend money on multiple products that only partially resolves their issue</a:t>
+            </a:r>
+          </a:p>
+          <a:p>
+            <a:pPr marL="228600" indent="-228600">
+              <a:spcBef>
+                <a:spcPts val="0"/>
+              </a:spcBef>
+              <a:spcAft>
+                <a:spcPts val="1200"/>
+              </a:spcAft>
+              <a:buFont typeface="Arial" panose="020B0604020202020204" pitchFamily="34" charset="0"/>
+              <a:buChar char="•"/>
+            </a:pPr>
+            <a:r>
+              <a:rPr lang="en-US" sz="2000" b="1" cap="none" dirty="0"/>
+              <a:t>Financials</a:t>
+            </a:r>
+            <a:r>
+              <a:rPr lang="en-US" sz="2000" cap="none" dirty="0"/>
+              <a:t>: </a:t>
+            </a:r>
+            <a:r>
+              <a:rPr lang="en-US" sz="2000" cap="none" dirty="0">
+                <a:ea typeface="+mn-lt"/>
+                <a:cs typeface="+mn-lt"/>
+              </a:rPr>
+              <a:t>millennials account for about a quarter of the $48 billion spent on other products in 2018</a:t>
+            </a:r>
+            <a:endParaRPr lang="en-US" sz="2000" cap="none" dirty="0">
+              <a:cs typeface="Calibri" panose="020F0502020204030204"/>
+            </a:endParaRPr>
+          </a:p>
+          <a:p>
+            <a:pPr marL="228600" indent="-228600">
+              <a:spcBef>
+                <a:spcPts val="0"/>
+              </a:spcBef>
+              <a:spcAft>
+                <a:spcPts val="1200"/>
+              </a:spcAft>
+              <a:buFont typeface="Arial" panose="020B0604020202020204" pitchFamily="34" charset="0"/>
+              <a:buChar char="•"/>
+            </a:pPr>
+            <a:r>
+              <a:rPr lang="en-US" sz="2000" b="1" cap="none" dirty="0"/>
+              <a:t>Costs</a:t>
+            </a:r>
+            <a:r>
+              <a:rPr lang="en-US" sz="2000" cap="none" dirty="0"/>
+              <a:t>: loss of productivity costing consumers thousands of dollars </a:t>
+            </a:r>
+            <a:endParaRPr lang="en-US" sz="2000" cap="none" dirty="0">
+              <a:cs typeface="Calibri" panose="020F0502020204030204"/>
+            </a:endParaRPr>
+          </a:p>
+          <a:p>
+            <a:pPr marL="228600" indent="-228600">
+              <a:spcBef>
+                <a:spcPts val="0"/>
+              </a:spcBef>
+              <a:spcAft>
+                <a:spcPts val="1200"/>
+              </a:spcAft>
+              <a:buFont typeface="Arial" panose="020B0604020202020204" pitchFamily="34" charset="0"/>
+              <a:buChar char="•"/>
+            </a:pPr>
+            <a:r>
+              <a:rPr lang="en-US" sz="2000" b="1" cap="none" dirty="0"/>
+              <a:t>Usability</a:t>
+            </a:r>
+            <a:r>
+              <a:rPr lang="en-US" sz="2000" cap="none" dirty="0"/>
+              <a:t>: customers want something easy to use that helps make their life easier </a:t>
+            </a:r>
+            <a:endParaRPr lang="en-US" sz="2000" cap="none" dirty="0">
+              <a:cs typeface="Calibri"/>
+            </a:endParaRPr>
+          </a:p>
+        </p:txBody>
+      </p:sp>
+      <p:sp>
+        <p:nvSpPr>
+          <p:cNvPr id="4" name="Slide Number Placeholder 3">
+            <a:extLst>
+              <a:ext uri="{FF2B5EF4-FFF2-40B4-BE49-F238E27FC236}">
+                <a16:creationId xmlns:a16="http://schemas.microsoft.com/office/drawing/2014/main" id="{6FE0D061-7327-A55C-AF6A-A95C24DD8B72}"/>
+              </a:ext>
+            </a:extLst>
+          </p:cNvPr>
+          <p:cNvSpPr>
+            <a:spLocks noGrp="1"/>
+          </p:cNvSpPr>
+          <p:nvPr>
+            <p:ph type="sldNum" sz="quarter" idx="4"/>
+          </p:nvPr>
+        </p:nvSpPr>
+        <p:spPr/>
+        <p:txBody>
+          <a:bodyPr/>
+          <a:lstStyle/>
+          <a:p>
+            <a:fld id="{B5CEABB6-07DC-46E8-9B57-56EC44A396E5}" type="slidenum">
+              <a:rPr lang="en-US" smtClean="0"/>
+              <a:pPr/>
+              <a:t>6</a:t>
+            </a:fld>
+            <a:endParaRPr lang="en-US" dirty="0"/>
           </a:p>
         </p:txBody>
       </p:sp>
     </p:spTree>
     <p:extLst>
       <p:ext uri="{BB962C8B-B14F-4D97-AF65-F5344CB8AC3E}">
-        <p14:creationId xmlns:p14="http://schemas.microsoft.com/office/powerpoint/2010/main" val="1760417424"/>
+        <p14:creationId xmlns:p14="http://schemas.microsoft.com/office/powerpoint/2010/main" val="412000632"/>
       </p:ext>
     </p:extLst>
   </p:cSld>
@@ -9618,7 +10465,7 @@
           <p:cNvPr id="2" name="Title 1">
             <a:extLst>
               <a:ext uri="{FF2B5EF4-FFF2-40B4-BE49-F238E27FC236}">
-                <a16:creationId xmlns:a16="http://schemas.microsoft.com/office/drawing/2014/main" id="{F992D586-3F7C-3202-E4F4-1F65B9A7D428}"/>
+                <a16:creationId xmlns:a16="http://schemas.microsoft.com/office/drawing/2014/main" id="{14808221-C29B-07A3-B569-B8B466B1020B}"/>
               </a:ext>
             </a:extLst>
           </p:cNvPr>
@@ -9631,8 +10478,8 @@
         </p:nvSpPr>
         <p:spPr>
           <a:xfrm>
-            <a:off x="914399" y="365125"/>
-            <a:ext cx="10363201" cy="1629601"/>
+            <a:off x="6096000" y="375285"/>
+            <a:ext cx="4896678" cy="3624984"/>
           </a:xfrm>
         </p:spPr>
         <p:txBody>
@@ -9641,31 +10488,59 @@
           <a:p>
             <a:r>
               <a:rPr lang="en-US" dirty="0"/>
-              <a:t>Our competition</a:t>
+              <a:t>Product benefits</a:t>
             </a:r>
           </a:p>
         </p:txBody>
       </p:sp>
-      <p:sp>
-        <p:nvSpPr>
-          <p:cNvPr id="3" name="Content Placeholder 2">
+      <p:pic>
+        <p:nvPicPr>
+          <p:cNvPr id="5" name="Picture Placeholder 4" descr="A person standing in a greenhouse">
             <a:extLst>
               <a:ext uri="{FF2B5EF4-FFF2-40B4-BE49-F238E27FC236}">
-                <a16:creationId xmlns:a16="http://schemas.microsoft.com/office/drawing/2014/main" id="{375DADF2-8E4D-6C0E-0FA2-C5228AF29C1D}"/>
+                <a16:creationId xmlns:a16="http://schemas.microsoft.com/office/drawing/2014/main" id="{EE30546E-D63D-6DD8-4DA7-41DD51A44C2F}"/>
               </a:ext>
             </a:extLst>
           </p:cNvPr>
-          <p:cNvSpPr>
-            <a:spLocks noGrp="1"/>
-          </p:cNvSpPr>
-          <p:nvPr>
-            <p:ph sz="quarter" idx="10"/>
-          </p:nvPr>
-        </p:nvSpPr>
+          <p:cNvPicPr>
+            <a:picLocks noGrp="1" noChangeAspect="1"/>
+          </p:cNvPicPr>
+          <p:nvPr>
+            <p:ph type="pic" sz="quarter" idx="11"/>
+          </p:nvPr>
+        </p:nvPicPr>
+        <p:blipFill>
+          <a:blip r:embed="rId3"/>
+          <a:srcRect t="12487" b="12487"/>
+          <a:stretch/>
+        </p:blipFill>
         <p:spPr>
           <a:xfrm>
-            <a:off x="914399" y="2022250"/>
-            <a:ext cx="4992709" cy="3747180"/>
+            <a:off x="0" y="0"/>
+            <a:ext cx="6096000" cy="6858000"/>
+          </a:xfrm>
+        </p:spPr>
+      </p:pic>
+      <p:sp>
+        <p:nvSpPr>
+          <p:cNvPr id="3" name="Content Placeholder 2">
+            <a:extLst>
+              <a:ext uri="{FF2B5EF4-FFF2-40B4-BE49-F238E27FC236}">
+                <a16:creationId xmlns:a16="http://schemas.microsoft.com/office/drawing/2014/main" id="{D6BEA7D4-8B96-5A0E-252E-6B8E8B1CF178}"/>
+              </a:ext>
+            </a:extLst>
+          </p:cNvPr>
+          <p:cNvSpPr>
+            <a:spLocks noGrp="1"/>
+          </p:cNvSpPr>
+          <p:nvPr>
+            <p:ph sz="quarter" idx="10"/>
+          </p:nvPr>
+        </p:nvSpPr>
+        <p:spPr>
+          <a:xfrm>
+            <a:off x="6096000" y="4172990"/>
+            <a:ext cx="4896677" cy="2309726"/>
           </a:xfrm>
         </p:spPr>
         <p:txBody>
@@ -9674,107 +10549,15 @@
           <a:p>
             <a:r>
               <a:rPr lang="en-US" noProof="1"/>
-              <a:t>Our product is priced below that of other companies on the market</a:t>
-            </a:r>
-          </a:p>
-          <a:p>
-            <a:r>
-              <a:rPr lang="en-US" noProof="1"/>
-              <a:t>Design is simple and easy to use, compared to the complex designs of the competitors</a:t>
-            </a:r>
-          </a:p>
-          <a:p>
-            <a:r>
-              <a:rPr lang="en-US" noProof="1"/>
-              <a:t>Affordability is the main draw for our consumers to our product</a:t>
-            </a:r>
-          </a:p>
-        </p:txBody>
-      </p:sp>
-      <p:sp>
-        <p:nvSpPr>
-          <p:cNvPr id="4" name="Content Placeholder 3">
-            <a:extLst>
-              <a:ext uri="{FF2B5EF4-FFF2-40B4-BE49-F238E27FC236}">
-                <a16:creationId xmlns:a16="http://schemas.microsoft.com/office/drawing/2014/main" id="{2CFADA2D-CE7A-511E-45B9-EAF4FA520E34}"/>
-              </a:ext>
-            </a:extLst>
-          </p:cNvPr>
-          <p:cNvSpPr>
-            <a:spLocks noGrp="1"/>
-          </p:cNvSpPr>
-          <p:nvPr>
-            <p:ph sz="quarter" idx="11"/>
-          </p:nvPr>
-        </p:nvSpPr>
-        <p:spPr>
-          <a:xfrm>
-            <a:off x="6284891" y="2022250"/>
-            <a:ext cx="4992709" cy="3747180"/>
-          </a:xfrm>
-        </p:spPr>
-        <p:txBody>
-          <a:bodyPr/>
-          <a:lstStyle/>
-          <a:p>
-            <a:r>
-              <a:rPr lang="en-US" noProof="1"/>
-              <a:t>Company A product is more expensive</a:t>
-            </a:r>
-          </a:p>
-          <a:p>
-            <a:r>
-              <a:rPr lang="en-US" noProof="1"/>
-              <a:t>Companies B &amp; C product is expensive and inconvenient to use</a:t>
-            </a:r>
-          </a:p>
-          <a:p>
-            <a:r>
-              <a:rPr lang="en-US" noProof="1"/>
-              <a:t>Companies D &amp; E product is affordable, but inconvenient to use</a:t>
-            </a:r>
-          </a:p>
-        </p:txBody>
-      </p:sp>
-      <p:sp>
-        <p:nvSpPr>
-          <p:cNvPr id="5" name="Slide Number Placeholder 4">
-            <a:extLst>
-              <a:ext uri="{FF2B5EF4-FFF2-40B4-BE49-F238E27FC236}">
-                <a16:creationId xmlns:a16="http://schemas.microsoft.com/office/drawing/2014/main" id="{FD4FFC83-A1E8-FCEA-2C47-38C5ADAEA1CA}"/>
-              </a:ext>
-            </a:extLst>
-          </p:cNvPr>
-          <p:cNvSpPr>
-            <a:spLocks noGrp="1"/>
-          </p:cNvSpPr>
-          <p:nvPr>
-            <p:ph type="sldNum" sz="quarter" idx="4"/>
-          </p:nvPr>
-        </p:nvSpPr>
-        <p:spPr>
-          <a:xfrm>
-            <a:off x="914400" y="6246254"/>
-            <a:ext cx="631065" cy="296214"/>
-          </a:xfrm>
-        </p:spPr>
-        <p:txBody>
-          <a:bodyPr/>
-          <a:lstStyle/>
-          <a:p>
-            <a:fld id="{B5CEABB6-07DC-46E8-9B57-56EC44A396E5}" type="slidenum">
-              <a:rPr lang="en-US" smtClean="0"/>
-              <a:pPr/>
-              <a:t>7</a:t>
-            </a:fld>
-            <a:endParaRPr lang="en-US" dirty="0"/>
+              <a:t>Online store and market swap</a:t>
+            </a:r>
           </a:p>
         </p:txBody>
       </p:sp>
     </p:spTree>
     <p:extLst>
       <p:ext uri="{BB962C8B-B14F-4D97-AF65-F5344CB8AC3E}">
-        <p14:creationId xmlns:p14="http://schemas.microsoft.com/office/powerpoint/2010/main" val="430403476"/>
+        <p14:creationId xmlns:p14="http://schemas.microsoft.com/office/powerpoint/2010/main" val="1760417424"/>
       </p:ext>
     </p:extLst>
   </p:cSld>
@@ -9806,7 +10589,7 @@
           <p:cNvPr id="2" name="Title 1">
             <a:extLst>
               <a:ext uri="{FF2B5EF4-FFF2-40B4-BE49-F238E27FC236}">
-                <a16:creationId xmlns:a16="http://schemas.microsoft.com/office/drawing/2014/main" id="{6DBDB0AE-5ADD-1975-6BDD-38608925072A}"/>
+                <a16:creationId xmlns:a16="http://schemas.microsoft.com/office/drawing/2014/main" id="{F992D586-3F7C-3202-E4F4-1F65B9A7D428}"/>
               </a:ext>
             </a:extLst>
           </p:cNvPr>
@@ -9819,8 +10602,8 @@
         </p:nvSpPr>
         <p:spPr>
           <a:xfrm>
-            <a:off x="914398" y="365125"/>
-            <a:ext cx="10439401" cy="1617017"/>
+            <a:off x="914399" y="365125"/>
+            <a:ext cx="10363201" cy="1629601"/>
           </a:xfrm>
         </p:spPr>
         <p:txBody>
@@ -9829,7 +10612,7 @@
           <a:p>
             <a:r>
               <a:rPr lang="en-US" dirty="0"/>
-              <a:t>Product overview </a:t>
+              <a:t>Our competition</a:t>
             </a:r>
           </a:p>
         </p:txBody>
@@ -9839,7 +10622,7 @@
           <p:cNvPr id="3" name="Content Placeholder 2">
             <a:extLst>
               <a:ext uri="{FF2B5EF4-FFF2-40B4-BE49-F238E27FC236}">
-                <a16:creationId xmlns:a16="http://schemas.microsoft.com/office/drawing/2014/main" id="{E374C67C-D286-74AE-086C-3E45FF9D9542}"/>
+                <a16:creationId xmlns:a16="http://schemas.microsoft.com/office/drawing/2014/main" id="{375DADF2-8E4D-6C0E-0FA2-C5228AF29C1D}"/>
               </a:ext>
             </a:extLst>
           </p:cNvPr>
@@ -9853,7 +10636,7 @@
         <p:spPr>
           <a:xfrm>
             <a:off x="914399" y="2022250"/>
-            <a:ext cx="3310129" cy="3747180"/>
+            <a:ext cx="4992709" cy="3747180"/>
           </a:xfrm>
         </p:spPr>
         <p:txBody>
@@ -9861,26 +10644,20 @@
           <a:lstStyle/>
           <a:p>
             <a:r>
-              <a:rPr lang="en-US" dirty="0"/>
-              <a:t>Unique</a:t>
-            </a:r>
-          </a:p>
-          <a:p>
-            <a:r>
-              <a:rPr lang="en-US" dirty="0"/>
-              <a:t>First to market</a:t>
-            </a:r>
-          </a:p>
-          <a:p>
-            <a:r>
-              <a:rPr lang="en-US" dirty="0"/>
-              <a:t>Tested</a:t>
-            </a:r>
-          </a:p>
-          <a:p>
-            <a:r>
-              <a:rPr lang="en-US" dirty="0"/>
-              <a:t>Authentic</a:t>
+              <a:rPr lang="en-US" noProof="1"/>
+              <a:t>Our product is priced below that of other companies on the market</a:t>
+            </a:r>
+          </a:p>
+          <a:p>
+            <a:r>
+              <a:rPr lang="en-US" noProof="1"/>
+              <a:t>Design is simple and easy to use, compared to the complex designs of the competitors</a:t>
+            </a:r>
+          </a:p>
+          <a:p>
+            <a:r>
+              <a:rPr lang="en-US" noProof="1"/>
+              <a:t>Affordability is the main draw for our consumers to our product</a:t>
             </a:r>
           </a:p>
         </p:txBody>
@@ -9890,7 +10667,7 @@
           <p:cNvPr id="4" name="Content Placeholder 3">
             <a:extLst>
               <a:ext uri="{FF2B5EF4-FFF2-40B4-BE49-F238E27FC236}">
-                <a16:creationId xmlns:a16="http://schemas.microsoft.com/office/drawing/2014/main" id="{701C2F4A-ABC8-39B2-B7BB-36C02B7A4540}"/>
+                <a16:creationId xmlns:a16="http://schemas.microsoft.com/office/drawing/2014/main" id="{2CFADA2D-CE7A-511E-45B9-EAF4FA520E34}"/>
               </a:ext>
             </a:extLst>
           </p:cNvPr>
@@ -9903,8 +10680,8 @@
         </p:nvSpPr>
         <p:spPr>
           <a:xfrm>
-            <a:off x="4602310" y="2018120"/>
-            <a:ext cx="6751489" cy="3747180"/>
+            <a:off x="6284891" y="2022250"/>
+            <a:ext cx="4992709" cy="3747180"/>
           </a:xfrm>
         </p:spPr>
         <p:txBody>
@@ -9912,26 +10689,20 @@
           <a:lstStyle/>
           <a:p>
             <a:r>
-              <a:rPr lang="en-US" dirty="0"/>
-              <a:t>Only product specifically dedicated to this niche market</a:t>
-            </a:r>
-          </a:p>
-          <a:p>
-            <a:r>
-              <a:rPr lang="en-US" dirty="0"/>
-              <a:t>First beautifully designed product that's both stylish and functional</a:t>
-            </a:r>
-          </a:p>
-          <a:p>
-            <a:r>
-              <a:rPr lang="en-US" dirty="0"/>
-              <a:t>Conducted testing with college students in the area</a:t>
-            </a:r>
-          </a:p>
-          <a:p>
-            <a:r>
-              <a:rPr lang="en-US" dirty="0"/>
-              <a:t>Designed with the help and input of experts in the field </a:t>
+              <a:rPr lang="en-US" noProof="1"/>
+              <a:t>Company A product is more expensive</a:t>
+            </a:r>
+          </a:p>
+          <a:p>
+            <a:r>
+              <a:rPr lang="en-US" noProof="1"/>
+              <a:t>Companies B &amp; C product is expensive and inconvenient to use</a:t>
+            </a:r>
+          </a:p>
+          <a:p>
+            <a:r>
+              <a:rPr lang="en-US" noProof="1"/>
+              <a:t>Companies D &amp; E product is affordable, but inconvenient to use</a:t>
             </a:r>
           </a:p>
         </p:txBody>
@@ -9941,7 +10712,7 @@
           <p:cNvPr id="5" name="Slide Number Placeholder 4">
             <a:extLst>
               <a:ext uri="{FF2B5EF4-FFF2-40B4-BE49-F238E27FC236}">
-                <a16:creationId xmlns:a16="http://schemas.microsoft.com/office/drawing/2014/main" id="{4D27E5DB-AFB6-9088-87C9-1F671C0B0330}"/>
+                <a16:creationId xmlns:a16="http://schemas.microsoft.com/office/drawing/2014/main" id="{FD4FFC83-A1E8-FCEA-2C47-38C5ADAEA1CA}"/>
               </a:ext>
             </a:extLst>
           </p:cNvPr>
@@ -9974,7 +10745,7 @@
     </p:spTree>
     <p:extLst>
       <p:ext uri="{BB962C8B-B14F-4D97-AF65-F5344CB8AC3E}">
-        <p14:creationId xmlns:p14="http://schemas.microsoft.com/office/powerpoint/2010/main" val="569699605"/>
+        <p14:creationId xmlns:p14="http://schemas.microsoft.com/office/powerpoint/2010/main" val="430403476"/>
       </p:ext>
     </p:extLst>
   </p:cSld>
@@ -10006,7 +10777,7 @@
           <p:cNvPr id="2" name="Title 1">
             <a:extLst>
               <a:ext uri="{FF2B5EF4-FFF2-40B4-BE49-F238E27FC236}">
-                <a16:creationId xmlns:a16="http://schemas.microsoft.com/office/drawing/2014/main" id="{56FEAA13-E02F-EB47-E510-E3F48A95F847}"/>
+                <a16:creationId xmlns:a16="http://schemas.microsoft.com/office/drawing/2014/main" id="{6DBDB0AE-5ADD-1975-6BDD-38608925072A}"/>
               </a:ext>
             </a:extLst>
           </p:cNvPr>
@@ -10019,8 +10790,8 @@
         </p:nvSpPr>
         <p:spPr>
           <a:xfrm>
-            <a:off x="916385" y="446313"/>
-            <a:ext cx="5179615" cy="1448747"/>
+            <a:off x="914398" y="365125"/>
+            <a:ext cx="10439401" cy="1617017"/>
           </a:xfrm>
         </p:spPr>
         <p:txBody>
@@ -10029,7 +10800,7 @@
           <a:p>
             <a:r>
               <a:rPr lang="en-US" dirty="0"/>
-              <a:t>Growth strategy</a:t>
+              <a:t>Product overview </a:t>
             </a:r>
           </a:p>
         </p:txBody>
@@ -10039,7 +10810,7 @@
           <p:cNvPr id="3" name="Content Placeholder 2">
             <a:extLst>
               <a:ext uri="{FF2B5EF4-FFF2-40B4-BE49-F238E27FC236}">
-                <a16:creationId xmlns:a16="http://schemas.microsoft.com/office/drawing/2014/main" id="{05E26637-007F-EC9E-F644-AAFBA0900F3C}"/>
+                <a16:creationId xmlns:a16="http://schemas.microsoft.com/office/drawing/2014/main" id="{E374C67C-D286-74AE-086C-3E45FF9D9542}"/>
               </a:ext>
             </a:extLst>
           </p:cNvPr>
@@ -10053,7 +10824,7 @@
         <p:spPr>
           <a:xfrm>
             <a:off x="914399" y="2022250"/>
-            <a:ext cx="5181600" cy="3747180"/>
+            <a:ext cx="3310129" cy="3747180"/>
           </a:xfrm>
         </p:spPr>
         <p:txBody>
@@ -10061,42 +10832,87 @@
           <a:lstStyle/>
           <a:p>
             <a:r>
-              <a:rPr lang="en-US" b="1" dirty="0"/>
-              <a:t>Feb 20XX: </a:t>
-            </a:r>
-            <a:r>
               <a:rPr lang="en-US" dirty="0"/>
-              <a:t>roll out product to high profile or top-level participants to help establish the product</a:t>
-            </a:r>
-          </a:p>
-          <a:p>
-            <a:r>
-              <a:rPr lang="en-US" b="1" dirty="0"/>
-              <a:t>May 20XX: </a:t>
-            </a:r>
+              <a:t>Unique</a:t>
+            </a:r>
+          </a:p>
+          <a:p>
             <a:r>
               <a:rPr lang="en-US" dirty="0"/>
-              <a:t>release the product to the public and monitor press release and social media accounts</a:t>
-            </a:r>
-          </a:p>
-          <a:p>
-            <a:r>
-              <a:rPr lang="en-US" b="1" dirty="0"/>
-              <a:t>Oct 20XX: </a:t>
-            </a:r>
+              <a:t>First to market</a:t>
+            </a:r>
+          </a:p>
+          <a:p>
             <a:r>
               <a:rPr lang="en-US" dirty="0"/>
-              <a:t>gather feedback and adjust product design as necessary</a:t>
+              <a:t>Tested</a:t>
+            </a:r>
+          </a:p>
+          <a:p>
+            <a:r>
+              <a:rPr lang="en-US" dirty="0"/>
+              <a:t>Authentic</a:t>
             </a:r>
           </a:p>
         </p:txBody>
       </p:sp>
       <p:sp>
         <p:nvSpPr>
+          <p:cNvPr id="4" name="Content Placeholder 3">
+            <a:extLst>
+              <a:ext uri="{FF2B5EF4-FFF2-40B4-BE49-F238E27FC236}">
+                <a16:creationId xmlns:a16="http://schemas.microsoft.com/office/drawing/2014/main" id="{701C2F4A-ABC8-39B2-B7BB-36C02B7A4540}"/>
+              </a:ext>
+            </a:extLst>
+          </p:cNvPr>
+          <p:cNvSpPr>
+            <a:spLocks noGrp="1"/>
+          </p:cNvSpPr>
+          <p:nvPr>
+            <p:ph sz="quarter" idx="11"/>
+          </p:nvPr>
+        </p:nvSpPr>
+        <p:spPr>
+          <a:xfrm>
+            <a:off x="4602310" y="2018120"/>
+            <a:ext cx="6751489" cy="3747180"/>
+          </a:xfrm>
+        </p:spPr>
+        <p:txBody>
+          <a:bodyPr/>
+          <a:lstStyle/>
+          <a:p>
+            <a:r>
+              <a:rPr lang="en-US" dirty="0"/>
+              <a:t>Only product specifically dedicated to this niche market</a:t>
+            </a:r>
+          </a:p>
+          <a:p>
+            <a:r>
+              <a:rPr lang="en-US" dirty="0"/>
+              <a:t>First beautifully designed product that's both stylish and functional</a:t>
+            </a:r>
+          </a:p>
+          <a:p>
+            <a:r>
+              <a:rPr lang="en-US" dirty="0"/>
+              <a:t>Conducted testing with college students in the area</a:t>
+            </a:r>
+          </a:p>
+          <a:p>
+            <a:r>
+              <a:rPr lang="en-US" dirty="0"/>
+              <a:t>Designed with the help and input of experts in the field </a:t>
+            </a:r>
+          </a:p>
+        </p:txBody>
+      </p:sp>
+      <p:sp>
+        <p:nvSpPr>
           <p:cNvPr id="5" name="Slide Number Placeholder 4">
             <a:extLst>
               <a:ext uri="{FF2B5EF4-FFF2-40B4-BE49-F238E27FC236}">
-                <a16:creationId xmlns:a16="http://schemas.microsoft.com/office/drawing/2014/main" id="{1DDD930B-FB1B-543D-6828-8C31F30BBD28}"/>
+                <a16:creationId xmlns:a16="http://schemas.microsoft.com/office/drawing/2014/main" id="{4D27E5DB-AFB6-9088-87C9-1F671C0B0330}"/>
               </a:ext>
             </a:extLst>
           </p:cNvPr>
@@ -10126,38 +10942,10 @@
           </a:p>
         </p:txBody>
       </p:sp>
-      <p:pic>
-        <p:nvPicPr>
-          <p:cNvPr id="18" name="Picture Placeholder 17" descr="Two people looking at their phones">
-            <a:extLst>
-              <a:ext uri="{FF2B5EF4-FFF2-40B4-BE49-F238E27FC236}">
-                <a16:creationId xmlns:a16="http://schemas.microsoft.com/office/drawing/2014/main" id="{1609D79A-E8EF-302E-E8CA-07C644CE0E0F}"/>
-              </a:ext>
-            </a:extLst>
-          </p:cNvPr>
-          <p:cNvPicPr>
-            <a:picLocks noGrp="1" noChangeAspect="1"/>
-          </p:cNvPicPr>
-          <p:nvPr>
-            <p:ph type="pic" sz="quarter" idx="11"/>
-          </p:nvPr>
-        </p:nvPicPr>
-        <p:blipFill>
-          <a:blip r:embed="rId3"/>
-          <a:srcRect l="81" r="81"/>
-          <a:stretch/>
-        </p:blipFill>
-        <p:spPr>
-          <a:xfrm>
-            <a:off x="6076950" y="0"/>
-            <a:ext cx="6115050" cy="6868886"/>
-          </a:xfrm>
-        </p:spPr>
-      </p:pic>
     </p:spTree>
     <p:extLst>
       <p:ext uri="{BB962C8B-B14F-4D97-AF65-F5344CB8AC3E}">
-        <p14:creationId xmlns:p14="http://schemas.microsoft.com/office/powerpoint/2010/main" val="1517447069"/>
+        <p14:creationId xmlns:p14="http://schemas.microsoft.com/office/powerpoint/2010/main" val="569699605"/>
       </p:ext>
     </p:extLst>
   </p:cSld>
@@ -10959,6 +11747,15 @@
 </file>
 
 <file path=customXml/item1.xml><?xml version="1.0" encoding="utf-8"?>
+<?mso-contentType ?>
+<FormTemplates xmlns="http://schemas.microsoft.com/sharepoint/v3/contenttype/forms">
+  <Display>DocumentLibraryForm</Display>
+  <Edit>DocumentLibraryForm</Edit>
+  <New>DocumentLibraryForm</New>
+</FormTemplates>
+</file>
+
+<file path=customXml/item2.xml><?xml version="1.0" encoding="utf-8"?>
 <p:properties xmlns:p="http://schemas.microsoft.com/office/2006/metadata/properties" xmlns:xsi="http://www.w3.org/2001/XMLSchema-instance" xmlns:pc="http://schemas.microsoft.com/office/infopath/2007/PartnerControls">
   <documentManagement>
     <_ip_UnifiedCompliancePolicyUIAction xmlns="http://schemas.microsoft.com/sharepoint/v3" xsi:nil="true"/>
@@ -10976,15 +11773,6 @@
     <MediaServiceKeyPoints xmlns="71af3243-3dd4-4a8d-8c0d-dd76da1f02a5" xsi:nil="true"/>
   </documentManagement>
 </p:properties>
-</file>
-
-<file path=customXml/item2.xml><?xml version="1.0" encoding="utf-8"?>
-<?mso-contentType ?>
-<FormTemplates xmlns="http://schemas.microsoft.com/sharepoint/v3/contenttype/forms">
-  <Display>DocumentLibraryForm</Display>
-  <Edit>DocumentLibraryForm</Edit>
-  <New>DocumentLibraryForm</New>
-</FormTemplates>
 </file>
 
 <file path=customXml/item3.xml><?xml version="1.0" encoding="utf-8"?>
@@ -11300,6 +12088,14 @@
 </file>
 
 <file path=customXml/itemProps1.xml><?xml version="1.0" encoding="utf-8"?>
+<ds:datastoreItem xmlns:ds="http://schemas.openxmlformats.org/officeDocument/2006/customXml" ds:itemID="{B7B39BD0-040C-43BE-B0E4-512B09E8003F}">
+  <ds:schemaRefs>
+    <ds:schemaRef ds:uri="http://schemas.microsoft.com/sharepoint/v3/contenttype/forms"/>
+  </ds:schemaRefs>
+</ds:datastoreItem>
+</file>
+
+<file path=customXml/itemProps2.xml><?xml version="1.0" encoding="utf-8"?>
 <ds:datastoreItem xmlns:ds="http://schemas.openxmlformats.org/officeDocument/2006/customXml" ds:itemID="{AB045227-5724-4DBF-9712-031B1BFB2C3C}">
   <ds:schemaRefs>
     <ds:schemaRef ds:uri="http://schemas.microsoft.com/office/2006/metadata/properties"/>
@@ -11307,14 +12103,6 @@
     <ds:schemaRef ds:uri="http://schemas.microsoft.com/sharepoint/v3"/>
     <ds:schemaRef ds:uri="71af3243-3dd4-4a8d-8c0d-dd76da1f02a5"/>
     <ds:schemaRef ds:uri="230e9df3-be65-4c73-a93b-d1236ebd677e"/>
-  </ds:schemaRefs>
-</ds:datastoreItem>
-</file>
-
-<file path=customXml/itemProps2.xml><?xml version="1.0" encoding="utf-8"?>
-<ds:datastoreItem xmlns:ds="http://schemas.openxmlformats.org/officeDocument/2006/customXml" ds:itemID="{B7B39BD0-040C-43BE-B0E4-512B09E8003F}">
-  <ds:schemaRefs>
-    <ds:schemaRef ds:uri="http://schemas.microsoft.com/sharepoint/v3/contenttype/forms"/>
   </ds:schemaRefs>
 </ds:datastoreItem>
 </file>

</xml_diff>

<commit_message>
problem explanation slide progress
</commit_message>
<xml_diff>
--- a/presentations/TeamNAMETSP.pptx
+++ b/presentations/TeamNAMETSP.pptx
@@ -78,13 +78,13 @@
         </a:solidFill>
         <a:effectLst/>
         <a:uFillTx/>
-        <a:latin typeface="Tenorite"/>
-        <a:ea typeface="Tenorite"/>
-        <a:cs typeface="Tenorite"/>
-        <a:sym typeface="Tenorite"/>
+        <a:latin typeface="+mj-lt"/>
+        <a:ea typeface="+mj-ea"/>
+        <a:cs typeface="+mj-cs"/>
+        <a:sym typeface="Calibri"/>
       </a:defRPr>
     </a:lvl1pPr>
-    <a:lvl2pPr marL="0" marR="0" indent="457200" algn="l" defTabSz="914400" rtl="0" fontAlgn="auto" latinLnBrk="0" hangingPunct="0">
+    <a:lvl2pPr marL="0" marR="0" indent="0" algn="l" defTabSz="914400" rtl="0" fontAlgn="auto" latinLnBrk="0" hangingPunct="0">
       <a:lnSpc>
         <a:spcPct val="100000"/>
       </a:lnSpc>
@@ -108,13 +108,13 @@
         </a:solidFill>
         <a:effectLst/>
         <a:uFillTx/>
-        <a:latin typeface="Tenorite"/>
-        <a:ea typeface="Tenorite"/>
-        <a:cs typeface="Tenorite"/>
-        <a:sym typeface="Tenorite"/>
+        <a:latin typeface="+mj-lt"/>
+        <a:ea typeface="+mj-ea"/>
+        <a:cs typeface="+mj-cs"/>
+        <a:sym typeface="Calibri"/>
       </a:defRPr>
     </a:lvl2pPr>
-    <a:lvl3pPr marL="0" marR="0" indent="914400" algn="l" defTabSz="914400" rtl="0" fontAlgn="auto" latinLnBrk="0" hangingPunct="0">
+    <a:lvl3pPr marL="0" marR="0" indent="0" algn="l" defTabSz="914400" rtl="0" fontAlgn="auto" latinLnBrk="0" hangingPunct="0">
       <a:lnSpc>
         <a:spcPct val="100000"/>
       </a:lnSpc>
@@ -138,13 +138,13 @@
         </a:solidFill>
         <a:effectLst/>
         <a:uFillTx/>
-        <a:latin typeface="Tenorite"/>
-        <a:ea typeface="Tenorite"/>
-        <a:cs typeface="Tenorite"/>
-        <a:sym typeface="Tenorite"/>
+        <a:latin typeface="+mj-lt"/>
+        <a:ea typeface="+mj-ea"/>
+        <a:cs typeface="+mj-cs"/>
+        <a:sym typeface="Calibri"/>
       </a:defRPr>
     </a:lvl3pPr>
-    <a:lvl4pPr marL="0" marR="0" indent="1371600" algn="l" defTabSz="914400" rtl="0" fontAlgn="auto" latinLnBrk="0" hangingPunct="0">
+    <a:lvl4pPr marL="0" marR="0" indent="0" algn="l" defTabSz="914400" rtl="0" fontAlgn="auto" latinLnBrk="0" hangingPunct="0">
       <a:lnSpc>
         <a:spcPct val="100000"/>
       </a:lnSpc>
@@ -168,13 +168,13 @@
         </a:solidFill>
         <a:effectLst/>
         <a:uFillTx/>
-        <a:latin typeface="Tenorite"/>
-        <a:ea typeface="Tenorite"/>
-        <a:cs typeface="Tenorite"/>
-        <a:sym typeface="Tenorite"/>
+        <a:latin typeface="+mj-lt"/>
+        <a:ea typeface="+mj-ea"/>
+        <a:cs typeface="+mj-cs"/>
+        <a:sym typeface="Calibri"/>
       </a:defRPr>
     </a:lvl4pPr>
-    <a:lvl5pPr marL="0" marR="0" indent="1828800" algn="l" defTabSz="914400" rtl="0" fontAlgn="auto" latinLnBrk="0" hangingPunct="0">
+    <a:lvl5pPr marL="0" marR="0" indent="0" algn="l" defTabSz="914400" rtl="0" fontAlgn="auto" latinLnBrk="0" hangingPunct="0">
       <a:lnSpc>
         <a:spcPct val="100000"/>
       </a:lnSpc>
@@ -198,13 +198,13 @@
         </a:solidFill>
         <a:effectLst/>
         <a:uFillTx/>
-        <a:latin typeface="Tenorite"/>
-        <a:ea typeface="Tenorite"/>
-        <a:cs typeface="Tenorite"/>
-        <a:sym typeface="Tenorite"/>
+        <a:latin typeface="+mj-lt"/>
+        <a:ea typeface="+mj-ea"/>
+        <a:cs typeface="+mj-cs"/>
+        <a:sym typeface="Calibri"/>
       </a:defRPr>
     </a:lvl5pPr>
-    <a:lvl6pPr marL="0" marR="0" indent="2286000" algn="l" defTabSz="914400" rtl="0" fontAlgn="auto" latinLnBrk="0" hangingPunct="0">
+    <a:lvl6pPr marL="0" marR="0" indent="0" algn="l" defTabSz="914400" rtl="0" fontAlgn="auto" latinLnBrk="0" hangingPunct="0">
       <a:lnSpc>
         <a:spcPct val="100000"/>
       </a:lnSpc>
@@ -228,13 +228,13 @@
         </a:solidFill>
         <a:effectLst/>
         <a:uFillTx/>
-        <a:latin typeface="Tenorite"/>
-        <a:ea typeface="Tenorite"/>
-        <a:cs typeface="Tenorite"/>
-        <a:sym typeface="Tenorite"/>
+        <a:latin typeface="+mj-lt"/>
+        <a:ea typeface="+mj-ea"/>
+        <a:cs typeface="+mj-cs"/>
+        <a:sym typeface="Calibri"/>
       </a:defRPr>
     </a:lvl6pPr>
-    <a:lvl7pPr marL="0" marR="0" indent="2743200" algn="l" defTabSz="914400" rtl="0" fontAlgn="auto" latinLnBrk="0" hangingPunct="0">
+    <a:lvl7pPr marL="0" marR="0" indent="0" algn="l" defTabSz="914400" rtl="0" fontAlgn="auto" latinLnBrk="0" hangingPunct="0">
       <a:lnSpc>
         <a:spcPct val="100000"/>
       </a:lnSpc>
@@ -258,13 +258,13 @@
         </a:solidFill>
         <a:effectLst/>
         <a:uFillTx/>
-        <a:latin typeface="Tenorite"/>
-        <a:ea typeface="Tenorite"/>
-        <a:cs typeface="Tenorite"/>
-        <a:sym typeface="Tenorite"/>
+        <a:latin typeface="+mj-lt"/>
+        <a:ea typeface="+mj-ea"/>
+        <a:cs typeface="+mj-cs"/>
+        <a:sym typeface="Calibri"/>
       </a:defRPr>
     </a:lvl7pPr>
-    <a:lvl8pPr marL="0" marR="0" indent="3200400" algn="l" defTabSz="914400" rtl="0" fontAlgn="auto" latinLnBrk="0" hangingPunct="0">
+    <a:lvl8pPr marL="0" marR="0" indent="0" algn="l" defTabSz="914400" rtl="0" fontAlgn="auto" latinLnBrk="0" hangingPunct="0">
       <a:lnSpc>
         <a:spcPct val="100000"/>
       </a:lnSpc>
@@ -288,13 +288,13 @@
         </a:solidFill>
         <a:effectLst/>
         <a:uFillTx/>
-        <a:latin typeface="Tenorite"/>
-        <a:ea typeface="Tenorite"/>
-        <a:cs typeface="Tenorite"/>
-        <a:sym typeface="Tenorite"/>
+        <a:latin typeface="+mj-lt"/>
+        <a:ea typeface="+mj-ea"/>
+        <a:cs typeface="+mj-cs"/>
+        <a:sym typeface="Calibri"/>
       </a:defRPr>
     </a:lvl8pPr>
-    <a:lvl9pPr marL="0" marR="0" indent="3657600" algn="l" defTabSz="914400" rtl="0" fontAlgn="auto" latinLnBrk="0" hangingPunct="0">
+    <a:lvl9pPr marL="0" marR="0" indent="0" algn="l" defTabSz="914400" rtl="0" fontAlgn="auto" latinLnBrk="0" hangingPunct="0">
       <a:lnSpc>
         <a:spcPct val="100000"/>
       </a:lnSpc>
@@ -318,10 +318,10 @@
         </a:solidFill>
         <a:effectLst/>
         <a:uFillTx/>
-        <a:latin typeface="Tenorite"/>
-        <a:ea typeface="Tenorite"/>
-        <a:cs typeface="Tenorite"/>
-        <a:sym typeface="Tenorite"/>
+        <a:latin typeface="+mj-lt"/>
+        <a:ea typeface="+mj-ea"/>
+        <a:cs typeface="+mj-cs"/>
+        <a:sym typeface="Calibri"/>
       </a:defRPr>
     </a:lvl9pPr>
   </p:defaultTextStyle>
@@ -405,73 +405,73 @@
   <p:notesStyle>
     <a:lvl1pPr latinLnBrk="0">
       <a:defRPr sz="1200">
-        <a:latin typeface="+mn-lt"/>
-        <a:ea typeface="+mn-ea"/>
-        <a:cs typeface="+mn-cs"/>
+        <a:latin typeface="+mj-lt"/>
+        <a:ea typeface="+mj-ea"/>
+        <a:cs typeface="+mj-cs"/>
         <a:sym typeface="Calibri"/>
       </a:defRPr>
     </a:lvl1pPr>
     <a:lvl2pPr indent="228600" latinLnBrk="0">
       <a:defRPr sz="1200">
-        <a:latin typeface="+mn-lt"/>
-        <a:ea typeface="+mn-ea"/>
-        <a:cs typeface="+mn-cs"/>
+        <a:latin typeface="+mj-lt"/>
+        <a:ea typeface="+mj-ea"/>
+        <a:cs typeface="+mj-cs"/>
         <a:sym typeface="Calibri"/>
       </a:defRPr>
     </a:lvl2pPr>
     <a:lvl3pPr indent="457200" latinLnBrk="0">
       <a:defRPr sz="1200">
-        <a:latin typeface="+mn-lt"/>
-        <a:ea typeface="+mn-ea"/>
-        <a:cs typeface="+mn-cs"/>
+        <a:latin typeface="+mj-lt"/>
+        <a:ea typeface="+mj-ea"/>
+        <a:cs typeface="+mj-cs"/>
         <a:sym typeface="Calibri"/>
       </a:defRPr>
     </a:lvl3pPr>
     <a:lvl4pPr indent="685800" latinLnBrk="0">
       <a:defRPr sz="1200">
-        <a:latin typeface="+mn-lt"/>
-        <a:ea typeface="+mn-ea"/>
-        <a:cs typeface="+mn-cs"/>
+        <a:latin typeface="+mj-lt"/>
+        <a:ea typeface="+mj-ea"/>
+        <a:cs typeface="+mj-cs"/>
         <a:sym typeface="Calibri"/>
       </a:defRPr>
     </a:lvl4pPr>
     <a:lvl5pPr indent="914400" latinLnBrk="0">
       <a:defRPr sz="1200">
-        <a:latin typeface="+mn-lt"/>
-        <a:ea typeface="+mn-ea"/>
-        <a:cs typeface="+mn-cs"/>
+        <a:latin typeface="+mj-lt"/>
+        <a:ea typeface="+mj-ea"/>
+        <a:cs typeface="+mj-cs"/>
         <a:sym typeface="Calibri"/>
       </a:defRPr>
     </a:lvl5pPr>
     <a:lvl6pPr indent="1143000" latinLnBrk="0">
       <a:defRPr sz="1200">
-        <a:latin typeface="+mn-lt"/>
-        <a:ea typeface="+mn-ea"/>
-        <a:cs typeface="+mn-cs"/>
+        <a:latin typeface="+mj-lt"/>
+        <a:ea typeface="+mj-ea"/>
+        <a:cs typeface="+mj-cs"/>
         <a:sym typeface="Calibri"/>
       </a:defRPr>
     </a:lvl6pPr>
     <a:lvl7pPr indent="1371600" latinLnBrk="0">
       <a:defRPr sz="1200">
-        <a:latin typeface="+mn-lt"/>
-        <a:ea typeface="+mn-ea"/>
-        <a:cs typeface="+mn-cs"/>
+        <a:latin typeface="+mj-lt"/>
+        <a:ea typeface="+mj-ea"/>
+        <a:cs typeface="+mj-cs"/>
         <a:sym typeface="Calibri"/>
       </a:defRPr>
     </a:lvl7pPr>
     <a:lvl8pPr indent="1600200" latinLnBrk="0">
       <a:defRPr sz="1200">
-        <a:latin typeface="+mn-lt"/>
-        <a:ea typeface="+mn-ea"/>
-        <a:cs typeface="+mn-cs"/>
+        <a:latin typeface="+mj-lt"/>
+        <a:ea typeface="+mj-ea"/>
+        <a:cs typeface="+mj-cs"/>
         <a:sym typeface="Calibri"/>
       </a:defRPr>
     </a:lvl8pPr>
     <a:lvl9pPr indent="1828800" latinLnBrk="0">
       <a:defRPr sz="1200">
-        <a:latin typeface="+mn-lt"/>
-        <a:ea typeface="+mn-ea"/>
-        <a:cs typeface="+mn-cs"/>
+        <a:latin typeface="+mj-lt"/>
+        <a:ea typeface="+mj-ea"/>
+        <a:cs typeface="+mj-cs"/>
         <a:sym typeface="Calibri"/>
       </a:defRPr>
     </a:lvl9pPr>
@@ -514,7 +514,7 @@
         <p:spPr>
           <a:xfrm>
             <a:off x="6096000" y="2773681"/>
-            <a:ext cx="5674360" cy="3200401"/>
+            <a:ext cx="5674360" cy="3200403"/>
           </a:xfrm>
           <a:prstGeom prst="rect">
             <a:avLst/>
@@ -558,8 +558,8 @@
         </p:blipFill>
         <p:spPr>
           <a:xfrm>
-            <a:off x="-2" y="0"/>
-            <a:ext cx="8264996" cy="5320146"/>
+            <a:off x="-4" y="0"/>
+            <a:ext cx="8264999" cy="5320146"/>
           </a:xfrm>
           <a:prstGeom prst="rect">
             <a:avLst/>
@@ -579,8 +579,8 @@
         </p:nvSpPr>
         <p:spPr>
           <a:xfrm>
-            <a:off x="5892800" y="6172200"/>
-            <a:ext cx="2844800" cy="368301"/>
+            <a:off x="8506328" y="6240782"/>
+            <a:ext cx="231273" cy="231137"/>
           </a:xfrm>
           <a:prstGeom prst="rect">
             <a:avLst/>
@@ -681,7 +681,7 @@
           </a:ln>
         </p:spPr>
         <p:txBody>
-          <a:bodyPr lIns="45719" rIns="45719" anchor="ctr"/>
+          <a:bodyPr lIns="45718" tIns="45718" rIns="45718" bIns="45718" anchor="ctr"/>
           <a:lstStyle/>
           <a:p>
             <a:pPr algn="ctr">
@@ -689,6 +689,10 @@
                 <a:solidFill>
                   <a:srgbClr val="FFFFFF"/>
                 </a:solidFill>
+                <a:latin typeface="Tenorite"/>
+                <a:ea typeface="Tenorite"/>
+                <a:cs typeface="Tenorite"/>
+                <a:sym typeface="Tenorite"/>
               </a:defRPr>
             </a:pPr>
           </a:p>
@@ -735,7 +739,7 @@
         <p:spPr>
           <a:xfrm>
             <a:off x="914399" y="365125"/>
-            <a:ext cx="10363203" cy="1603463"/>
+            <a:ext cx="10363204" cy="1603463"/>
           </a:xfrm>
           <a:prstGeom prst="rect">
             <a:avLst/>
@@ -763,7 +767,7 @@
         <p:spPr>
           <a:xfrm>
             <a:off x="914399" y="2022250"/>
-            <a:ext cx="3299014" cy="3914910"/>
+            <a:ext cx="3299015" cy="3914910"/>
           </a:xfrm>
           <a:prstGeom prst="rect">
             <a:avLst/>
@@ -790,13 +794,13 @@
               </a:spcBef>
               <a:defRPr sz="2000"/>
             </a:lvl3pPr>
-            <a:lvl4pPr marL="1698171" indent="-326571">
+            <a:lvl4pPr marL="1698169" indent="-326569">
               <a:spcBef>
                 <a:spcPts val="1200"/>
               </a:spcBef>
               <a:defRPr sz="2000"/>
             </a:lvl4pPr>
-            <a:lvl5pPr marL="2155371" indent="-326571">
+            <a:lvl5pPr marL="2155369" indent="-326569">
               <a:spcBef>
                 <a:spcPts val="1200"/>
               </a:spcBef>
@@ -902,15 +906,15 @@
           <a:blip r:embed="rId2">
             <a:extLst/>
           </a:blip>
-          <a:srcRect l="18883" t="34408" r="46636" b="1"/>
+          <a:srcRect l="18883" t="34408" r="46634" b="1"/>
           <a:stretch>
             <a:fillRect/>
           </a:stretch>
         </p:blipFill>
         <p:spPr>
           <a:xfrm rot="10800000">
-            <a:off x="10506072" y="3984078"/>
-            <a:ext cx="1685929" cy="2873922"/>
+            <a:off x="10506071" y="3984078"/>
+            <a:ext cx="1685931" cy="2873924"/>
           </a:xfrm>
           <a:prstGeom prst="rect">
             <a:avLst/>
@@ -939,8 +943,8 @@
         </p:blipFill>
         <p:spPr>
           <a:xfrm flipH="1" rot="16200000">
-            <a:off x="9781526" y="-311512"/>
-            <a:ext cx="2098965" cy="2721986"/>
+            <a:off x="9781526" y="-311513"/>
+            <a:ext cx="2098967" cy="2721988"/>
           </a:xfrm>
           <a:prstGeom prst="rect">
             <a:avLst/>
@@ -960,8 +964,8 @@
         </p:nvSpPr>
         <p:spPr>
           <a:xfrm>
-            <a:off x="891990" y="434224"/>
-            <a:ext cx="9524998" cy="1499628"/>
+            <a:off x="891990" y="434223"/>
+            <a:ext cx="9524998" cy="1499630"/>
           </a:xfrm>
           <a:prstGeom prst="rect">
             <a:avLst/>
@@ -1242,7 +1246,7 @@
         <p:spPr>
           <a:xfrm>
             <a:off x="6091513" y="4172989"/>
-            <a:ext cx="5057104" cy="2519364"/>
+            <a:ext cx="5057105" cy="2519366"/>
           </a:xfrm>
           <a:prstGeom prst="rect">
             <a:avLst/>
@@ -1360,8 +1364,8 @@
         </p:blipFill>
         <p:spPr>
           <a:xfrm flipH="1">
-            <a:off x="-1" y="0"/>
-            <a:ext cx="5181602" cy="6858000"/>
+            <a:off x="-2" y="0"/>
+            <a:ext cx="5181604" cy="6858000"/>
           </a:xfrm>
           <a:prstGeom prst="rect">
             <a:avLst/>
@@ -1381,8 +1385,8 @@
         </p:nvSpPr>
         <p:spPr>
           <a:xfrm>
-            <a:off x="5892800" y="6172200"/>
-            <a:ext cx="2844800" cy="368301"/>
+            <a:off x="8506328" y="6240782"/>
+            <a:ext cx="231273" cy="231137"/>
           </a:xfrm>
           <a:prstGeom prst="rect">
             <a:avLst/>
@@ -1450,8 +1454,8 @@
         </p:blipFill>
         <p:spPr>
           <a:xfrm rot="5400000">
-            <a:off x="7855911" y="-1240061"/>
-            <a:ext cx="3096030" cy="5576154"/>
+            <a:off x="7855911" y="-1240063"/>
+            <a:ext cx="3096032" cy="5576157"/>
           </a:xfrm>
           <a:prstGeom prst="rect">
             <a:avLst/>
@@ -1471,17 +1475,18 @@
         </p:nvPicPr>
         <p:blipFill>
           <a:blip r:embed="rId3">
+            <a:alphaModFix amt="31062"/>
             <a:extLst/>
           </a:blip>
-          <a:srcRect l="4151" t="0" r="18576" b="0"/>
+          <a:srcRect l="0" t="0" r="35279" b="0"/>
           <a:stretch>
             <a:fillRect/>
           </a:stretch>
         </p:blipFill>
         <p:spPr>
           <a:xfrm>
-            <a:off x="7010400" y="0"/>
-            <a:ext cx="5181601" cy="6858000"/>
+            <a:off x="7852119" y="0"/>
+            <a:ext cx="4339884" cy="6858000"/>
           </a:xfrm>
           <a:prstGeom prst="rect">
             <a:avLst/>
@@ -1489,6 +1494,11 @@
           <a:ln w="12700">
             <a:miter lim="400000"/>
           </a:ln>
+          <a:effectLst>
+            <a:outerShdw sx="100000" sy="100000" kx="0" ky="0" algn="b" rotWithShape="0" blurRad="254000" dist="127000" dir="16200000">
+              <a:srgbClr val="000000"/>
+            </a:outerShdw>
+          </a:effectLst>
         </p:spPr>
       </p:pic>
       <p:sp>
@@ -1501,8 +1511,8 @@
         </p:nvSpPr>
         <p:spPr>
           <a:xfrm>
-            <a:off x="914400" y="315532"/>
-            <a:ext cx="5181600" cy="2376869"/>
+            <a:off x="914400" y="315531"/>
+            <a:ext cx="5181600" cy="2376872"/>
           </a:xfrm>
           <a:prstGeom prst="rect">
             <a:avLst/>
@@ -1530,7 +1540,7 @@
         <p:spPr>
           <a:xfrm>
             <a:off x="914400" y="2844800"/>
-            <a:ext cx="5181600" cy="3128964"/>
+            <a:ext cx="5181600" cy="3128966"/>
           </a:xfrm>
           <a:prstGeom prst="rect">
             <a:avLst/>
@@ -1562,14 +1572,14 @@
               <a:buFontTx/>
               <a:defRPr sz="2000"/>
             </a:lvl3pPr>
-            <a:lvl4pPr marL="1698171" indent="-326571">
+            <a:lvl4pPr marL="1698169" indent="-326569">
               <a:lnSpc>
                 <a:spcPct val="120000"/>
               </a:lnSpc>
               <a:buFontTx/>
               <a:defRPr sz="2000"/>
             </a:lvl4pPr>
-            <a:lvl5pPr marL="2155371" indent="-326571">
+            <a:lvl5pPr marL="2155369" indent="-326569">
               <a:lnSpc>
                 <a:spcPct val="120000"/>
               </a:lnSpc>
@@ -1704,8 +1714,8 @@
         </p:nvSpPr>
         <p:spPr>
           <a:xfrm>
-            <a:off x="914400" y="2580639"/>
-            <a:ext cx="5181600" cy="3368821"/>
+            <a:off x="914400" y="2580638"/>
+            <a:ext cx="5181600" cy="3368824"/>
           </a:xfrm>
           <a:prstGeom prst="rect">
             <a:avLst/>
@@ -1740,15 +1750,15 @@
         </p:nvSpPr>
         <p:spPr>
           <a:xfrm>
-            <a:off x="6085840" y="-10160"/>
-            <a:ext cx="6116321" cy="6868161"/>
+            <a:off x="6085840" y="-10162"/>
+            <a:ext cx="6116323" cy="6868164"/>
           </a:xfrm>
           <a:prstGeom prst="rect">
             <a:avLst/>
           </a:prstGeom>
         </p:spPr>
         <p:txBody>
-          <a:bodyPr lIns="91439" rIns="91439">
+          <a:bodyPr lIns="91439" tIns="45719" rIns="91439" bIns="45719">
             <a:noAutofit/>
           </a:bodyPr>
           <a:lstStyle/>
@@ -1767,8 +1777,8 @@
         </p:nvSpPr>
         <p:spPr>
           <a:xfrm>
-            <a:off x="5892800" y="6172200"/>
-            <a:ext cx="2844800" cy="368301"/>
+            <a:off x="8506328" y="6240782"/>
+            <a:ext cx="231273" cy="231137"/>
           </a:xfrm>
           <a:prstGeom prst="rect">
             <a:avLst/>
@@ -1843,8 +1853,8 @@
         </p:blipFill>
         <p:spPr>
           <a:xfrm rot="10800000">
-            <a:off x="6324600" y="-1"/>
-            <a:ext cx="5867400" cy="1317505"/>
+            <a:off x="6324598" y="-2"/>
+            <a:ext cx="5867403" cy="1317507"/>
           </a:xfrm>
           <a:prstGeom prst="rect">
             <a:avLst/>
@@ -1865,7 +1875,7 @@
         <p:spPr>
           <a:xfrm>
             <a:off x="6126479" y="1310638"/>
-            <a:ext cx="4805998" cy="2689631"/>
+            <a:ext cx="4806000" cy="2689632"/>
           </a:xfrm>
           <a:prstGeom prst="rect">
             <a:avLst/>
@@ -1896,15 +1906,15 @@
         </p:nvSpPr>
         <p:spPr>
           <a:xfrm>
-            <a:off x="0" y="-10161"/>
-            <a:ext cx="6096000" cy="6858001"/>
+            <a:off x="0" y="-10163"/>
+            <a:ext cx="6096000" cy="6858004"/>
           </a:xfrm>
           <a:prstGeom prst="rect">
             <a:avLst/>
           </a:prstGeom>
         </p:spPr>
         <p:txBody>
-          <a:bodyPr lIns="91439" rIns="91439">
+          <a:bodyPr lIns="91439" tIns="45719" rIns="91439" bIns="45719">
             <a:noAutofit/>
           </a:bodyPr>
           <a:lstStyle/>
@@ -1924,7 +1934,7 @@
         <p:spPr>
           <a:xfrm>
             <a:off x="6126162" y="4172989"/>
-            <a:ext cx="4805998" cy="2389737"/>
+            <a:ext cx="4806000" cy="2389739"/>
           </a:xfrm>
           <a:prstGeom prst="rect">
             <a:avLst/>
@@ -1939,25 +1949,25 @@
               <a:buNone/>
               <a:defRPr sz="2000"/>
             </a:lvl1pPr>
-            <a:lvl2pPr marL="0" indent="457200">
+            <a:lvl2pPr marL="0" indent="0">
               <a:buSzTx/>
               <a:buFontTx/>
               <a:buNone/>
               <a:defRPr sz="2000"/>
             </a:lvl2pPr>
-            <a:lvl3pPr marL="0" indent="914400">
+            <a:lvl3pPr marL="0" indent="0">
               <a:buSzTx/>
               <a:buFontTx/>
               <a:buNone/>
               <a:defRPr sz="2000"/>
             </a:lvl3pPr>
-            <a:lvl4pPr marL="0" indent="1371600">
+            <a:lvl4pPr marL="0" indent="0">
               <a:buSzTx/>
               <a:buFontTx/>
               <a:buNone/>
               <a:defRPr sz="2000"/>
             </a:lvl4pPr>
-            <a:lvl5pPr marL="0" indent="1828800">
+            <a:lvl5pPr marL="0" indent="0">
               <a:buSzTx/>
               <a:buFontTx/>
               <a:buNone/>
@@ -2006,8 +2016,8 @@
         </p:nvSpPr>
         <p:spPr>
           <a:xfrm>
-            <a:off x="5892800" y="6172200"/>
-            <a:ext cx="2844800" cy="368301"/>
+            <a:off x="8506328" y="6240782"/>
+            <a:ext cx="231273" cy="231137"/>
           </a:xfrm>
           <a:prstGeom prst="rect">
             <a:avLst/>
@@ -2075,8 +2085,8 @@
         </p:blipFill>
         <p:spPr>
           <a:xfrm flipH="1">
-            <a:off x="9135413" y="0"/>
-            <a:ext cx="3056587" cy="6858000"/>
+            <a:off x="9135412" y="0"/>
+            <a:ext cx="3056589" cy="6858000"/>
           </a:xfrm>
           <a:prstGeom prst="rect">
             <a:avLst/>
@@ -2155,7 +2165,7 @@
         <p:spPr>
           <a:xfrm>
             <a:off x="914399" y="2011363"/>
-            <a:ext cx="7273639" cy="4155758"/>
+            <a:ext cx="7273640" cy="4155760"/>
           </a:xfrm>
           <a:prstGeom prst="rect">
             <a:avLst/>
@@ -2182,13 +2192,13 @@
               </a:spcBef>
               <a:defRPr sz="2000"/>
             </a:lvl3pPr>
-            <a:lvl4pPr marL="1698171" indent="-326571">
+            <a:lvl4pPr marL="1698169" indent="-326569">
               <a:spcBef>
                 <a:spcPts val="1200"/>
               </a:spcBef>
               <a:defRPr sz="2000"/>
             </a:lvl4pPr>
-            <a:lvl5pPr marL="2155371" indent="-326571">
+            <a:lvl5pPr marL="2155369" indent="-326569">
               <a:spcBef>
                 <a:spcPts val="1200"/>
               </a:spcBef>
@@ -2300,8 +2310,8 @@
         </p:blipFill>
         <p:spPr>
           <a:xfrm rot="16200000">
-            <a:off x="8039100" y="228600"/>
-            <a:ext cx="4381500" cy="3924300"/>
+            <a:off x="8039100" y="228599"/>
+            <a:ext cx="4381500" cy="3924302"/>
           </a:xfrm>
           <a:prstGeom prst="rect">
             <a:avLst/>
@@ -2321,8 +2331,8 @@
         </p:nvSpPr>
         <p:spPr>
           <a:xfrm>
-            <a:off x="6096000" y="375284"/>
-            <a:ext cx="4896678" cy="3624986"/>
+            <a:off x="6096000" y="375283"/>
+            <a:ext cx="4896678" cy="3624989"/>
           </a:xfrm>
           <a:prstGeom prst="rect">
             <a:avLst/>
@@ -2365,7 +2375,7 @@
           </a:prstGeom>
         </p:spPr>
         <p:txBody>
-          <a:bodyPr lIns="91439" rIns="91439">
+          <a:bodyPr lIns="91439" tIns="45719" rIns="91439" bIns="45719">
             <a:noAutofit/>
           </a:bodyPr>
           <a:lstStyle/>
@@ -2385,7 +2395,7 @@
         <p:spPr>
           <a:xfrm>
             <a:off x="6096000" y="4172989"/>
-            <a:ext cx="4896678" cy="2309727"/>
+            <a:ext cx="4896678" cy="2309729"/>
           </a:xfrm>
           <a:prstGeom prst="rect">
             <a:avLst/>
@@ -2494,8 +2504,8 @@
         </p:nvSpPr>
         <p:spPr>
           <a:xfrm>
-            <a:off x="5892800" y="6172200"/>
-            <a:ext cx="2844800" cy="368301"/>
+            <a:off x="8506328" y="6240782"/>
+            <a:ext cx="231273" cy="231137"/>
           </a:xfrm>
           <a:prstGeom prst="rect">
             <a:avLst/>
@@ -2570,8 +2580,8 @@
         </p:blipFill>
         <p:spPr>
           <a:xfrm rot="10800000">
-            <a:off x="9198863" y="-6"/>
-            <a:ext cx="2993137" cy="1517908"/>
+            <a:off x="9198863" y="-7"/>
+            <a:ext cx="2993139" cy="1517910"/>
           </a:xfrm>
           <a:prstGeom prst="rect">
             <a:avLst/>
@@ -2600,8 +2610,8 @@
         </p:blipFill>
         <p:spPr>
           <a:xfrm rot="16200000">
-            <a:off x="961220" y="4525178"/>
-            <a:ext cx="1371601" cy="3294043"/>
+            <a:off x="961220" y="4525176"/>
+            <a:ext cx="1371601" cy="3294046"/>
           </a:xfrm>
           <a:prstGeom prst="rect">
             <a:avLst/>
@@ -2677,13 +2687,13 @@
               </a:spcBef>
               <a:defRPr sz="2000"/>
             </a:lvl3pPr>
-            <a:lvl4pPr marL="1698171" indent="-326571">
+            <a:lvl4pPr marL="1698169" indent="-326569">
               <a:spcBef>
                 <a:spcPts val="1200"/>
               </a:spcBef>
               <a:defRPr sz="2000"/>
             </a:lvl4pPr>
-            <a:lvl5pPr marL="2155371" indent="-326571">
+            <a:lvl5pPr marL="2155369" indent="-326569">
               <a:spcBef>
                 <a:spcPts val="1200"/>
               </a:spcBef>
@@ -2789,8 +2799,8 @@
         </p:blipFill>
         <p:spPr>
           <a:xfrm flipH="1">
-            <a:off x="-26830" y="5950039"/>
-            <a:ext cx="2513522" cy="914401"/>
+            <a:off x="-26831" y="5950039"/>
+            <a:ext cx="2513525" cy="914403"/>
           </a:xfrm>
           <a:prstGeom prst="rect">
             <a:avLst/>
@@ -2812,7 +2822,7 @@
           <a:blip r:embed="rId3">
             <a:extLst/>
           </a:blip>
-          <a:srcRect l="18883" t="18052" r="46636" b="0"/>
+          <a:srcRect l="18883" t="18052" r="46634" b="0"/>
           <a:stretch>
             <a:fillRect/>
           </a:stretch>
@@ -2820,7 +2830,7 @@
         <p:spPr>
           <a:xfrm rot="5400000">
             <a:off x="9553763" y="-952311"/>
-            <a:ext cx="1685929" cy="3590549"/>
+            <a:ext cx="1685931" cy="3590550"/>
           </a:xfrm>
           <a:prstGeom prst="rect">
             <a:avLst/>
@@ -2840,8 +2850,8 @@
         </p:nvSpPr>
         <p:spPr>
           <a:xfrm>
-            <a:off x="914397" y="365125"/>
-            <a:ext cx="10439402" cy="1617017"/>
+            <a:off x="914396" y="365125"/>
+            <a:ext cx="10439404" cy="1617017"/>
           </a:xfrm>
           <a:prstGeom prst="rect">
             <a:avLst/>
@@ -2896,13 +2906,13 @@
               </a:spcBef>
               <a:defRPr b="1" sz="2000"/>
             </a:lvl3pPr>
-            <a:lvl4pPr marL="1698171" indent="-326571">
+            <a:lvl4pPr marL="1698169" indent="-326569">
               <a:spcBef>
                 <a:spcPts val="1200"/>
               </a:spcBef>
               <a:defRPr b="1" sz="2000"/>
             </a:lvl4pPr>
-            <a:lvl5pPr marL="2155371" indent="-326571">
+            <a:lvl5pPr marL="2155369" indent="-326569">
               <a:spcBef>
                 <a:spcPts val="1200"/>
               </a:spcBef>
@@ -3008,15 +3018,15 @@
           <a:blip r:embed="rId2">
             <a:extLst/>
           </a:blip>
-          <a:srcRect l="67703" t="485" r="0" b="67542"/>
+          <a:srcRect l="67703" t="485" r="0" b="67540"/>
           <a:stretch>
             <a:fillRect/>
           </a:stretch>
         </p:blipFill>
         <p:spPr>
           <a:xfrm rot="5400000">
-            <a:off x="-115163" y="115164"/>
-            <a:ext cx="1895059" cy="1664736"/>
+            <a:off x="-115164" y="115163"/>
+            <a:ext cx="1895060" cy="1664738"/>
           </a:xfrm>
           <a:prstGeom prst="rect">
             <a:avLst/>
@@ -3036,8 +3046,8 @@
         </p:nvSpPr>
         <p:spPr>
           <a:xfrm>
-            <a:off x="916384" y="446313"/>
-            <a:ext cx="5179616" cy="1448748"/>
+            <a:off x="916383" y="446313"/>
+            <a:ext cx="5179618" cy="1448749"/>
           </a:xfrm>
           <a:prstGeom prst="rect">
             <a:avLst/>
@@ -3065,7 +3075,7 @@
         <p:spPr>
           <a:xfrm>
             <a:off x="914399" y="2022250"/>
-            <a:ext cx="5181601" cy="3747181"/>
+            <a:ext cx="5181602" cy="3747181"/>
           </a:xfrm>
           <a:prstGeom prst="rect">
             <a:avLst/>
@@ -3092,13 +3102,13 @@
               </a:spcBef>
               <a:defRPr sz="2000"/>
             </a:lvl3pPr>
-            <a:lvl4pPr marL="1698171" indent="-326571">
+            <a:lvl4pPr marL="1698169" indent="-326569">
               <a:spcBef>
                 <a:spcPts val="1200"/>
               </a:spcBef>
               <a:defRPr sz="2000"/>
             </a:lvl4pPr>
-            <a:lvl5pPr marL="2155371" indent="-326571">
+            <a:lvl5pPr marL="2155369" indent="-326569">
               <a:spcBef>
                 <a:spcPts val="1200"/>
               </a:spcBef>
@@ -3139,7 +3149,34 @@
       </p:sp>
       <p:sp>
         <p:nvSpPr>
-          <p:cNvPr id="100" name="Slide Number"/>
+          <p:cNvPr id="100" name="Picture Placeholder 11"/>
+          <p:cNvSpPr/>
+          <p:nvPr>
+            <p:ph type="pic" idx="21"/>
+          </p:nvPr>
+        </p:nvSpPr>
+        <p:spPr>
+          <a:xfrm>
+            <a:off x="6076950" y="-3"/>
+            <a:ext cx="6115050" cy="6868891"/>
+          </a:xfrm>
+          <a:prstGeom prst="rect">
+            <a:avLst/>
+          </a:prstGeom>
+        </p:spPr>
+        <p:txBody>
+          <a:bodyPr lIns="91439" tIns="45719" rIns="91439" bIns="45719">
+            <a:noAutofit/>
+          </a:bodyPr>
+          <a:lstStyle/>
+          <a:p>
+            <a:pPr/>
+          </a:p>
+        </p:txBody>
+      </p:sp>
+      <p:sp>
+        <p:nvSpPr>
+          <p:cNvPr id="101" name="Slide Number"/>
           <p:cNvSpPr txBox="1"/>
           <p:nvPr>
             <p:ph type="sldNum" sz="quarter" idx="2"/>
@@ -3156,33 +3193,6 @@
           <a:p>
             <a:pPr/>
             <a:fld id="{86CB4B4D-7CA3-9044-876B-883B54F8677D}" type="slidenum"/>
-          </a:p>
-        </p:txBody>
-      </p:sp>
-      <p:sp>
-        <p:nvSpPr>
-          <p:cNvPr id="101" name="Picture Placeholder 11"/>
-          <p:cNvSpPr/>
-          <p:nvPr>
-            <p:ph type="pic" idx="21"/>
-          </p:nvPr>
-        </p:nvSpPr>
-        <p:spPr>
-          <a:xfrm>
-            <a:off x="6076950" y="-1"/>
-            <a:ext cx="6115050" cy="6868888"/>
-          </a:xfrm>
-          <a:prstGeom prst="rect">
-            <a:avLst/>
-          </a:prstGeom>
-        </p:spPr>
-        <p:txBody>
-          <a:bodyPr lIns="91439" rIns="91439">
-            <a:noAutofit/>
-          </a:bodyPr>
-          <a:lstStyle/>
-          <a:p>
-            <a:pPr/>
           </a:p>
         </p:txBody>
       </p:sp>
@@ -3231,7 +3241,7 @@
           <a:blip r:embed="rId2">
             <a:extLst/>
           </a:blip>
-          <a:srcRect l="18883" t="18052" r="46636" b="0"/>
+          <a:srcRect l="18883" t="18052" r="46634" b="0"/>
           <a:stretch>
             <a:fillRect/>
           </a:stretch>
@@ -3239,7 +3249,7 @@
         <p:spPr>
           <a:xfrm rot="5400000">
             <a:off x="9553763" y="-952311"/>
-            <a:ext cx="1685929" cy="3590549"/>
+            <a:ext cx="1685931" cy="3590550"/>
           </a:xfrm>
           <a:prstGeom prst="rect">
             <a:avLst/>
@@ -3260,7 +3270,7 @@
         <p:spPr>
           <a:xfrm>
             <a:off x="923544" y="584477"/>
-            <a:ext cx="10354053" cy="1209766"/>
+            <a:ext cx="10354055" cy="1209767"/>
           </a:xfrm>
           <a:prstGeom prst="rect">
             <a:avLst/>
@@ -3275,7 +3285,7 @@
           </a:extLst>
         </p:spPr>
         <p:txBody>
-          <a:bodyPr lIns="45719" rIns="45719" anchor="ctr">
+          <a:bodyPr lIns="45718" tIns="45718" rIns="45718" bIns="45718" anchor="ctr">
             <a:normAutofit fontScale="100000" lnSpcReduction="0"/>
           </a:bodyPr>
           <a:lstStyle/>
@@ -3289,42 +3299,7 @@
       </p:sp>
       <p:sp>
         <p:nvSpPr>
-          <p:cNvPr id="4" name="Slide Number"/>
-          <p:cNvSpPr txBox="1"/>
-          <p:nvPr>
-            <p:ph type="sldNum" sz="quarter" idx="2"/>
-          </p:nvPr>
-        </p:nvSpPr>
-        <p:spPr>
-          <a:xfrm>
-            <a:off x="914400" y="6259740"/>
-            <a:ext cx="273656" cy="269241"/>
-          </a:xfrm>
-          <a:prstGeom prst="rect">
-            <a:avLst/>
-          </a:prstGeom>
-          <a:ln w="12700">
-            <a:miter lim="400000"/>
-          </a:ln>
-        </p:spPr>
-        <p:txBody>
-          <a:bodyPr wrap="none" lIns="45719" rIns="45719" anchor="ctr">
-            <a:spAutoFit/>
-          </a:bodyPr>
-          <a:lstStyle>
-            <a:lvl1pPr>
-              <a:defRPr sz="1200"/>
-            </a:lvl1pPr>
-          </a:lstStyle>
-          <a:p>
-            <a:pPr/>
-            <a:fld id="{86CB4B4D-7CA3-9044-876B-883B54F8677D}" type="slidenum"/>
-          </a:p>
-        </p:txBody>
-      </p:sp>
-      <p:sp>
-        <p:nvSpPr>
-          <p:cNvPr id="5" name="Body Level One…"/>
+          <p:cNvPr id="4" name="Body Level One…"/>
           <p:cNvSpPr txBox="1"/>
           <p:nvPr>
             <p:ph type="body" idx="1"/>
@@ -3332,8 +3307,8 @@
         </p:nvSpPr>
         <p:spPr>
           <a:xfrm>
-            <a:off x="609600" y="1600200"/>
-            <a:ext cx="10972800" cy="4525963"/>
+            <a:off x="6805083" y="2438400"/>
+            <a:ext cx="4775201" cy="4419600"/>
           </a:xfrm>
           <a:prstGeom prst="rect">
             <a:avLst/>
@@ -3348,7 +3323,7 @@
           </a:extLst>
         </p:spPr>
         <p:txBody>
-          <a:bodyPr lIns="45719" rIns="45719">
+          <a:bodyPr lIns="45718" tIns="45718" rIns="45718" bIns="45718">
             <a:normAutofit fontScale="100000" lnSpcReduction="0"/>
           </a:bodyPr>
           <a:lstStyle/>
@@ -3381,6 +3356,46 @@
             <a:r>
               <a:t>Body Level Five</a:t>
             </a:r>
+          </a:p>
+        </p:txBody>
+      </p:sp>
+      <p:sp>
+        <p:nvSpPr>
+          <p:cNvPr id="5" name="Slide Number"/>
+          <p:cNvSpPr txBox="1"/>
+          <p:nvPr>
+            <p:ph type="sldNum" sz="quarter" idx="2"/>
+          </p:nvPr>
+        </p:nvSpPr>
+        <p:spPr>
+          <a:xfrm>
+            <a:off x="914400" y="6259742"/>
+            <a:ext cx="273652" cy="269237"/>
+          </a:xfrm>
+          <a:prstGeom prst="rect">
+            <a:avLst/>
+          </a:prstGeom>
+          <a:ln w="12700">
+            <a:miter lim="400000"/>
+          </a:ln>
+        </p:spPr>
+        <p:txBody>
+          <a:bodyPr wrap="none" lIns="45718" tIns="45718" rIns="45718" bIns="45718" anchor="ctr">
+            <a:spAutoFit/>
+          </a:bodyPr>
+          <a:lstStyle>
+            <a:lvl1pPr>
+              <a:defRPr sz="1200">
+                <a:latin typeface="Tenorite"/>
+                <a:ea typeface="Tenorite"/>
+                <a:cs typeface="Tenorite"/>
+                <a:sym typeface="Tenorite"/>
+              </a:defRPr>
+            </a:lvl1pPr>
+          </a:lstStyle>
+          <a:p>
+            <a:pPr/>
+            <a:fld id="{86CB4B4D-7CA3-9044-876B-883B54F8677D}" type="slidenum"/>
           </a:p>
         </p:txBody>
       </p:sp>
@@ -3693,7 +3708,7 @@
           <a:sym typeface="Tenorite"/>
         </a:defRPr>
       </a:lvl2pPr>
-      <a:lvl3pPr marL="1234439" marR="0" indent="-320039" algn="l" defTabSz="914400" rtl="0" latinLnBrk="0">
+      <a:lvl3pPr marL="1234438" marR="0" indent="-320038" algn="l" defTabSz="914400" rtl="0" latinLnBrk="0">
         <a:lnSpc>
           <a:spcPct val="90000"/>
         </a:lnSpc>
@@ -3903,7 +3918,7 @@
           <a:sym typeface="Tenorite"/>
         </a:defRPr>
       </a:lvl1pPr>
-      <a:lvl2pPr marL="0" marR="0" indent="457200" algn="l" defTabSz="914400" rtl="0" latinLnBrk="0">
+      <a:lvl2pPr marL="0" marR="0" indent="0" algn="l" defTabSz="914400" rtl="0" latinLnBrk="0">
         <a:lnSpc>
           <a:spcPct val="100000"/>
         </a:lnSpc>
@@ -3929,7 +3944,7 @@
           <a:sym typeface="Tenorite"/>
         </a:defRPr>
       </a:lvl2pPr>
-      <a:lvl3pPr marL="0" marR="0" indent="914400" algn="l" defTabSz="914400" rtl="0" latinLnBrk="0">
+      <a:lvl3pPr marL="0" marR="0" indent="0" algn="l" defTabSz="914400" rtl="0" latinLnBrk="0">
         <a:lnSpc>
           <a:spcPct val="100000"/>
         </a:lnSpc>
@@ -3955,7 +3970,7 @@
           <a:sym typeface="Tenorite"/>
         </a:defRPr>
       </a:lvl3pPr>
-      <a:lvl4pPr marL="0" marR="0" indent="1371600" algn="l" defTabSz="914400" rtl="0" latinLnBrk="0">
+      <a:lvl4pPr marL="0" marR="0" indent="0" algn="l" defTabSz="914400" rtl="0" latinLnBrk="0">
         <a:lnSpc>
           <a:spcPct val="100000"/>
         </a:lnSpc>
@@ -3981,7 +3996,7 @@
           <a:sym typeface="Tenorite"/>
         </a:defRPr>
       </a:lvl4pPr>
-      <a:lvl5pPr marL="0" marR="0" indent="1828800" algn="l" defTabSz="914400" rtl="0" latinLnBrk="0">
+      <a:lvl5pPr marL="0" marR="0" indent="0" algn="l" defTabSz="914400" rtl="0" latinLnBrk="0">
         <a:lnSpc>
           <a:spcPct val="100000"/>
         </a:lnSpc>
@@ -4007,7 +4022,7 @@
           <a:sym typeface="Tenorite"/>
         </a:defRPr>
       </a:lvl5pPr>
-      <a:lvl6pPr marL="0" marR="0" indent="2286000" algn="l" defTabSz="914400" rtl="0" latinLnBrk="0">
+      <a:lvl6pPr marL="0" marR="0" indent="0" algn="l" defTabSz="914400" rtl="0" latinLnBrk="0">
         <a:lnSpc>
           <a:spcPct val="100000"/>
         </a:lnSpc>
@@ -4033,7 +4048,7 @@
           <a:sym typeface="Tenorite"/>
         </a:defRPr>
       </a:lvl6pPr>
-      <a:lvl7pPr marL="0" marR="0" indent="2743200" algn="l" defTabSz="914400" rtl="0" latinLnBrk="0">
+      <a:lvl7pPr marL="0" marR="0" indent="0" algn="l" defTabSz="914400" rtl="0" latinLnBrk="0">
         <a:lnSpc>
           <a:spcPct val="100000"/>
         </a:lnSpc>
@@ -4059,7 +4074,7 @@
           <a:sym typeface="Tenorite"/>
         </a:defRPr>
       </a:lvl7pPr>
-      <a:lvl8pPr marL="0" marR="0" indent="3200400" algn="l" defTabSz="914400" rtl="0" latinLnBrk="0">
+      <a:lvl8pPr marL="0" marR="0" indent="0" algn="l" defTabSz="914400" rtl="0" latinLnBrk="0">
         <a:lnSpc>
           <a:spcPct val="100000"/>
         </a:lnSpc>
@@ -4085,7 +4100,7 @@
           <a:sym typeface="Tenorite"/>
         </a:defRPr>
       </a:lvl8pPr>
-      <a:lvl9pPr marL="0" marR="0" indent="3657600" algn="l" defTabSz="914400" rtl="0" latinLnBrk="0">
+      <a:lvl9pPr marL="0" marR="0" indent="0" algn="l" defTabSz="914400" rtl="0" latinLnBrk="0">
         <a:lnSpc>
           <a:spcPct val="100000"/>
         </a:lnSpc>
@@ -4143,8 +4158,8 @@
         </p:nvSpPr>
         <p:spPr>
           <a:xfrm>
-            <a:off x="6096000" y="2773681"/>
-            <a:ext cx="5674361" cy="3200401"/>
+            <a:off x="6095999" y="2773681"/>
+            <a:ext cx="5674364" cy="3200403"/>
           </a:xfrm>
           <a:prstGeom prst="rect">
             <a:avLst/>
@@ -4189,7 +4204,7 @@
       </p:grpSpPr>
       <p:sp>
         <p:nvSpPr>
-          <p:cNvPr id="187" name="Title 1"/>
+          <p:cNvPr id="210" name="Title 1"/>
           <p:cNvSpPr txBox="1"/>
           <p:nvPr>
             <p:ph type="title"/>
@@ -4217,7 +4232,7 @@
       </p:sp>
       <p:sp>
         <p:nvSpPr>
-          <p:cNvPr id="188" name="Content Placeholder 2"/>
+          <p:cNvPr id="211" name="Content Placeholder 2"/>
           <p:cNvSpPr txBox="1"/>
           <p:nvPr>
             <p:ph type="body" sz="half" idx="1"/>
@@ -4225,8 +4240,8 @@
         </p:nvSpPr>
         <p:spPr>
           <a:xfrm>
-            <a:off x="914398" y="2011363"/>
-            <a:ext cx="7273640" cy="4155758"/>
+            <a:off x="914397" y="2011363"/>
+            <a:ext cx="7273639" cy="4155760"/>
           </a:xfrm>
           <a:prstGeom prst="rect">
             <a:avLst/>
@@ -4303,16 +4318,16 @@
       </p:sp>
       <p:sp>
         <p:nvSpPr>
-          <p:cNvPr id="189" name="Slide Number Placeholder 3"/>
+          <p:cNvPr id="212" name="Slide Number Placeholder 3"/>
           <p:cNvSpPr txBox="1"/>
           <p:nvPr>
-            <p:ph type="sldNum" sz="quarter" idx="2"/>
+            <p:ph type="sldNum" sz="quarter" idx="4294967295"/>
           </p:nvPr>
         </p:nvSpPr>
         <p:spPr>
           <a:xfrm>
-            <a:off x="914400" y="6259740"/>
-            <a:ext cx="273656" cy="269241"/>
+            <a:off x="914399" y="6259740"/>
+            <a:ext cx="273653" cy="269237"/>
           </a:xfrm>
           <a:prstGeom prst="rect">
             <a:avLst/>
@@ -4360,7 +4375,7 @@
       </p:grpSpPr>
       <p:sp>
         <p:nvSpPr>
-          <p:cNvPr id="191" name="Title 1"/>
+          <p:cNvPr id="214" name="Title 1"/>
           <p:cNvSpPr txBox="1"/>
           <p:nvPr>
             <p:ph type="title"/>
@@ -4368,8 +4383,8 @@
         </p:nvSpPr>
         <p:spPr>
           <a:xfrm>
-            <a:off x="6096000" y="375284"/>
-            <a:ext cx="4896679" cy="3624986"/>
+            <a:off x="6095998" y="375282"/>
+            <a:ext cx="4896682" cy="3624990"/>
           </a:xfrm>
           <a:prstGeom prst="rect">
             <a:avLst/>
@@ -4388,7 +4403,7 @@
       </p:sp>
       <p:pic>
         <p:nvPicPr>
-          <p:cNvPr id="192" name="Picture Placeholder 4" descr="Picture Placeholder 4"/>
+          <p:cNvPr id="215" name="Picture Placeholder 4" descr="Picture Placeholder 4"/>
           <p:cNvPicPr>
             <a:picLocks noChangeAspect="1"/>
           </p:cNvPicPr>
@@ -4406,6 +4421,10 @@
           </a:stretch>
         </p:blipFill>
         <p:spPr>
+          <a:xfrm>
+            <a:off x="0" y="0"/>
+            <a:ext cx="6096000" cy="6858000"/>
+          </a:xfrm>
           <a:prstGeom prst="rect">
             <a:avLst/>
           </a:prstGeom>
@@ -4413,13 +4432,17 @@
       </p:pic>
       <p:sp>
         <p:nvSpPr>
-          <p:cNvPr id="193" name="Content Placeholder 2"/>
+          <p:cNvPr id="216" name="Content Placeholder 2"/>
           <p:cNvSpPr txBox="1"/>
           <p:nvPr>
             <p:ph type="body" sz="quarter" idx="1"/>
           </p:nvPr>
         </p:nvSpPr>
         <p:spPr>
+          <a:xfrm>
+            <a:off x="6095998" y="4172989"/>
+            <a:ext cx="4896681" cy="2309729"/>
+          </a:xfrm>
           <a:prstGeom prst="rect">
             <a:avLst/>
           </a:prstGeom>
@@ -4463,7 +4486,7 @@
       </p:grpSpPr>
       <p:sp>
         <p:nvSpPr>
-          <p:cNvPr id="195" name="Title 1"/>
+          <p:cNvPr id="218" name="Title 1"/>
           <p:cNvSpPr txBox="1"/>
           <p:nvPr>
             <p:ph type="title"/>
@@ -4491,7 +4514,7 @@
       </p:sp>
       <p:sp>
         <p:nvSpPr>
-          <p:cNvPr id="196" name="Content Placeholder 2"/>
+          <p:cNvPr id="219" name="Content Placeholder 2"/>
           <p:cNvSpPr txBox="1"/>
           <p:nvPr>
             <p:ph type="body" sz="half" idx="1"/>
@@ -4531,14 +4554,14 @@
       </p:sp>
       <p:sp>
         <p:nvSpPr>
-          <p:cNvPr id="197" name="Content Placeholder 3"/>
+          <p:cNvPr id="220" name="Content Placeholder 3"/>
           <p:cNvSpPr txBox="1"/>
           <p:nvPr/>
         </p:nvSpPr>
         <p:spPr>
           <a:xfrm>
-            <a:off x="6330611" y="2022250"/>
-            <a:ext cx="4901269" cy="3747181"/>
+            <a:off x="6330610" y="2022250"/>
+            <a:ext cx="4901270" cy="3747180"/>
           </a:xfrm>
           <a:prstGeom prst="rect">
             <a:avLst/>
@@ -4553,7 +4576,7 @@
           </a:extLst>
         </p:spPr>
         <p:txBody>
-          <a:bodyPr lIns="45719" rIns="45719">
+          <a:bodyPr lIns="45718" tIns="45718" rIns="45718" bIns="45718">
             <a:normAutofit fontScale="100000" lnSpcReduction="0"/>
           </a:bodyPr>
           <a:lstStyle/>
@@ -4568,7 +4591,12 @@
               <a:buSzPct val="100000"/>
               <a:buFont typeface="Arial"/>
               <a:buChar char="•"/>
-              <a:defRPr sz="2000"/>
+              <a:defRPr sz="2000">
+                <a:latin typeface="Tenorite"/>
+                <a:ea typeface="Tenorite"/>
+                <a:cs typeface="Tenorite"/>
+                <a:sym typeface="Tenorite"/>
+              </a:defRPr>
             </a:pPr>
             <a:r>
               <a:t>Company A product is more expensive</a:t>
@@ -4585,7 +4613,12 @@
               <a:buSzPct val="100000"/>
               <a:buFont typeface="Arial"/>
               <a:buChar char="•"/>
-              <a:defRPr sz="2000"/>
+              <a:defRPr sz="2000">
+                <a:latin typeface="Tenorite"/>
+                <a:ea typeface="Tenorite"/>
+                <a:cs typeface="Tenorite"/>
+                <a:sym typeface="Tenorite"/>
+              </a:defRPr>
             </a:pPr>
             <a:r>
               <a:t>Companies B &amp; C product is expensive and inconvenient to use</a:t>
@@ -4602,7 +4635,12 @@
               <a:buSzPct val="100000"/>
               <a:buFont typeface="Arial"/>
               <a:buChar char="•"/>
-              <a:defRPr sz="2000"/>
+              <a:defRPr sz="2000">
+                <a:latin typeface="Tenorite"/>
+                <a:ea typeface="Tenorite"/>
+                <a:cs typeface="Tenorite"/>
+                <a:sym typeface="Tenorite"/>
+              </a:defRPr>
             </a:pPr>
             <a:r>
               <a:t>Companies D &amp; E product is affordable, but inconvenient to use</a:t>
@@ -4612,16 +4650,16 @@
       </p:sp>
       <p:sp>
         <p:nvSpPr>
-          <p:cNvPr id="198" name="Slide Number Placeholder 4"/>
+          <p:cNvPr id="221" name="Slide Number Placeholder 4"/>
           <p:cNvSpPr txBox="1"/>
           <p:nvPr>
-            <p:ph type="sldNum" sz="quarter" idx="2"/>
+            <p:ph type="sldNum" sz="quarter" idx="4294967295"/>
           </p:nvPr>
         </p:nvSpPr>
         <p:spPr>
           <a:xfrm>
-            <a:off x="914400" y="6259740"/>
-            <a:ext cx="273656" cy="269241"/>
+            <a:off x="914399" y="6259740"/>
+            <a:ext cx="273653" cy="269237"/>
           </a:xfrm>
           <a:prstGeom prst="rect">
             <a:avLst/>
@@ -4669,7 +4707,7 @@
       </p:grpSpPr>
       <p:sp>
         <p:nvSpPr>
-          <p:cNvPr id="200" name="Title 1"/>
+          <p:cNvPr id="223" name="Title 1"/>
           <p:cNvSpPr txBox="1"/>
           <p:nvPr>
             <p:ph type="title"/>
@@ -4677,8 +4715,8 @@
         </p:nvSpPr>
         <p:spPr>
           <a:xfrm>
-            <a:off x="916384" y="446313"/>
-            <a:ext cx="5179617" cy="1448748"/>
+            <a:off x="916382" y="446313"/>
+            <a:ext cx="5179621" cy="1448750"/>
           </a:xfrm>
           <a:prstGeom prst="rect">
             <a:avLst/>
@@ -4697,13 +4735,17 @@
       </p:sp>
       <p:sp>
         <p:nvSpPr>
-          <p:cNvPr id="201" name="Content Placeholder 2"/>
+          <p:cNvPr id="224" name="Content Placeholder 2"/>
           <p:cNvSpPr txBox="1"/>
           <p:nvPr>
             <p:ph type="body" sz="half" idx="1"/>
           </p:nvPr>
         </p:nvSpPr>
         <p:spPr>
+          <a:xfrm>
+            <a:off x="914397" y="2022250"/>
+            <a:ext cx="5181605" cy="3747181"/>
+          </a:xfrm>
           <a:prstGeom prst="rect">
             <a:avLst/>
           </a:prstGeom>
@@ -4753,16 +4795,16 @@
       </p:sp>
       <p:sp>
         <p:nvSpPr>
-          <p:cNvPr id="202" name="Slide Number Placeholder 4"/>
+          <p:cNvPr id="225" name="Slide Number Placeholder 4"/>
           <p:cNvSpPr txBox="1"/>
           <p:nvPr>
-            <p:ph type="sldNum" sz="quarter" idx="2"/>
+            <p:ph type="sldNum" sz="quarter" idx="4294967295"/>
           </p:nvPr>
         </p:nvSpPr>
         <p:spPr>
           <a:xfrm>
-            <a:off x="914400" y="6259740"/>
-            <a:ext cx="273656" cy="269241"/>
+            <a:off x="914399" y="6259740"/>
+            <a:ext cx="273653" cy="269237"/>
           </a:xfrm>
           <a:prstGeom prst="rect">
             <a:avLst/>
@@ -4784,7 +4826,7 @@
       </p:sp>
       <p:pic>
         <p:nvPicPr>
-          <p:cNvPr id="203" name="Picture Placeholder 17" descr="Picture Placeholder 17"/>
+          <p:cNvPr id="226" name="Picture Placeholder 17" descr="Picture Placeholder 17"/>
           <p:cNvPicPr>
             <a:picLocks noChangeAspect="1"/>
           </p:cNvPicPr>
@@ -4796,15 +4838,15 @@
           <a:blip r:embed="rId2">
             <a:extLst/>
           </a:blip>
-          <a:srcRect l="81" t="0" r="80" b="0"/>
+          <a:srcRect l="81" t="0" r="79" b="0"/>
           <a:stretch>
             <a:fillRect/>
           </a:stretch>
         </p:blipFill>
         <p:spPr>
           <a:xfrm>
-            <a:off x="6076950" y="0"/>
-            <a:ext cx="6115051" cy="6868887"/>
+            <a:off x="6076949" y="0"/>
+            <a:ext cx="6115053" cy="6868887"/>
           </a:xfrm>
           <a:prstGeom prst="rect">
             <a:avLst/>
@@ -4839,7 +4881,7 @@
       </p:grpSpPr>
       <p:sp>
         <p:nvSpPr>
-          <p:cNvPr id="205" name="Title 1"/>
+          <p:cNvPr id="228" name="Title 1"/>
           <p:cNvSpPr txBox="1"/>
           <p:nvPr>
             <p:ph type="title"/>
@@ -4867,13 +4909,17 @@
       </p:sp>
       <p:sp>
         <p:nvSpPr>
-          <p:cNvPr id="206" name="Content Placeholder 2"/>
+          <p:cNvPr id="229" name="Content Placeholder 2"/>
           <p:cNvSpPr txBox="1"/>
           <p:nvPr>
             <p:ph type="body" sz="quarter" idx="1"/>
           </p:nvPr>
         </p:nvSpPr>
         <p:spPr>
+          <a:xfrm>
+            <a:off x="914399" y="2022250"/>
+            <a:ext cx="3299014" cy="3914910"/>
+          </a:xfrm>
           <a:prstGeom prst="rect">
             <a:avLst/>
           </a:prstGeom>
@@ -4921,7 +4967,7 @@
       </p:sp>
       <p:graphicFrame>
         <p:nvGraphicFramePr>
-          <p:cNvPr id="207" name="Table 11"/>
+          <p:cNvPr id="230" name="Table 11"/>
           <p:cNvGraphicFramePr/>
           <p:nvPr/>
         </p:nvGraphicFramePr>
@@ -4949,7 +4995,9 @@
                     <a:lstStyle/>
                     <a:p>
                       <a:pPr>
-                        <a:defRPr sz="1800"/>
+                        <a:defRPr>
+                          <a:sym typeface="Calibri"/>
+                        </a:defRPr>
                       </a:pPr>
                     </a:p>
                   </a:txBody>
@@ -4968,7 +5016,9 @@
                         </a:defRPr>
                       </a:pPr>
                       <a:r>
-                        <a:rPr b="1"/>
+                        <a:rPr b="1">
+                          <a:sym typeface="Calibri"/>
+                        </a:rPr>
                         <a:t>Clients</a:t>
                       </a:r>
                     </a:p>
@@ -4988,7 +5038,9 @@
                         </a:defRPr>
                       </a:pPr>
                       <a:r>
-                        <a:rPr b="1"/>
+                        <a:rPr b="1">
+                          <a:sym typeface="Calibri"/>
+                        </a:rPr>
                         <a:t>Orders</a:t>
                       </a:r>
                     </a:p>
@@ -5008,7 +5060,9 @@
                         </a:defRPr>
                       </a:pPr>
                       <a:r>
-                        <a:rPr b="1"/>
+                        <a:rPr b="1">
+                          <a:sym typeface="Calibri"/>
+                        </a:rPr>
                         <a:t>Gross revenue</a:t>
                       </a:r>
                     </a:p>
@@ -5028,7 +5082,9 @@
                         </a:defRPr>
                       </a:pPr>
                       <a:r>
-                        <a:rPr b="1"/>
+                        <a:rPr b="1">
+                          <a:sym typeface="Calibri"/>
+                        </a:rPr>
                         <a:t>Net revenue</a:t>
                       </a:r>
                     </a:p>
@@ -5046,6 +5102,9 @@
                         <a:defRPr sz="1800"/>
                       </a:pPr>
                       <a:r>
+                        <a:rPr>
+                          <a:sym typeface="Calibri"/>
+                        </a:rPr>
                         <a:t>20XX</a:t>
                       </a:r>
                     </a:p>
@@ -5061,6 +5120,9 @@
                         <a:defRPr sz="1800"/>
                       </a:pPr>
                       <a:r>
+                        <a:rPr>
+                          <a:sym typeface="Calibri"/>
+                        </a:rPr>
                         <a:t>10</a:t>
                       </a:r>
                     </a:p>
@@ -5076,6 +5138,9 @@
                         <a:defRPr sz="1800"/>
                       </a:pPr>
                       <a:r>
+                        <a:rPr>
+                          <a:sym typeface="Calibri"/>
+                        </a:rPr>
                         <a:t>1100</a:t>
                       </a:r>
                     </a:p>
@@ -5091,6 +5156,9 @@
                         <a:defRPr sz="1800"/>
                       </a:pPr>
                       <a:r>
+                        <a:rPr>
+                          <a:sym typeface="Calibri"/>
+                        </a:rPr>
                         <a:t>$10,000</a:t>
                       </a:r>
                     </a:p>
@@ -5106,6 +5174,9 @@
                         <a:defRPr sz="1800"/>
                       </a:pPr>
                       <a:r>
+                        <a:rPr>
+                          <a:sym typeface="Calibri"/>
+                        </a:rPr>
                         <a:t>$7,000</a:t>
                       </a:r>
                     </a:p>
@@ -5123,6 +5194,9 @@
                         <a:defRPr sz="1800"/>
                       </a:pPr>
                       <a:r>
+                        <a:rPr>
+                          <a:sym typeface="Calibri"/>
+                        </a:rPr>
                         <a:t>20XX</a:t>
                       </a:r>
                     </a:p>
@@ -5138,6 +5212,9 @@
                         <a:defRPr sz="1800"/>
                       </a:pPr>
                       <a:r>
+                        <a:rPr>
+                          <a:sym typeface="Calibri"/>
+                        </a:rPr>
                         <a:t>20</a:t>
                       </a:r>
                     </a:p>
@@ -5153,6 +5230,9 @@
                         <a:defRPr sz="1800"/>
                       </a:pPr>
                       <a:r>
+                        <a:rPr>
+                          <a:sym typeface="Calibri"/>
+                        </a:rPr>
                         <a:t>200</a:t>
                       </a:r>
                     </a:p>
@@ -5168,6 +5248,9 @@
                         <a:defRPr sz="1800"/>
                       </a:pPr>
                       <a:r>
+                        <a:rPr>
+                          <a:sym typeface="Calibri"/>
+                        </a:rPr>
                         <a:t>$20,000</a:t>
                       </a:r>
                     </a:p>
@@ -5183,6 +5266,9 @@
                         <a:defRPr sz="1800"/>
                       </a:pPr>
                       <a:r>
+                        <a:rPr>
+                          <a:sym typeface="Calibri"/>
+                        </a:rPr>
                         <a:t>$16,000</a:t>
                       </a:r>
                     </a:p>
@@ -5200,6 +5286,9 @@
                         <a:defRPr sz="1800"/>
                       </a:pPr>
                       <a:r>
+                        <a:rPr>
+                          <a:sym typeface="Calibri"/>
+                        </a:rPr>
                         <a:t>20XX</a:t>
                       </a:r>
                     </a:p>
@@ -5215,6 +5304,9 @@
                         <a:defRPr sz="1800"/>
                       </a:pPr>
                       <a:r>
+                        <a:rPr>
+                          <a:sym typeface="Calibri"/>
+                        </a:rPr>
                         <a:t>30</a:t>
                       </a:r>
                     </a:p>
@@ -5230,6 +5322,9 @@
                         <a:defRPr sz="1800"/>
                       </a:pPr>
                       <a:r>
+                        <a:rPr>
+                          <a:sym typeface="Calibri"/>
+                        </a:rPr>
                         <a:t>300</a:t>
                       </a:r>
                     </a:p>
@@ -5245,6 +5340,9 @@
                         <a:defRPr sz="1800"/>
                       </a:pPr>
                       <a:r>
+                        <a:rPr>
+                          <a:sym typeface="Calibri"/>
+                        </a:rPr>
                         <a:t>$30,000</a:t>
                       </a:r>
                     </a:p>
@@ -5260,6 +5358,9 @@
                         <a:defRPr sz="1800"/>
                       </a:pPr>
                       <a:r>
+                        <a:rPr>
+                          <a:sym typeface="Calibri"/>
+                        </a:rPr>
                         <a:t>$25,000</a:t>
                       </a:r>
                     </a:p>
@@ -5277,6 +5378,9 @@
                         <a:defRPr sz="1800"/>
                       </a:pPr>
                       <a:r>
+                        <a:rPr>
+                          <a:sym typeface="Calibri"/>
+                        </a:rPr>
                         <a:t>20XX</a:t>
                       </a:r>
                     </a:p>
@@ -5292,6 +5396,9 @@
                         <a:defRPr sz="1800"/>
                       </a:pPr>
                       <a:r>
+                        <a:rPr>
+                          <a:sym typeface="Calibri"/>
+                        </a:rPr>
                         <a:t>40</a:t>
                       </a:r>
                     </a:p>
@@ -5307,6 +5414,9 @@
                         <a:defRPr sz="1800"/>
                       </a:pPr>
                       <a:r>
+                        <a:rPr>
+                          <a:sym typeface="Calibri"/>
+                        </a:rPr>
                         <a:t>400</a:t>
                       </a:r>
                     </a:p>
@@ -5322,6 +5432,9 @@
                         <a:defRPr sz="1800"/>
                       </a:pPr>
                       <a:r>
+                        <a:rPr>
+                          <a:sym typeface="Calibri"/>
+                        </a:rPr>
                         <a:t>$40,000</a:t>
                       </a:r>
                     </a:p>
@@ -5337,6 +5450,9 @@
                         <a:defRPr sz="1800"/>
                       </a:pPr>
                       <a:r>
+                        <a:rPr>
+                          <a:sym typeface="Calibri"/>
+                        </a:rPr>
                         <a:t>$30,000</a:t>
                       </a:r>
                     </a:p>
@@ -5350,16 +5466,16 @@
       </p:graphicFrame>
       <p:sp>
         <p:nvSpPr>
-          <p:cNvPr id="208" name="Slide Number Placeholder 4"/>
+          <p:cNvPr id="231" name="Slide Number Placeholder 4"/>
           <p:cNvSpPr txBox="1"/>
           <p:nvPr>
-            <p:ph type="sldNum" sz="quarter" idx="2"/>
+            <p:ph type="sldNum" sz="quarter" idx="4294967295"/>
           </p:nvPr>
         </p:nvSpPr>
         <p:spPr>
           <a:xfrm>
-            <a:off x="914400" y="6259740"/>
-            <a:ext cx="273656" cy="269241"/>
+            <a:off x="914399" y="6259740"/>
+            <a:ext cx="273653" cy="269237"/>
           </a:xfrm>
           <a:prstGeom prst="rect">
             <a:avLst/>
@@ -5407,7 +5523,7 @@
       </p:grpSpPr>
       <p:sp>
         <p:nvSpPr>
-          <p:cNvPr id="210" name="Title 1"/>
+          <p:cNvPr id="233" name="Title 1"/>
           <p:cNvSpPr txBox="1"/>
           <p:nvPr>
             <p:ph type="title"/>
@@ -5415,8 +5531,8 @@
         </p:nvSpPr>
         <p:spPr>
           <a:xfrm>
-            <a:off x="891990" y="434224"/>
-            <a:ext cx="9524998" cy="1499629"/>
+            <a:off x="891990" y="434223"/>
+            <a:ext cx="9524998" cy="1499630"/>
           </a:xfrm>
           <a:prstGeom prst="rect">
             <a:avLst/>
@@ -5435,7 +5551,7 @@
       </p:sp>
       <p:sp>
         <p:nvSpPr>
-          <p:cNvPr id="211" name="Content Placeholder 2"/>
+          <p:cNvPr id="234" name="Content Placeholder 2"/>
           <p:cNvSpPr txBox="1"/>
           <p:nvPr>
             <p:ph type="body" sz="half" idx="1"/>
@@ -5443,8 +5559,8 @@
         </p:nvSpPr>
         <p:spPr>
           <a:xfrm>
-            <a:off x="914398" y="2022250"/>
-            <a:ext cx="6257368" cy="3914910"/>
+            <a:off x="914396" y="2022250"/>
+            <a:ext cx="6257371" cy="3914910"/>
           </a:xfrm>
           <a:prstGeom prst="rect">
             <a:avLst/>
@@ -5487,14 +5603,14 @@
       </p:sp>
       <p:sp>
         <p:nvSpPr>
-          <p:cNvPr id="212" name="Content Placeholder 3"/>
+          <p:cNvPr id="235" name="Content Placeholder 3"/>
           <p:cNvSpPr txBox="1"/>
           <p:nvPr/>
         </p:nvSpPr>
         <p:spPr>
           <a:xfrm>
-            <a:off x="8013194" y="2018119"/>
-            <a:ext cx="2358075" cy="3931919"/>
+            <a:off x="8013193" y="2018119"/>
+            <a:ext cx="2358077" cy="3931920"/>
           </a:xfrm>
           <a:prstGeom prst="rect">
             <a:avLst/>
@@ -5509,7 +5625,7 @@
           </a:extLst>
         </p:spPr>
         <p:txBody>
-          <a:bodyPr lIns="45719" rIns="45719">
+          <a:bodyPr lIns="45718" tIns="45718" rIns="45718" bIns="45718">
             <a:normAutofit fontScale="100000" lnSpcReduction="0"/>
           </a:bodyPr>
           <a:lstStyle/>
@@ -5524,7 +5640,12 @@
               <a:buSzPct val="100000"/>
               <a:buFont typeface="Arial"/>
               <a:buChar char="•"/>
-              <a:defRPr b="1" sz="2000"/>
+              <a:defRPr b="1" sz="2000">
+                <a:latin typeface="Tenorite"/>
+                <a:ea typeface="Tenorite"/>
+                <a:cs typeface="Tenorite"/>
+                <a:sym typeface="Tenorite"/>
+              </a:defRPr>
             </a:pPr>
             <a:r>
               <a:t>Close the gap</a:t>
@@ -5541,7 +5662,12 @@
               <a:buSzPct val="100000"/>
               <a:buFont typeface="Arial"/>
               <a:buChar char="•"/>
-              <a:defRPr b="1" sz="2000"/>
+              <a:defRPr b="1" sz="2000">
+                <a:latin typeface="Tenorite"/>
+                <a:ea typeface="Tenorite"/>
+                <a:cs typeface="Tenorite"/>
+                <a:sym typeface="Tenorite"/>
+              </a:defRPr>
             </a:pPr>
             <a:r>
               <a:t>Target audience </a:t>
@@ -5558,7 +5684,12 @@
               <a:buSzPct val="100000"/>
               <a:buFont typeface="Arial"/>
               <a:buChar char="•"/>
-              <a:defRPr b="1" sz="2000"/>
+              <a:defRPr b="1" sz="2000">
+                <a:latin typeface="Tenorite"/>
+                <a:ea typeface="Tenorite"/>
+                <a:cs typeface="Tenorite"/>
+                <a:sym typeface="Tenorite"/>
+              </a:defRPr>
             </a:pPr>
             <a:r>
               <a:t>Cost savings</a:t>
@@ -5575,7 +5706,12 @@
               <a:buSzPct val="100000"/>
               <a:buFont typeface="Arial"/>
               <a:buChar char="•"/>
-              <a:defRPr b="1" sz="2000"/>
+              <a:defRPr b="1" sz="2000">
+                <a:latin typeface="Tenorite"/>
+                <a:ea typeface="Tenorite"/>
+                <a:cs typeface="Tenorite"/>
+                <a:sym typeface="Tenorite"/>
+              </a:defRPr>
             </a:pPr>
             <a:r>
               <a:t>Easy to use</a:t>
@@ -5585,16 +5721,16 @@
       </p:sp>
       <p:sp>
         <p:nvSpPr>
-          <p:cNvPr id="213" name="Slide Number Placeholder 4"/>
+          <p:cNvPr id="236" name="Slide Number Placeholder 4"/>
           <p:cNvSpPr txBox="1"/>
           <p:nvPr>
-            <p:ph type="sldNum" sz="quarter" idx="2"/>
+            <p:ph type="sldNum" sz="quarter" idx="4294967295"/>
           </p:nvPr>
         </p:nvSpPr>
         <p:spPr>
           <a:xfrm>
-            <a:off x="914400" y="6259740"/>
-            <a:ext cx="273656" cy="269241"/>
+            <a:off x="914399" y="6259740"/>
+            <a:ext cx="273653" cy="269237"/>
           </a:xfrm>
           <a:prstGeom prst="rect">
             <a:avLst/>
@@ -5642,7 +5778,7 @@
       </p:grpSpPr>
       <p:pic>
         <p:nvPicPr>
-          <p:cNvPr id="215" name="Graphic 2" descr="Graphic 2"/>
+          <p:cNvPr id="238" name="Graphic 2" descr="Graphic 2"/>
           <p:cNvPicPr>
             <a:picLocks noChangeAspect="1"/>
           </p:cNvPicPr>
@@ -5659,8 +5795,8 @@
         </p:blipFill>
         <p:spPr>
           <a:xfrm flipH="1">
-            <a:off x="-1" y="0"/>
-            <a:ext cx="5181602" cy="6858000"/>
+            <a:off x="-2" y="0"/>
+            <a:ext cx="5181604" cy="6858000"/>
           </a:xfrm>
           <a:prstGeom prst="rect">
             <a:avLst/>
@@ -5672,7 +5808,7 @@
       </p:pic>
       <p:sp>
         <p:nvSpPr>
-          <p:cNvPr id="216" name="Title 6"/>
+          <p:cNvPr id="239" name="Title 6"/>
           <p:cNvSpPr txBox="1"/>
           <p:nvPr>
             <p:ph type="title"/>
@@ -5680,8 +5816,8 @@
         </p:nvSpPr>
         <p:spPr>
           <a:xfrm>
-            <a:off x="6091515" y="374089"/>
-            <a:ext cx="5057105" cy="3624986"/>
+            <a:off x="6091515" y="374087"/>
+            <a:ext cx="5057105" cy="3624990"/>
           </a:xfrm>
           <a:prstGeom prst="rect">
             <a:avLst/>
@@ -5700,13 +5836,17 @@
       </p:sp>
       <p:sp>
         <p:nvSpPr>
-          <p:cNvPr id="217" name="Content Placeholder 9"/>
+          <p:cNvPr id="240" name="Content Placeholder 9"/>
           <p:cNvSpPr txBox="1"/>
           <p:nvPr>
             <p:ph type="body" sz="quarter" idx="1"/>
           </p:nvPr>
         </p:nvSpPr>
         <p:spPr>
+          <a:xfrm>
+            <a:off x="6091513" y="4172989"/>
+            <a:ext cx="5057106" cy="2519366"/>
+          </a:xfrm>
           <a:prstGeom prst="rect">
             <a:avLst/>
           </a:prstGeom>
@@ -5768,68 +5908,16 @@
       </p:grpSpPr>
       <p:sp>
         <p:nvSpPr>
-          <p:cNvPr id="153" name="Title 2"/>
+          <p:cNvPr id="153" name="Slide Number Placeholder 1"/>
           <p:cNvSpPr txBox="1"/>
           <p:nvPr>
-            <p:ph type="title"/>
+            <p:ph type="sldNum" sz="quarter" idx="4294967295"/>
           </p:nvPr>
         </p:nvSpPr>
         <p:spPr>
           <a:xfrm>
-            <a:off x="914400" y="315533"/>
-            <a:ext cx="5181600" cy="2376868"/>
-          </a:xfrm>
-          <a:prstGeom prst="rect">
-            <a:avLst/>
-          </a:prstGeom>
-        </p:spPr>
-        <p:txBody>
-          <a:bodyPr/>
-          <a:lstStyle/>
-          <a:p>
-            <a:pPr/>
-            <a:r>
-              <a:t>Problem Description</a:t>
-            </a:r>
-          </a:p>
-        </p:txBody>
-      </p:sp>
-      <p:sp>
-        <p:nvSpPr>
-          <p:cNvPr id="154" name="Content Placeholder 3"/>
-          <p:cNvSpPr txBox="1"/>
-          <p:nvPr>
-            <p:ph type="body" sz="quarter" idx="1"/>
-          </p:nvPr>
-        </p:nvSpPr>
-        <p:spPr>
-          <a:prstGeom prst="rect">
-            <a:avLst/>
-          </a:prstGeom>
-        </p:spPr>
-        <p:txBody>
-          <a:bodyPr/>
-          <a:lstStyle/>
-          <a:p>
-            <a:pPr/>
-            <a:r>
-              <a:t>At Contoso, we empower organizations to foster collaborative thinking to further drive workplace innovation. By closing the loop and leveraging agile frameworks, we help business grow organically and foster a consumer first mindset.</a:t>
-            </a:r>
-          </a:p>
-        </p:txBody>
-      </p:sp>
-      <p:sp>
-        <p:nvSpPr>
-          <p:cNvPr id="155" name="Slide Number Placeholder 1"/>
-          <p:cNvSpPr txBox="1"/>
-          <p:nvPr>
-            <p:ph type="sldNum" sz="quarter" idx="2"/>
-          </p:nvPr>
-        </p:nvSpPr>
-        <p:spPr>
-          <a:xfrm>
-            <a:off x="914400" y="6259740"/>
-            <a:ext cx="188898" cy="269241"/>
+            <a:off x="914399" y="6259740"/>
+            <a:ext cx="188894" cy="269237"/>
           </a:xfrm>
           <a:prstGeom prst="rect">
             <a:avLst/>
@@ -5846,6 +5934,914 @@
           <a:p>
             <a:pPr/>
             <a:fld id="{86CB4B4D-7CA3-9044-876B-883B54F8677D}" type="slidenum"/>
+          </a:p>
+        </p:txBody>
+      </p:sp>
+      <p:grpSp>
+        <p:nvGrpSpPr>
+          <p:cNvPr id="156" name="LAX"/>
+          <p:cNvGrpSpPr/>
+          <p:nvPr/>
+        </p:nvGrpSpPr>
+        <p:grpSpPr>
+          <a:xfrm>
+            <a:off x="1023933" y="3336094"/>
+            <a:ext cx="694186" cy="694185"/>
+            <a:chOff x="0" y="0"/>
+            <a:chExt cx="694184" cy="694184"/>
+          </a:xfrm>
+        </p:grpSpPr>
+        <p:sp>
+          <p:nvSpPr>
+            <p:cNvPr id="154" name="Circle"/>
+            <p:cNvSpPr/>
+            <p:nvPr/>
+          </p:nvSpPr>
+          <p:spPr>
+            <a:xfrm>
+              <a:off x="-1" y="-1"/>
+              <a:ext cx="694186" cy="694186"/>
+            </a:xfrm>
+            <a:prstGeom prst="ellipse">
+              <a:avLst/>
+            </a:prstGeom>
+            <a:gradFill flip="none" rotWithShape="1">
+              <a:gsLst>
+                <a:gs pos="0">
+                  <a:srgbClr val="1287F6"/>
+                </a:gs>
+                <a:gs pos="100000">
+                  <a:schemeClr val="accent5">
+                    <a:hueOff val="329330"/>
+                    <a:satOff val="40776"/>
+                    <a:lumOff val="24655"/>
+                  </a:schemeClr>
+                </a:gs>
+              </a:gsLst>
+              <a:lin ang="16976440" scaled="0"/>
+            </a:gradFill>
+            <a:ln w="9525" cap="flat">
+              <a:solidFill>
+                <a:srgbClr val="4F80EF"/>
+              </a:solidFill>
+              <a:prstDash val="solid"/>
+              <a:round/>
+            </a:ln>
+            <a:effectLst>
+              <a:outerShdw sx="100000" sy="100000" kx="0" ky="0" algn="b" rotWithShape="0" blurRad="63500" dist="25400" dir="5400000">
+                <a:srgbClr val="000000">
+                  <a:alpha val="50000"/>
+                </a:srgbClr>
+              </a:outerShdw>
+            </a:effectLst>
+          </p:spPr>
+          <p:txBody>
+            <a:bodyPr wrap="square" lIns="45718" tIns="45718" rIns="45718" bIns="45718" numCol="1" anchor="ctr">
+              <a:noAutofit/>
+            </a:bodyPr>
+            <a:lstStyle/>
+            <a:p>
+              <a:pPr algn="ctr">
+                <a:defRPr>
+                  <a:solidFill>
+                    <a:srgbClr val="FFFFFF"/>
+                  </a:solidFill>
+                </a:defRPr>
+              </a:pPr>
+            </a:p>
+          </p:txBody>
+        </p:sp>
+        <p:sp>
+          <p:nvSpPr>
+            <p:cNvPr id="155" name="LAX"/>
+            <p:cNvSpPr txBox="1"/>
+            <p:nvPr/>
+          </p:nvSpPr>
+          <p:spPr>
+            <a:xfrm>
+              <a:off x="106423" y="208095"/>
+              <a:ext cx="481337" cy="277993"/>
+            </a:xfrm>
+            <a:prstGeom prst="rect">
+              <a:avLst/>
+            </a:prstGeom>
+            <a:noFill/>
+            <a:ln w="12700" cap="flat">
+              <a:noFill/>
+              <a:miter lim="400000"/>
+            </a:ln>
+            <a:effectLst/>
+            <a:extLst>
+              <a:ext uri="{C572A759-6A51-4108-AA02-DFA0A04FC94B}">
+                <ma14:wrappingTextBoxFlag xmlns:ma14="http://schemas.microsoft.com/office/mac/drawingml/2011/main" val="1"/>
+              </a:ext>
+            </a:extLst>
+          </p:spPr>
+          <p:txBody>
+            <a:bodyPr wrap="square" lIns="45718" tIns="45718" rIns="45718" bIns="45718" numCol="1" anchor="ctr">
+              <a:spAutoFit/>
+            </a:bodyPr>
+            <a:lstStyle>
+              <a:lvl1pPr algn="ctr">
+                <a:defRPr sz="1500">
+                  <a:solidFill>
+                    <a:srgbClr val="FFFFFF"/>
+                  </a:solidFill>
+                </a:defRPr>
+              </a:lvl1pPr>
+            </a:lstStyle>
+            <a:p>
+              <a:pPr/>
+              <a:r>
+                <a:t>LAX</a:t>
+              </a:r>
+            </a:p>
+          </p:txBody>
+        </p:sp>
+      </p:grpSp>
+      <p:grpSp>
+        <p:nvGrpSpPr>
+          <p:cNvPr id="159" name="JFK"/>
+          <p:cNvGrpSpPr/>
+          <p:nvPr/>
+        </p:nvGrpSpPr>
+        <p:grpSpPr>
+          <a:xfrm>
+            <a:off x="2438623" y="1868236"/>
+            <a:ext cx="694185" cy="694185"/>
+            <a:chOff x="0" y="0"/>
+            <a:chExt cx="694184" cy="694184"/>
+          </a:xfrm>
+        </p:grpSpPr>
+        <p:sp>
+          <p:nvSpPr>
+            <p:cNvPr id="157" name="Circle"/>
+            <p:cNvSpPr/>
+            <p:nvPr/>
+          </p:nvSpPr>
+          <p:spPr>
+            <a:xfrm>
+              <a:off x="-1" y="-1"/>
+              <a:ext cx="694186" cy="694186"/>
+            </a:xfrm>
+            <a:prstGeom prst="ellipse">
+              <a:avLst/>
+            </a:prstGeom>
+            <a:gradFill flip="none" rotWithShape="1">
+              <a:gsLst>
+                <a:gs pos="0">
+                  <a:srgbClr val="1287F6"/>
+                </a:gs>
+                <a:gs pos="100000">
+                  <a:schemeClr val="accent5">
+                    <a:hueOff val="329330"/>
+                    <a:satOff val="40776"/>
+                    <a:lumOff val="24655"/>
+                  </a:schemeClr>
+                </a:gs>
+              </a:gsLst>
+              <a:lin ang="16976440" scaled="0"/>
+            </a:gradFill>
+            <a:ln w="9525" cap="flat">
+              <a:solidFill>
+                <a:srgbClr val="4F80EF"/>
+              </a:solidFill>
+              <a:prstDash val="solid"/>
+              <a:round/>
+            </a:ln>
+            <a:effectLst>
+              <a:outerShdw sx="100000" sy="100000" kx="0" ky="0" algn="b" rotWithShape="0" blurRad="63500" dist="25400" dir="5400000">
+                <a:srgbClr val="000000">
+                  <a:alpha val="50000"/>
+                </a:srgbClr>
+              </a:outerShdw>
+            </a:effectLst>
+          </p:spPr>
+          <p:txBody>
+            <a:bodyPr wrap="square" lIns="45718" tIns="45718" rIns="45718" bIns="45718" numCol="1" anchor="ctr">
+              <a:noAutofit/>
+            </a:bodyPr>
+            <a:lstStyle/>
+            <a:p>
+              <a:pPr algn="ctr">
+                <a:defRPr>
+                  <a:solidFill>
+                    <a:srgbClr val="FFFFFF"/>
+                  </a:solidFill>
+                </a:defRPr>
+              </a:pPr>
+            </a:p>
+          </p:txBody>
+        </p:sp>
+        <p:sp>
+          <p:nvSpPr>
+            <p:cNvPr id="158" name="JFK"/>
+            <p:cNvSpPr txBox="1"/>
+            <p:nvPr/>
+          </p:nvSpPr>
+          <p:spPr>
+            <a:xfrm>
+              <a:off x="106423" y="208095"/>
+              <a:ext cx="481338" cy="277993"/>
+            </a:xfrm>
+            <a:prstGeom prst="rect">
+              <a:avLst/>
+            </a:prstGeom>
+            <a:noFill/>
+            <a:ln w="12700" cap="flat">
+              <a:noFill/>
+              <a:miter lim="400000"/>
+            </a:ln>
+            <a:effectLst/>
+            <a:extLst>
+              <a:ext uri="{C572A759-6A51-4108-AA02-DFA0A04FC94B}">
+                <ma14:wrappingTextBoxFlag xmlns:ma14="http://schemas.microsoft.com/office/mac/drawingml/2011/main" val="1"/>
+              </a:ext>
+            </a:extLst>
+          </p:spPr>
+          <p:txBody>
+            <a:bodyPr wrap="square" lIns="45718" tIns="45718" rIns="45718" bIns="45718" numCol="1" anchor="ctr">
+              <a:spAutoFit/>
+            </a:bodyPr>
+            <a:lstStyle>
+              <a:lvl1pPr algn="ctr">
+                <a:defRPr sz="1500">
+                  <a:solidFill>
+                    <a:srgbClr val="FFFFFF"/>
+                  </a:solidFill>
+                </a:defRPr>
+              </a:lvl1pPr>
+            </a:lstStyle>
+            <a:p>
+              <a:pPr/>
+              <a:r>
+                <a:t>JFK</a:t>
+              </a:r>
+            </a:p>
+          </p:txBody>
+        </p:sp>
+      </p:grpSp>
+      <p:grpSp>
+        <p:nvGrpSpPr>
+          <p:cNvPr id="162" name="MIA"/>
+          <p:cNvGrpSpPr/>
+          <p:nvPr/>
+        </p:nvGrpSpPr>
+        <p:grpSpPr>
+          <a:xfrm>
+            <a:off x="3853312" y="3336094"/>
+            <a:ext cx="694185" cy="694185"/>
+            <a:chOff x="0" y="0"/>
+            <a:chExt cx="694184" cy="694184"/>
+          </a:xfrm>
+        </p:grpSpPr>
+        <p:sp>
+          <p:nvSpPr>
+            <p:cNvPr id="160" name="Circle"/>
+            <p:cNvSpPr/>
+            <p:nvPr/>
+          </p:nvSpPr>
+          <p:spPr>
+            <a:xfrm>
+              <a:off x="-1" y="-1"/>
+              <a:ext cx="694186" cy="694186"/>
+            </a:xfrm>
+            <a:prstGeom prst="ellipse">
+              <a:avLst/>
+            </a:prstGeom>
+            <a:gradFill flip="none" rotWithShape="1">
+              <a:gsLst>
+                <a:gs pos="0">
+                  <a:srgbClr val="1287F6"/>
+                </a:gs>
+                <a:gs pos="100000">
+                  <a:schemeClr val="accent5">
+                    <a:hueOff val="329330"/>
+                    <a:satOff val="40776"/>
+                    <a:lumOff val="24655"/>
+                  </a:schemeClr>
+                </a:gs>
+              </a:gsLst>
+              <a:lin ang="16976440" scaled="0"/>
+            </a:gradFill>
+            <a:ln w="9525" cap="flat">
+              <a:solidFill>
+                <a:srgbClr val="4F80EF"/>
+              </a:solidFill>
+              <a:prstDash val="solid"/>
+              <a:round/>
+            </a:ln>
+            <a:effectLst>
+              <a:outerShdw sx="100000" sy="100000" kx="0" ky="0" algn="b" rotWithShape="0" blurRad="63500" dist="25400" dir="5400000">
+                <a:srgbClr val="000000">
+                  <a:alpha val="50000"/>
+                </a:srgbClr>
+              </a:outerShdw>
+            </a:effectLst>
+          </p:spPr>
+          <p:txBody>
+            <a:bodyPr wrap="square" lIns="45718" tIns="45718" rIns="45718" bIns="45718" numCol="1" anchor="ctr">
+              <a:noAutofit/>
+            </a:bodyPr>
+            <a:lstStyle/>
+            <a:p>
+              <a:pPr algn="ctr">
+                <a:defRPr>
+                  <a:solidFill>
+                    <a:srgbClr val="FFFFFF"/>
+                  </a:solidFill>
+                </a:defRPr>
+              </a:pPr>
+            </a:p>
+          </p:txBody>
+        </p:sp>
+        <p:sp>
+          <p:nvSpPr>
+            <p:cNvPr id="161" name="MIA"/>
+            <p:cNvSpPr txBox="1"/>
+            <p:nvPr/>
+          </p:nvSpPr>
+          <p:spPr>
+            <a:xfrm>
+              <a:off x="106423" y="208095"/>
+              <a:ext cx="481337" cy="277993"/>
+            </a:xfrm>
+            <a:prstGeom prst="rect">
+              <a:avLst/>
+            </a:prstGeom>
+            <a:noFill/>
+            <a:ln w="12700" cap="flat">
+              <a:noFill/>
+              <a:miter lim="400000"/>
+            </a:ln>
+            <a:effectLst/>
+            <a:extLst>
+              <a:ext uri="{C572A759-6A51-4108-AA02-DFA0A04FC94B}">
+                <ma14:wrappingTextBoxFlag xmlns:ma14="http://schemas.microsoft.com/office/mac/drawingml/2011/main" val="1"/>
+              </a:ext>
+            </a:extLst>
+          </p:spPr>
+          <p:txBody>
+            <a:bodyPr wrap="square" lIns="45718" tIns="45718" rIns="45718" bIns="45718" numCol="1" anchor="ctr">
+              <a:spAutoFit/>
+            </a:bodyPr>
+            <a:lstStyle>
+              <a:lvl1pPr algn="ctr">
+                <a:defRPr sz="1500">
+                  <a:solidFill>
+                    <a:srgbClr val="FFFFFF"/>
+                  </a:solidFill>
+                </a:defRPr>
+              </a:lvl1pPr>
+            </a:lstStyle>
+            <a:p>
+              <a:pPr/>
+              <a:r>
+                <a:t>MIA</a:t>
+              </a:r>
+            </a:p>
+          </p:txBody>
+        </p:sp>
+      </p:grpSp>
+      <p:grpSp>
+        <p:nvGrpSpPr>
+          <p:cNvPr id="165" name="HOU"/>
+          <p:cNvGrpSpPr/>
+          <p:nvPr/>
+        </p:nvGrpSpPr>
+        <p:grpSpPr>
+          <a:xfrm>
+            <a:off x="2438623" y="4803952"/>
+            <a:ext cx="694185" cy="694185"/>
+            <a:chOff x="0" y="0"/>
+            <a:chExt cx="694184" cy="694184"/>
+          </a:xfrm>
+        </p:grpSpPr>
+        <p:sp>
+          <p:nvSpPr>
+            <p:cNvPr id="163" name="Circle"/>
+            <p:cNvSpPr/>
+            <p:nvPr/>
+          </p:nvSpPr>
+          <p:spPr>
+            <a:xfrm>
+              <a:off x="-1" y="-1"/>
+              <a:ext cx="694186" cy="694186"/>
+            </a:xfrm>
+            <a:prstGeom prst="ellipse">
+              <a:avLst/>
+            </a:prstGeom>
+            <a:gradFill flip="none" rotWithShape="1">
+              <a:gsLst>
+                <a:gs pos="0">
+                  <a:srgbClr val="1287F6"/>
+                </a:gs>
+                <a:gs pos="100000">
+                  <a:schemeClr val="accent5">
+                    <a:hueOff val="329330"/>
+                    <a:satOff val="40776"/>
+                    <a:lumOff val="24655"/>
+                  </a:schemeClr>
+                </a:gs>
+              </a:gsLst>
+              <a:lin ang="16976440" scaled="0"/>
+            </a:gradFill>
+            <a:ln w="9525" cap="flat">
+              <a:solidFill>
+                <a:srgbClr val="4F80EF"/>
+              </a:solidFill>
+              <a:prstDash val="solid"/>
+              <a:round/>
+            </a:ln>
+            <a:effectLst>
+              <a:outerShdw sx="100000" sy="100000" kx="0" ky="0" algn="b" rotWithShape="0" blurRad="63500" dist="25400" dir="5400000">
+                <a:srgbClr val="000000">
+                  <a:alpha val="50000"/>
+                </a:srgbClr>
+              </a:outerShdw>
+            </a:effectLst>
+          </p:spPr>
+          <p:txBody>
+            <a:bodyPr wrap="square" lIns="45718" tIns="45718" rIns="45718" bIns="45718" numCol="1" anchor="ctr">
+              <a:noAutofit/>
+            </a:bodyPr>
+            <a:lstStyle/>
+            <a:p>
+              <a:pPr algn="ctr">
+                <a:defRPr>
+                  <a:solidFill>
+                    <a:srgbClr val="FFFFFF"/>
+                  </a:solidFill>
+                </a:defRPr>
+              </a:pPr>
+            </a:p>
+          </p:txBody>
+        </p:sp>
+        <p:sp>
+          <p:nvSpPr>
+            <p:cNvPr id="164" name="HOU"/>
+            <p:cNvSpPr txBox="1"/>
+            <p:nvPr/>
+          </p:nvSpPr>
+          <p:spPr>
+            <a:xfrm>
+              <a:off x="106423" y="208095"/>
+              <a:ext cx="481338" cy="277994"/>
+            </a:xfrm>
+            <a:prstGeom prst="rect">
+              <a:avLst/>
+            </a:prstGeom>
+            <a:noFill/>
+            <a:ln w="12700" cap="flat">
+              <a:noFill/>
+              <a:miter lim="400000"/>
+            </a:ln>
+            <a:effectLst/>
+            <a:extLst>
+              <a:ext uri="{C572A759-6A51-4108-AA02-DFA0A04FC94B}">
+                <ma14:wrappingTextBoxFlag xmlns:ma14="http://schemas.microsoft.com/office/mac/drawingml/2011/main" val="1"/>
+              </a:ext>
+            </a:extLst>
+          </p:spPr>
+          <p:txBody>
+            <a:bodyPr wrap="square" lIns="45718" tIns="45718" rIns="45718" bIns="45718" numCol="1" anchor="ctr">
+              <a:spAutoFit/>
+            </a:bodyPr>
+            <a:lstStyle>
+              <a:lvl1pPr algn="ctr">
+                <a:defRPr sz="1500">
+                  <a:solidFill>
+                    <a:srgbClr val="FFFFFF"/>
+                  </a:solidFill>
+                </a:defRPr>
+              </a:lvl1pPr>
+            </a:lstStyle>
+            <a:p>
+              <a:pPr/>
+              <a:r>
+                <a:t>HOU</a:t>
+              </a:r>
+            </a:p>
+          </p:txBody>
+        </p:sp>
+      </p:grpSp>
+      <p:sp>
+        <p:nvSpPr>
+          <p:cNvPr id="166" name="Line"/>
+          <p:cNvSpPr/>
+          <p:nvPr/>
+        </p:nvSpPr>
+        <p:spPr>
+          <a:xfrm flipV="1">
+            <a:off x="3016033" y="3925899"/>
+            <a:ext cx="942982" cy="967092"/>
+          </a:xfrm>
+          <a:prstGeom prst="line">
+            <a:avLst/>
+          </a:prstGeom>
+          <a:ln w="25400">
+            <a:solidFill>
+              <a:srgbClr val="000000"/>
+            </a:solidFill>
+          </a:ln>
+        </p:spPr>
+        <p:txBody>
+          <a:bodyPr lIns="45718" tIns="45718" rIns="45718" bIns="45718"/>
+          <a:lstStyle/>
+          <a:p>
+            <a:pPr/>
+          </a:p>
+        </p:txBody>
+      </p:sp>
+      <p:sp>
+        <p:nvSpPr>
+          <p:cNvPr id="167" name="Line"/>
+          <p:cNvSpPr/>
+          <p:nvPr/>
+        </p:nvSpPr>
+        <p:spPr>
+          <a:xfrm flipV="1">
+            <a:off x="1570879" y="2435177"/>
+            <a:ext cx="945351" cy="945350"/>
+          </a:xfrm>
+          <a:prstGeom prst="line">
+            <a:avLst/>
+          </a:prstGeom>
+          <a:ln w="25400">
+            <a:solidFill>
+              <a:srgbClr val="000000"/>
+            </a:solidFill>
+          </a:ln>
+        </p:spPr>
+        <p:txBody>
+          <a:bodyPr lIns="45718" tIns="45718" rIns="45718" bIns="45718"/>
+          <a:lstStyle/>
+          <a:p>
+            <a:pPr/>
+          </a:p>
+        </p:txBody>
+      </p:sp>
+      <p:sp>
+        <p:nvSpPr>
+          <p:cNvPr id="168" name="Line"/>
+          <p:cNvSpPr/>
+          <p:nvPr/>
+        </p:nvSpPr>
+        <p:spPr>
+          <a:xfrm flipH="1" flipV="1">
+            <a:off x="1630424" y="3915802"/>
+            <a:ext cx="894032" cy="1000097"/>
+          </a:xfrm>
+          <a:prstGeom prst="line">
+            <a:avLst/>
+          </a:prstGeom>
+          <a:ln w="25400">
+            <a:solidFill>
+              <a:srgbClr val="000000"/>
+            </a:solidFill>
+          </a:ln>
+        </p:spPr>
+        <p:txBody>
+          <a:bodyPr lIns="45718" tIns="45718" rIns="45718" bIns="45718"/>
+          <a:lstStyle/>
+          <a:p>
+            <a:pPr/>
+          </a:p>
+        </p:txBody>
+      </p:sp>
+      <p:sp>
+        <p:nvSpPr>
+          <p:cNvPr id="169" name="Line"/>
+          <p:cNvSpPr/>
+          <p:nvPr/>
+        </p:nvSpPr>
+        <p:spPr>
+          <a:xfrm flipH="1" flipV="1">
+            <a:off x="3056681" y="2436006"/>
+            <a:ext cx="893835" cy="999205"/>
+          </a:xfrm>
+          <a:prstGeom prst="line">
+            <a:avLst/>
+          </a:prstGeom>
+          <a:ln w="25400">
+            <a:solidFill>
+              <a:srgbClr val="000000"/>
+            </a:solidFill>
+          </a:ln>
+        </p:spPr>
+        <p:txBody>
+          <a:bodyPr lIns="45718" tIns="45718" rIns="45718" bIns="45718"/>
+          <a:lstStyle/>
+          <a:p>
+            <a:pPr/>
+          </a:p>
+        </p:txBody>
+      </p:sp>
+      <p:sp>
+        <p:nvSpPr>
+          <p:cNvPr id="170" name="Line"/>
+          <p:cNvSpPr/>
+          <p:nvPr/>
+        </p:nvSpPr>
+        <p:spPr>
+          <a:xfrm flipH="1" flipV="1">
+            <a:off x="2800725" y="2562232"/>
+            <a:ext cx="102" cy="2237877"/>
+          </a:xfrm>
+          <a:prstGeom prst="line">
+            <a:avLst/>
+          </a:prstGeom>
+          <a:ln w="25400">
+            <a:solidFill>
+              <a:srgbClr val="000000"/>
+            </a:solidFill>
+          </a:ln>
+        </p:spPr>
+        <p:txBody>
+          <a:bodyPr lIns="45718" tIns="45718" rIns="45718" bIns="45718"/>
+          <a:lstStyle/>
+          <a:p>
+            <a:pPr/>
+          </a:p>
+        </p:txBody>
+      </p:sp>
+      <p:sp>
+        <p:nvSpPr>
+          <p:cNvPr id="171" name="Line"/>
+          <p:cNvSpPr/>
+          <p:nvPr/>
+        </p:nvSpPr>
+        <p:spPr>
+          <a:xfrm flipH="1">
+            <a:off x="1722149" y="3669353"/>
+            <a:ext cx="2127132" cy="2"/>
+          </a:xfrm>
+          <a:prstGeom prst="line">
+            <a:avLst/>
+          </a:prstGeom>
+          <a:ln w="25400">
+            <a:solidFill>
+              <a:srgbClr val="000000"/>
+            </a:solidFill>
+          </a:ln>
+        </p:spPr>
+        <p:txBody>
+          <a:bodyPr lIns="45718" tIns="45718" rIns="45718" bIns="45718"/>
+          <a:lstStyle/>
+          <a:p>
+            <a:pPr/>
+          </a:p>
+        </p:txBody>
+      </p:sp>
+      <p:sp>
+        <p:nvSpPr>
+          <p:cNvPr id="172" name="2.475"/>
+          <p:cNvSpPr txBox="1"/>
+          <p:nvPr/>
+        </p:nvSpPr>
+        <p:spPr>
+          <a:xfrm>
+            <a:off x="1484333" y="2602522"/>
+            <a:ext cx="625295" cy="333085"/>
+          </a:xfrm>
+          <a:prstGeom prst="rect">
+            <a:avLst/>
+          </a:prstGeom>
+          <a:ln w="12700">
+            <a:miter lim="400000"/>
+          </a:ln>
+          <a:extLst>
+            <a:ext uri="{C572A759-6A51-4108-AA02-DFA0A04FC94B}">
+              <ma14:wrappingTextBoxFlag xmlns:ma14="http://schemas.microsoft.com/office/mac/drawingml/2011/main" val="1"/>
+            </a:ext>
+          </a:extLst>
+        </p:spPr>
+        <p:txBody>
+          <a:bodyPr wrap="none" lIns="45718" tIns="45718" rIns="45718" bIns="45718">
+            <a:spAutoFit/>
+          </a:bodyPr>
+          <a:lstStyle/>
+          <a:p>
+            <a:pPr/>
+            <a:r>
+              <a:t>2.475</a:t>
+            </a:r>
+          </a:p>
+        </p:txBody>
+      </p:sp>
+      <p:sp>
+        <p:nvSpPr>
+          <p:cNvPr id="173" name="1.09"/>
+          <p:cNvSpPr txBox="1"/>
+          <p:nvPr/>
+        </p:nvSpPr>
+        <p:spPr>
+          <a:xfrm>
+            <a:off x="3607784" y="2602522"/>
+            <a:ext cx="509434" cy="333085"/>
+          </a:xfrm>
+          <a:prstGeom prst="rect">
+            <a:avLst/>
+          </a:prstGeom>
+          <a:ln w="12700">
+            <a:miter lim="400000"/>
+          </a:ln>
+          <a:extLst>
+            <a:ext uri="{C572A759-6A51-4108-AA02-DFA0A04FC94B}">
+              <ma14:wrappingTextBoxFlag xmlns:ma14="http://schemas.microsoft.com/office/mac/drawingml/2011/main" val="1"/>
+            </a:ext>
+          </a:extLst>
+        </p:spPr>
+        <p:txBody>
+          <a:bodyPr wrap="none" lIns="45718" tIns="45718" rIns="45718" bIns="45718">
+            <a:spAutoFit/>
+          </a:bodyPr>
+          <a:lstStyle/>
+          <a:p>
+            <a:pPr/>
+            <a:r>
+              <a:t>1.09</a:t>
+            </a:r>
+          </a:p>
+        </p:txBody>
+      </p:sp>
+      <p:sp>
+        <p:nvSpPr>
+          <p:cNvPr id="174" name="1.39"/>
+          <p:cNvSpPr txBox="1"/>
+          <p:nvPr/>
+        </p:nvSpPr>
+        <p:spPr>
+          <a:xfrm>
+            <a:off x="1542264" y="4430764"/>
+            <a:ext cx="509433" cy="333084"/>
+          </a:xfrm>
+          <a:prstGeom prst="rect">
+            <a:avLst/>
+          </a:prstGeom>
+          <a:ln w="12700">
+            <a:miter lim="400000"/>
+          </a:ln>
+          <a:extLst>
+            <a:ext uri="{C572A759-6A51-4108-AA02-DFA0A04FC94B}">
+              <ma14:wrappingTextBoxFlag xmlns:ma14="http://schemas.microsoft.com/office/mac/drawingml/2011/main" val="1"/>
+            </a:ext>
+          </a:extLst>
+        </p:spPr>
+        <p:txBody>
+          <a:bodyPr wrap="none" lIns="45718" tIns="45718" rIns="45718" bIns="45718">
+            <a:spAutoFit/>
+          </a:bodyPr>
+          <a:lstStyle/>
+          <a:p>
+            <a:pPr/>
+            <a:r>
+              <a:t>1.39</a:t>
+            </a:r>
+          </a:p>
+        </p:txBody>
+      </p:sp>
+      <p:sp>
+        <p:nvSpPr>
+          <p:cNvPr id="175" name="1.1"/>
+          <p:cNvSpPr txBox="1"/>
+          <p:nvPr/>
+        </p:nvSpPr>
+        <p:spPr>
+          <a:xfrm>
+            <a:off x="3607784" y="4409444"/>
+            <a:ext cx="393571" cy="333084"/>
+          </a:xfrm>
+          <a:prstGeom prst="rect">
+            <a:avLst/>
+          </a:prstGeom>
+          <a:ln w="12700">
+            <a:miter lim="400000"/>
+          </a:ln>
+          <a:extLst>
+            <a:ext uri="{C572A759-6A51-4108-AA02-DFA0A04FC94B}">
+              <ma14:wrappingTextBoxFlag xmlns:ma14="http://schemas.microsoft.com/office/mac/drawingml/2011/main" val="1"/>
+            </a:ext>
+          </a:extLst>
+        </p:spPr>
+        <p:txBody>
+          <a:bodyPr wrap="none" lIns="45718" tIns="45718" rIns="45718" bIns="45718">
+            <a:spAutoFit/>
+          </a:bodyPr>
+          <a:lstStyle/>
+          <a:p>
+            <a:pPr/>
+            <a:r>
+              <a:t>1.1</a:t>
+            </a:r>
+          </a:p>
+        </p:txBody>
+      </p:sp>
+      <p:sp>
+        <p:nvSpPr>
+          <p:cNvPr id="176" name="1.74"/>
+          <p:cNvSpPr txBox="1"/>
+          <p:nvPr/>
+        </p:nvSpPr>
+        <p:spPr>
+          <a:xfrm>
+            <a:off x="2781747" y="2945374"/>
+            <a:ext cx="509433" cy="333084"/>
+          </a:xfrm>
+          <a:prstGeom prst="rect">
+            <a:avLst/>
+          </a:prstGeom>
+          <a:ln w="12700">
+            <a:miter lim="400000"/>
+          </a:ln>
+          <a:extLst>
+            <a:ext uri="{C572A759-6A51-4108-AA02-DFA0A04FC94B}">
+              <ma14:wrappingTextBoxFlag xmlns:ma14="http://schemas.microsoft.com/office/mac/drawingml/2011/main" val="1"/>
+            </a:ext>
+          </a:extLst>
+        </p:spPr>
+        <p:txBody>
+          <a:bodyPr wrap="none" lIns="45718" tIns="45718" rIns="45718" bIns="45718">
+            <a:spAutoFit/>
+          </a:bodyPr>
+          <a:lstStyle/>
+          <a:p>
+            <a:pPr/>
+            <a:r>
+              <a:t>1.74</a:t>
+            </a:r>
+          </a:p>
+        </p:txBody>
+      </p:sp>
+      <p:sp>
+        <p:nvSpPr>
+          <p:cNvPr id="177" name="2.342"/>
+          <p:cNvSpPr txBox="1"/>
+          <p:nvPr/>
+        </p:nvSpPr>
+        <p:spPr>
+          <a:xfrm>
+            <a:off x="1969313" y="3656653"/>
+            <a:ext cx="625296" cy="333084"/>
+          </a:xfrm>
+          <a:prstGeom prst="rect">
+            <a:avLst/>
+          </a:prstGeom>
+          <a:ln w="12700">
+            <a:miter lim="400000"/>
+          </a:ln>
+          <a:extLst>
+            <a:ext uri="{C572A759-6A51-4108-AA02-DFA0A04FC94B}">
+              <ma14:wrappingTextBoxFlag xmlns:ma14="http://schemas.microsoft.com/office/mac/drawingml/2011/main" val="1"/>
+            </a:ext>
+          </a:extLst>
+        </p:spPr>
+        <p:txBody>
+          <a:bodyPr wrap="none" lIns="45718" tIns="45718" rIns="45718" bIns="45718">
+            <a:spAutoFit/>
+          </a:bodyPr>
+          <a:lstStyle/>
+          <a:p>
+            <a:pPr/>
+            <a:r>
+              <a:t>2.342</a:t>
+            </a:r>
+          </a:p>
+        </p:txBody>
+      </p:sp>
+      <p:sp>
+        <p:nvSpPr>
+          <p:cNvPr id="178" name="Weights in 1K air miles"/>
+          <p:cNvSpPr txBox="1"/>
+          <p:nvPr/>
+        </p:nvSpPr>
+        <p:spPr>
+          <a:xfrm>
+            <a:off x="4622068" y="6227817"/>
+            <a:ext cx="2203172" cy="333084"/>
+          </a:xfrm>
+          <a:prstGeom prst="rect">
+            <a:avLst/>
+          </a:prstGeom>
+          <a:ln w="12700">
+            <a:miter lim="400000"/>
+          </a:ln>
+          <a:extLst>
+            <a:ext uri="{C572A759-6A51-4108-AA02-DFA0A04FC94B}">
+              <ma14:wrappingTextBoxFlag xmlns:ma14="http://schemas.microsoft.com/office/mac/drawingml/2011/main" val="1"/>
+            </a:ext>
+          </a:extLst>
+        </p:spPr>
+        <p:txBody>
+          <a:bodyPr wrap="none" lIns="45718" tIns="45718" rIns="45718" bIns="45718">
+            <a:spAutoFit/>
+          </a:bodyPr>
+          <a:lstStyle/>
+          <a:p>
+            <a:pPr/>
+            <a:r>
+              <a:t>Weights in 1K air miles</a:t>
+            </a:r>
           </a:p>
         </p:txBody>
       </p:sp>
@@ -5877,13 +6873,17 @@
       </p:grpSpPr>
       <p:sp>
         <p:nvSpPr>
-          <p:cNvPr id="157" name="Title 6"/>
+          <p:cNvPr id="180" name="Title 6"/>
           <p:cNvSpPr txBox="1"/>
           <p:nvPr>
             <p:ph type="title"/>
           </p:nvPr>
         </p:nvSpPr>
         <p:spPr>
+          <a:xfrm>
+            <a:off x="6126479" y="1310638"/>
+            <a:ext cx="4806000" cy="2689632"/>
+          </a:xfrm>
           <a:prstGeom prst="rect">
             <a:avLst/>
           </a:prstGeom>
@@ -5901,7 +6901,7 @@
       </p:sp>
       <p:pic>
         <p:nvPicPr>
-          <p:cNvPr id="158" name="Picture Placeholder 4" descr="Picture Placeholder 4"/>
+          <p:cNvPr id="181" name="Picture Placeholder 4" descr="Picture Placeholder 4"/>
           <p:cNvPicPr>
             <a:picLocks noChangeAspect="1"/>
           </p:cNvPicPr>
@@ -5919,6 +6919,10 @@
           </a:stretch>
         </p:blipFill>
         <p:spPr>
+          <a:xfrm>
+            <a:off x="0" y="-10163"/>
+            <a:ext cx="6096000" cy="6858004"/>
+          </a:xfrm>
           <a:prstGeom prst="rect">
             <a:avLst/>
           </a:prstGeom>
@@ -5926,7 +6930,7 @@
       </p:pic>
       <p:sp>
         <p:nvSpPr>
-          <p:cNvPr id="159" name="Content Placeholder 7"/>
+          <p:cNvPr id="182" name="Content Placeholder 7"/>
           <p:cNvSpPr txBox="1"/>
           <p:nvPr>
             <p:ph type="body" sz="quarter" idx="1"/>
@@ -5935,7 +6939,7 @@
         <p:spPr>
           <a:xfrm>
             <a:off x="6126162" y="4172989"/>
-            <a:ext cx="4805998" cy="2389737"/>
+            <a:ext cx="4806000" cy="2389739"/>
           </a:xfrm>
           <a:prstGeom prst="rect">
             <a:avLst/>
@@ -5980,7 +6984,7 @@
       </p:grpSpPr>
       <p:sp>
         <p:nvSpPr>
-          <p:cNvPr id="161" name="Title 1"/>
+          <p:cNvPr id="184" name="Title 1"/>
           <p:cNvSpPr txBox="1"/>
           <p:nvPr>
             <p:ph type="title"/>
@@ -5988,8 +6992,8 @@
         </p:nvSpPr>
         <p:spPr>
           <a:xfrm>
-            <a:off x="923544" y="584477"/>
-            <a:ext cx="10354054" cy="1209766"/>
+            <a:off x="923542" y="584477"/>
+            <a:ext cx="10354058" cy="1209767"/>
           </a:xfrm>
           <a:prstGeom prst="rect">
             <a:avLst/>
@@ -6008,7 +7012,7 @@
       </p:sp>
       <p:graphicFrame>
         <p:nvGraphicFramePr>
-          <p:cNvPr id="162" name="Table 9"/>
+          <p:cNvPr id="185" name="Table 9"/>
           <p:cNvGraphicFramePr/>
           <p:nvPr/>
         </p:nvGraphicFramePr>
@@ -6035,7 +7039,9 @@
                     <a:lstStyle/>
                     <a:p>
                       <a:pPr>
-                        <a:defRPr sz="1800"/>
+                        <a:defRPr>
+                          <a:sym typeface="Calibri"/>
+                        </a:defRPr>
                       </a:pPr>
                     </a:p>
                   </a:txBody>
@@ -6054,7 +7060,9 @@
                         </a:defRPr>
                       </a:pPr>
                       <a:r>
-                        <a:rPr b="1"/>
+                        <a:rPr b="1">
+                          <a:sym typeface="Calibri"/>
+                        </a:rPr>
                         <a:t>Year 1</a:t>
                       </a:r>
                     </a:p>
@@ -6074,7 +7082,9 @@
                         </a:defRPr>
                       </a:pPr>
                       <a:r>
-                        <a:rPr b="1"/>
+                        <a:rPr b="1">
+                          <a:sym typeface="Calibri"/>
+                        </a:rPr>
                         <a:t>Year 2</a:t>
                       </a:r>
                     </a:p>
@@ -6094,7 +7104,9 @@
                         </a:defRPr>
                       </a:pPr>
                       <a:r>
-                        <a:rPr b="1"/>
+                        <a:rPr b="1">
+                          <a:sym typeface="Calibri"/>
+                        </a:rPr>
                         <a:t>Year 3</a:t>
                       </a:r>
                     </a:p>
@@ -6112,6 +7124,9 @@
                         <a:defRPr sz="1800"/>
                       </a:pPr>
                       <a:r>
+                        <a:rPr>
+                          <a:sym typeface="Calibri"/>
+                        </a:rPr>
                         <a:t>Income</a:t>
                       </a:r>
                     </a:p>
@@ -6124,7 +7139,9 @@
                     <a:lstStyle/>
                     <a:p>
                       <a:pPr>
-                        <a:defRPr sz="1800"/>
+                        <a:defRPr>
+                          <a:sym typeface="Calibri"/>
+                        </a:defRPr>
                       </a:pPr>
                     </a:p>
                   </a:txBody>
@@ -6136,7 +7153,9 @@
                     <a:lstStyle/>
                     <a:p>
                       <a:pPr>
-                        <a:defRPr sz="1800"/>
+                        <a:defRPr>
+                          <a:sym typeface="Calibri"/>
+                        </a:defRPr>
                       </a:pPr>
                     </a:p>
                   </a:txBody>
@@ -6148,7 +7167,9 @@
                     <a:lstStyle/>
                     <a:p>
                       <a:pPr>
-                        <a:defRPr sz="1800"/>
+                        <a:defRPr>
+                          <a:sym typeface="Calibri"/>
+                        </a:defRPr>
                       </a:pPr>
                     </a:p>
                   </a:txBody>
@@ -6161,8 +7182,10 @@
                     <a:bodyPr/>
                     <a:lstStyle/>
                     <a:p>
-                      <a:pPr lvl="1">
-                        <a:defRPr sz="1800"/>
+                      <a:pPr lvl="1" indent="457200">
+                        <a:defRPr sz="1800">
+                          <a:sym typeface="Calibri"/>
+                        </a:defRPr>
                       </a:pPr>
                       <a:r>
                         <a:t>Users</a:t>
@@ -6180,6 +7203,9 @@
                         <a:defRPr sz="1800"/>
                       </a:pPr>
                       <a:r>
+                        <a:rPr>
+                          <a:sym typeface="Calibri"/>
+                        </a:rPr>
                         <a:t>50,000</a:t>
                       </a:r>
                     </a:p>
@@ -6195,6 +7221,9 @@
                         <a:defRPr sz="1800"/>
                       </a:pPr>
                       <a:r>
+                        <a:rPr>
+                          <a:sym typeface="Calibri"/>
+                        </a:rPr>
                         <a:t>400,000</a:t>
                       </a:r>
                     </a:p>
@@ -6210,6 +7239,9 @@
                         <a:defRPr sz="1800"/>
                       </a:pPr>
                       <a:r>
+                        <a:rPr>
+                          <a:sym typeface="Calibri"/>
+                        </a:rPr>
                         <a:t>1,600,000</a:t>
                       </a:r>
                     </a:p>
@@ -6223,8 +7255,10 @@
                     <a:bodyPr/>
                     <a:lstStyle/>
                     <a:p>
-                      <a:pPr lvl="1">
-                        <a:defRPr sz="1800"/>
+                      <a:pPr lvl="1" indent="457200">
+                        <a:defRPr sz="1800">
+                          <a:sym typeface="Calibri"/>
+                        </a:defRPr>
                       </a:pPr>
                       <a:r>
                         <a:t>Sales</a:t>
@@ -6242,6 +7276,9 @@
                         <a:defRPr sz="1800"/>
                       </a:pPr>
                       <a:r>
+                        <a:rPr>
+                          <a:sym typeface="Calibri"/>
+                        </a:rPr>
                         <a:t>500,000</a:t>
                       </a:r>
                     </a:p>
@@ -6257,6 +7294,9 @@
                         <a:defRPr sz="1800"/>
                       </a:pPr>
                       <a:r>
+                        <a:rPr>
+                          <a:sym typeface="Calibri"/>
+                        </a:rPr>
                         <a:t>4,000,000</a:t>
                       </a:r>
                     </a:p>
@@ -6272,6 +7312,9 @@
                         <a:defRPr sz="1800"/>
                       </a:pPr>
                       <a:r>
+                        <a:rPr>
+                          <a:sym typeface="Calibri"/>
+                        </a:rPr>
                         <a:t>16,000,000</a:t>
                       </a:r>
                     </a:p>
@@ -6285,8 +7328,10 @@
                     <a:bodyPr/>
                     <a:lstStyle/>
                     <a:p>
-                      <a:pPr lvl="1">
-                        <a:defRPr sz="1800"/>
+                      <a:pPr lvl="1" indent="457200">
+                        <a:defRPr sz="1800">
+                          <a:sym typeface="Calibri"/>
+                        </a:defRPr>
                       </a:pPr>
                       <a:r>
                         <a:t>Average price per sale</a:t>
@@ -6304,6 +7349,9 @@
                         <a:defRPr sz="1800"/>
                       </a:pPr>
                       <a:r>
+                        <a:rPr>
+                          <a:sym typeface="Calibri"/>
+                        </a:rPr>
                         <a:t>75</a:t>
                       </a:r>
                     </a:p>
@@ -6319,6 +7367,9 @@
                         <a:defRPr sz="1800"/>
                       </a:pPr>
                       <a:r>
+                        <a:rPr>
+                          <a:sym typeface="Calibri"/>
+                        </a:rPr>
                         <a:t>80</a:t>
                       </a:r>
                     </a:p>
@@ -6334,6 +7385,9 @@
                         <a:defRPr sz="1800"/>
                       </a:pPr>
                       <a:r>
+                        <a:rPr>
+                          <a:sym typeface="Calibri"/>
+                        </a:rPr>
                         <a:t>90</a:t>
                       </a:r>
                     </a:p>
@@ -6347,8 +7401,10 @@
                     <a:bodyPr/>
                     <a:lstStyle/>
                     <a:p>
-                      <a:pPr lvl="1">
-                        <a:defRPr sz="1800"/>
+                      <a:pPr lvl="1" indent="457200">
+                        <a:defRPr sz="1800">
+                          <a:sym typeface="Calibri"/>
+                        </a:defRPr>
                       </a:pPr>
                       <a:r>
                         <a:t>Revenue @ 15%</a:t>
@@ -6366,6 +7422,9 @@
                         <a:defRPr sz="1800"/>
                       </a:pPr>
                       <a:r>
+                        <a:rPr>
+                          <a:sym typeface="Calibri"/>
+                        </a:rPr>
                         <a:t>5,625,000</a:t>
                       </a:r>
                     </a:p>
@@ -6381,6 +7440,9 @@
                         <a:defRPr sz="1800"/>
                       </a:pPr>
                       <a:r>
+                        <a:rPr>
+                          <a:sym typeface="Calibri"/>
+                        </a:rPr>
                         <a:t>48,000,000</a:t>
                       </a:r>
                     </a:p>
@@ -6396,6 +7458,9 @@
                         <a:defRPr sz="1800"/>
                       </a:pPr>
                       <a:r>
+                        <a:rPr>
+                          <a:sym typeface="Calibri"/>
+                        </a:rPr>
                         <a:t>216,000,000</a:t>
                       </a:r>
                     </a:p>
@@ -6413,7 +7478,9 @@
                         <a:defRPr sz="1800"/>
                       </a:pPr>
                       <a:r>
-                        <a:rPr b="1"/>
+                        <a:rPr b="1">
+                          <a:sym typeface="Calibri"/>
+                        </a:rPr>
                         <a:t>Gross profit</a:t>
                       </a:r>
                     </a:p>
@@ -6429,7 +7496,9 @@
                         <a:defRPr sz="1800"/>
                       </a:pPr>
                       <a:r>
-                        <a:rPr b="1"/>
+                        <a:rPr b="1">
+                          <a:sym typeface="Calibri"/>
+                        </a:rPr>
                         <a:t>5,625,000</a:t>
                       </a:r>
                     </a:p>
@@ -6445,7 +7514,9 @@
                         <a:defRPr sz="1800"/>
                       </a:pPr>
                       <a:r>
-                        <a:rPr b="1"/>
+                        <a:rPr b="1">
+                          <a:sym typeface="Calibri"/>
+                        </a:rPr>
                         <a:t>48,000,000</a:t>
                       </a:r>
                     </a:p>
@@ -6461,7 +7532,9 @@
                         <a:defRPr sz="1800"/>
                       </a:pPr>
                       <a:r>
-                        <a:rPr b="1"/>
+                        <a:rPr b="1">
+                          <a:sym typeface="Calibri"/>
+                        </a:rPr>
                         <a:t>216,000,000</a:t>
                       </a:r>
                     </a:p>
@@ -6475,16 +7548,16 @@
       </p:graphicFrame>
       <p:sp>
         <p:nvSpPr>
-          <p:cNvPr id="163" name="Slide Number Placeholder 3"/>
+          <p:cNvPr id="186" name="Slide Number Placeholder 3"/>
           <p:cNvSpPr txBox="1"/>
           <p:nvPr>
-            <p:ph type="sldNum" sz="quarter" idx="2"/>
+            <p:ph type="sldNum" sz="quarter" idx="4294967295"/>
           </p:nvPr>
         </p:nvSpPr>
         <p:spPr>
           <a:xfrm>
-            <a:off x="914400" y="6259740"/>
-            <a:ext cx="188898" cy="269241"/>
+            <a:off x="914399" y="6259740"/>
+            <a:ext cx="188894" cy="269237"/>
           </a:xfrm>
           <a:prstGeom prst="rect">
             <a:avLst/>
@@ -6532,13 +7605,17 @@
       </p:grpSpPr>
       <p:sp>
         <p:nvSpPr>
-          <p:cNvPr id="165" name="Title 6"/>
+          <p:cNvPr id="188" name="Title 6"/>
           <p:cNvSpPr txBox="1"/>
           <p:nvPr>
             <p:ph type="title"/>
           </p:nvPr>
         </p:nvSpPr>
         <p:spPr>
+          <a:xfrm>
+            <a:off x="6126479" y="1310638"/>
+            <a:ext cx="4806000" cy="2689632"/>
+          </a:xfrm>
           <a:prstGeom prst="rect">
             <a:avLst/>
           </a:prstGeom>
@@ -6556,7 +7633,7 @@
       </p:sp>
       <p:pic>
         <p:nvPicPr>
-          <p:cNvPr id="166" name="Picture Placeholder 4" descr="Picture Placeholder 4"/>
+          <p:cNvPr id="189" name="Picture Placeholder 4" descr="Picture Placeholder 4"/>
           <p:cNvPicPr>
             <a:picLocks noChangeAspect="1"/>
           </p:cNvPicPr>
@@ -6574,6 +7651,10 @@
           </a:stretch>
         </p:blipFill>
         <p:spPr>
+          <a:xfrm>
+            <a:off x="0" y="-10163"/>
+            <a:ext cx="6096000" cy="6858004"/>
+          </a:xfrm>
           <a:prstGeom prst="rect">
             <a:avLst/>
           </a:prstGeom>
@@ -6581,7 +7662,7 @@
       </p:pic>
       <p:sp>
         <p:nvSpPr>
-          <p:cNvPr id="167" name="Content Placeholder 7"/>
+          <p:cNvPr id="190" name="Content Placeholder 7"/>
           <p:cNvSpPr txBox="1"/>
           <p:nvPr>
             <p:ph type="body" sz="quarter" idx="1"/>
@@ -6590,7 +7671,7 @@
         <p:spPr>
           <a:xfrm>
             <a:off x="6126162" y="4172989"/>
-            <a:ext cx="4805998" cy="2389737"/>
+            <a:ext cx="4806000" cy="2389739"/>
           </a:xfrm>
           <a:prstGeom prst="rect">
             <a:avLst/>
@@ -6635,7 +7716,7 @@
       </p:grpSpPr>
       <p:sp>
         <p:nvSpPr>
-          <p:cNvPr id="169" name="Title 1"/>
+          <p:cNvPr id="192" name="Title 1"/>
           <p:cNvSpPr txBox="1"/>
           <p:nvPr>
             <p:ph type="title"/>
@@ -6663,13 +7744,17 @@
       </p:sp>
       <p:sp>
         <p:nvSpPr>
-          <p:cNvPr id="170" name="Content Placeholder 2"/>
+          <p:cNvPr id="193" name="Content Placeholder 2"/>
           <p:cNvSpPr txBox="1"/>
           <p:nvPr>
             <p:ph type="body" sz="quarter" idx="1"/>
           </p:nvPr>
         </p:nvSpPr>
         <p:spPr>
+          <a:xfrm>
+            <a:off x="914399" y="2022250"/>
+            <a:ext cx="3310130" cy="3747181"/>
+          </a:xfrm>
           <a:prstGeom prst="rect">
             <a:avLst/>
           </a:prstGeom>
@@ -6705,14 +7790,14 @@
       </p:sp>
       <p:sp>
         <p:nvSpPr>
-          <p:cNvPr id="171" name="Content Placeholder 3"/>
+          <p:cNvPr id="194" name="Content Placeholder 3"/>
           <p:cNvSpPr txBox="1"/>
           <p:nvPr/>
         </p:nvSpPr>
         <p:spPr>
           <a:xfrm>
-            <a:off x="4648030" y="2018120"/>
-            <a:ext cx="6660048" cy="3747181"/>
+            <a:off x="4648029" y="2018120"/>
+            <a:ext cx="6660048" cy="3747182"/>
           </a:xfrm>
           <a:prstGeom prst="rect">
             <a:avLst/>
@@ -6727,7 +7812,7 @@
           </a:extLst>
         </p:spPr>
         <p:txBody>
-          <a:bodyPr lIns="45719" rIns="45719">
+          <a:bodyPr lIns="45718" tIns="45718" rIns="45718" bIns="45718">
             <a:normAutofit fontScale="100000" lnSpcReduction="0"/>
           </a:bodyPr>
           <a:lstStyle/>
@@ -6742,7 +7827,12 @@
               <a:buSzPct val="100000"/>
               <a:buFont typeface="Arial"/>
               <a:buChar char="•"/>
-              <a:defRPr sz="2000"/>
+              <a:defRPr sz="2000">
+                <a:latin typeface="Tenorite"/>
+                <a:ea typeface="Tenorite"/>
+                <a:cs typeface="Tenorite"/>
+                <a:sym typeface="Tenorite"/>
+              </a:defRPr>
             </a:pPr>
             <a:r>
               <a:t>Only product specifically dedicated to this niche market</a:t>
@@ -6759,7 +7849,12 @@
               <a:buSzPct val="100000"/>
               <a:buFont typeface="Arial"/>
               <a:buChar char="•"/>
-              <a:defRPr sz="2000"/>
+              <a:defRPr sz="2000">
+                <a:latin typeface="Tenorite"/>
+                <a:ea typeface="Tenorite"/>
+                <a:cs typeface="Tenorite"/>
+                <a:sym typeface="Tenorite"/>
+              </a:defRPr>
             </a:pPr>
             <a:r>
               <a:t>First beautifully designed product that's both stylish and functional</a:t>
@@ -6776,7 +7871,12 @@
               <a:buSzPct val="100000"/>
               <a:buFont typeface="Arial"/>
               <a:buChar char="•"/>
-              <a:defRPr sz="2000"/>
+              <a:defRPr sz="2000">
+                <a:latin typeface="Tenorite"/>
+                <a:ea typeface="Tenorite"/>
+                <a:cs typeface="Tenorite"/>
+                <a:sym typeface="Tenorite"/>
+              </a:defRPr>
             </a:pPr>
             <a:r>
               <a:t>Conducted testing with college students in the area</a:t>
@@ -6793,7 +7893,12 @@
               <a:buSzPct val="100000"/>
               <a:buFont typeface="Arial"/>
               <a:buChar char="•"/>
-              <a:defRPr sz="2000"/>
+              <a:defRPr sz="2000">
+                <a:latin typeface="Tenorite"/>
+                <a:ea typeface="Tenorite"/>
+                <a:cs typeface="Tenorite"/>
+                <a:sym typeface="Tenorite"/>
+              </a:defRPr>
             </a:pPr>
             <a:r>
               <a:t>Designed with the help and input of experts in the field </a:t>
@@ -6803,16 +7908,16 @@
       </p:sp>
       <p:sp>
         <p:nvSpPr>
-          <p:cNvPr id="172" name="Slide Number Placeholder 4"/>
+          <p:cNvPr id="195" name="Slide Number Placeholder 4"/>
           <p:cNvSpPr txBox="1"/>
           <p:nvPr>
-            <p:ph type="sldNum" sz="quarter" idx="2"/>
+            <p:ph type="sldNum" sz="quarter" idx="4294967295"/>
           </p:nvPr>
         </p:nvSpPr>
         <p:spPr>
           <a:xfrm>
-            <a:off x="914400" y="6259740"/>
-            <a:ext cx="188898" cy="269241"/>
+            <a:off x="914399" y="6259738"/>
+            <a:ext cx="188895" cy="269237"/>
           </a:xfrm>
           <a:prstGeom prst="rect">
             <a:avLst/>
@@ -6860,7 +7965,7 @@
       </p:grpSpPr>
       <p:sp>
         <p:nvSpPr>
-          <p:cNvPr id="174" name="Title 1"/>
+          <p:cNvPr id="197" name="Title 1"/>
           <p:cNvSpPr txBox="1"/>
           <p:nvPr>
             <p:ph type="title"/>
@@ -6888,7 +7993,7 @@
       </p:sp>
       <p:sp>
         <p:nvSpPr>
-          <p:cNvPr id="175" name="Content Placeholder 2"/>
+          <p:cNvPr id="198" name="Content Placeholder 2"/>
           <p:cNvSpPr txBox="1"/>
           <p:nvPr>
             <p:ph type="body" sz="half" idx="1"/>
@@ -6896,8 +8001,8 @@
         </p:nvSpPr>
         <p:spPr>
           <a:xfrm>
-            <a:off x="187724" y="1968587"/>
-            <a:ext cx="3995410" cy="4470626"/>
+            <a:off x="187722" y="1968587"/>
+            <a:ext cx="3995413" cy="4470626"/>
           </a:xfrm>
           <a:prstGeom prst="rect">
             <a:avLst/>
@@ -6983,16 +8088,16 @@
       </p:sp>
       <p:sp>
         <p:nvSpPr>
-          <p:cNvPr id="176" name="Slide Number Placeholder 4"/>
+          <p:cNvPr id="199" name="Slide Number Placeholder 4"/>
           <p:cNvSpPr txBox="1"/>
           <p:nvPr>
-            <p:ph type="sldNum" sz="quarter" idx="2"/>
+            <p:ph type="sldNum" sz="quarter" idx="4294967295"/>
           </p:nvPr>
         </p:nvSpPr>
         <p:spPr>
           <a:xfrm>
-            <a:off x="914400" y="6259740"/>
-            <a:ext cx="188898" cy="269241"/>
+            <a:off x="914399" y="6259740"/>
+            <a:ext cx="188894" cy="269237"/>
           </a:xfrm>
           <a:prstGeom prst="rect">
             <a:avLst/>
@@ -7014,14 +8119,14 @@
       </p:sp>
       <p:sp>
         <p:nvSpPr>
-          <p:cNvPr id="177" name="Content Placeholder 2"/>
+          <p:cNvPr id="200" name="Content Placeholder 2"/>
           <p:cNvSpPr txBox="1"/>
           <p:nvPr/>
         </p:nvSpPr>
         <p:spPr>
           <a:xfrm>
             <a:off x="4334114" y="2022249"/>
-            <a:ext cx="3903969" cy="4470626"/>
+            <a:ext cx="3903970" cy="4470627"/>
           </a:xfrm>
           <a:prstGeom prst="rect">
             <a:avLst/>
@@ -7036,7 +8141,7 @@
           </a:extLst>
         </p:spPr>
         <p:txBody>
-          <a:bodyPr lIns="45719" rIns="45719">
+          <a:bodyPr lIns="45718" tIns="45718" rIns="45718" bIns="45718">
             <a:normAutofit fontScale="100000" lnSpcReduction="0"/>
           </a:bodyPr>
           <a:lstStyle/>
@@ -7048,7 +8153,12 @@
               <a:spcBef>
                 <a:spcPts val="1200"/>
               </a:spcBef>
-              <a:defRPr b="1" sz="1200"/>
+              <a:defRPr b="1" sz="1200">
+                <a:latin typeface="Tenorite"/>
+                <a:ea typeface="Tenorite"/>
+                <a:cs typeface="Tenorite"/>
+                <a:sym typeface="Tenorite"/>
+              </a:defRPr>
             </a:pPr>
             <a:r>
               <a:t>Approximation Part:</a:t>
@@ -7066,7 +8176,12 @@
               <a:buSzPct val="100000"/>
               <a:buFont typeface="Arial"/>
               <a:buChar char="•"/>
-              <a:defRPr sz="1200"/>
+              <a:defRPr sz="1200">
+                <a:latin typeface="Tenorite"/>
+                <a:ea typeface="Tenorite"/>
+                <a:cs typeface="Tenorite"/>
+                <a:sym typeface="Tenorite"/>
+              </a:defRPr>
             </a:pPr>
             <a:r>
               <a:t>pseudocode for the approximation and a discussion of the strategy used (greedy, random, etc.)</a:t>
@@ -7084,7 +8199,12 @@
               <a:buSzPct val="100000"/>
               <a:buFont typeface="Arial"/>
               <a:buChar char="•"/>
-              <a:defRPr sz="1200"/>
+              <a:defRPr sz="1200">
+                <a:latin typeface="Tenorite"/>
+                <a:ea typeface="Tenorite"/>
+                <a:cs typeface="Tenorite"/>
+                <a:sym typeface="Tenorite"/>
+              </a:defRPr>
             </a:pPr>
             <a:r>
               <a:t>analytical run time analysis (the worse case </a:t>
@@ -7118,7 +8238,12 @@
               <a:buSzPct val="100000"/>
               <a:buFont typeface="Arial"/>
               <a:buChar char="•"/>
-              <a:defRPr sz="1200"/>
+              <a:defRPr sz="1200">
+                <a:latin typeface="Tenorite"/>
+                <a:ea typeface="Tenorite"/>
+                <a:cs typeface="Tenorite"/>
+                <a:sym typeface="Tenorite"/>
+              </a:defRPr>
             </a:pPr>
             <a:r>
               <a:t>plots that illustrate the run-time (wall clock) performance of your exact solution versus the approximation solution on your test cases</a:t>
@@ -7136,7 +8261,12 @@
               <a:buSzPct val="100000"/>
               <a:buFont typeface="Arial"/>
               <a:buChar char="•"/>
-              <a:defRPr sz="1200"/>
+              <a:defRPr sz="1200">
+                <a:latin typeface="Tenorite"/>
+                <a:ea typeface="Tenorite"/>
+                <a:cs typeface="Tenorite"/>
+                <a:sym typeface="Tenorite"/>
+              </a:defRPr>
             </a:pPr>
             <a:r>
               <a:t>plots that compare the result/solution of your exact solution versus the approximation on your test cases. This is where you show the </a:t>
@@ -7153,14 +8283,14 @@
       </p:sp>
       <p:sp>
         <p:nvSpPr>
-          <p:cNvPr id="178" name="Content Placeholder 2"/>
+          <p:cNvPr id="201" name="Content Placeholder 2"/>
           <p:cNvSpPr txBox="1"/>
           <p:nvPr/>
         </p:nvSpPr>
         <p:spPr>
           <a:xfrm>
             <a:off x="8242310" y="2022249"/>
-            <a:ext cx="3903969" cy="4470626"/>
+            <a:ext cx="3903970" cy="4470627"/>
           </a:xfrm>
           <a:prstGeom prst="rect">
             <a:avLst/>
@@ -7175,7 +8305,7 @@
           </a:extLst>
         </p:spPr>
         <p:txBody>
-          <a:bodyPr lIns="45719" rIns="45719">
+          <a:bodyPr lIns="45718" tIns="45718" rIns="45718" bIns="45718">
             <a:normAutofit fontScale="100000" lnSpcReduction="0"/>
           </a:bodyPr>
           <a:lstStyle/>
@@ -7187,7 +8317,12 @@
               <a:spcBef>
                 <a:spcPts val="1200"/>
               </a:spcBef>
-              <a:defRPr b="1" sz="1200"/>
+              <a:defRPr b="1" sz="1200">
+                <a:latin typeface="Tenorite"/>
+                <a:ea typeface="Tenorite"/>
+                <a:cs typeface="Tenorite"/>
+                <a:sym typeface="Tenorite"/>
+              </a:defRPr>
             </a:pPr>
             <a:r>
               <a:t>Part E:</a:t>
@@ -7205,7 +8340,12 @@
               <a:buSzPct val="100000"/>
               <a:buFont typeface="Arial"/>
               <a:buChar char="•"/>
-              <a:defRPr sz="1200"/>
+              <a:defRPr sz="1200">
+                <a:latin typeface="Tenorite"/>
+                <a:ea typeface="Tenorite"/>
+                <a:cs typeface="Tenorite"/>
+                <a:sym typeface="Tenorite"/>
+              </a:defRPr>
             </a:pPr>
             <a:r>
               <a:t>Talk about how you broke things</a:t>
@@ -7223,7 +8363,12 @@
               <a:buSzPct val="100000"/>
               <a:buFont typeface="Arial"/>
               <a:buChar char="•"/>
-              <a:defRPr sz="1200"/>
+              <a:defRPr sz="1200">
+                <a:latin typeface="Tenorite"/>
+                <a:ea typeface="Tenorite"/>
+                <a:cs typeface="Tenorite"/>
+                <a:sym typeface="Tenorite"/>
+              </a:defRPr>
             </a:pPr>
             <a:r>
               <a:t>Talk about how you fixed things</a:t>
@@ -7241,7 +8386,12 @@
               <a:buSzPct val="100000"/>
               <a:buFont typeface="Arial"/>
               <a:buChar char="•"/>
-              <a:defRPr sz="1200"/>
+              <a:defRPr sz="1200">
+                <a:latin typeface="Tenorite"/>
+                <a:ea typeface="Tenorite"/>
+                <a:cs typeface="Tenorite"/>
+                <a:sym typeface="Tenorite"/>
+              </a:defRPr>
             </a:pPr>
             <a:r>
               <a:t>What is your approximation weak on</a:t>
@@ -7259,7 +8409,12 @@
               <a:buSzPct val="100000"/>
               <a:buFont typeface="Arial"/>
               <a:buChar char="•"/>
-              <a:defRPr sz="1200"/>
+              <a:defRPr sz="1200">
+                <a:latin typeface="Tenorite"/>
+                <a:ea typeface="Tenorite"/>
+                <a:cs typeface="Tenorite"/>
+                <a:sym typeface="Tenorite"/>
+              </a:defRPr>
             </a:pPr>
             <a:r>
               <a:t>How does adding more time improve things?</a:t>
@@ -7277,7 +8432,12 @@
               <a:buSzPct val="100000"/>
               <a:buFont typeface="Arial"/>
               <a:buChar char="•"/>
-              <a:defRPr sz="1200"/>
+              <a:defRPr sz="1200">
+                <a:latin typeface="Tenorite"/>
+                <a:ea typeface="Tenorite"/>
+                <a:cs typeface="Tenorite"/>
+                <a:sym typeface="Tenorite"/>
+              </a:defRPr>
             </a:pPr>
             <a:r>
               <a:t>Conclude everything</a:t>
@@ -7313,13 +8473,17 @@
       </p:grpSpPr>
       <p:sp>
         <p:nvSpPr>
-          <p:cNvPr id="180" name="Title 1"/>
+          <p:cNvPr id="203" name="Title 1"/>
           <p:cNvSpPr txBox="1"/>
           <p:nvPr>
             <p:ph type="title"/>
           </p:nvPr>
         </p:nvSpPr>
         <p:spPr>
+          <a:xfrm>
+            <a:off x="914400" y="2580637"/>
+            <a:ext cx="5181600" cy="3368825"/>
+          </a:xfrm>
           <a:prstGeom prst="rect">
             <a:avLst/>
           </a:prstGeom>
@@ -7337,7 +8501,7 @@
       </p:sp>
       <p:pic>
         <p:nvPicPr>
-          <p:cNvPr id="181" name="Picture Placeholder 13" descr="Picture Placeholder 13"/>
+          <p:cNvPr id="204" name="Picture Placeholder 13" descr="Picture Placeholder 13"/>
           <p:cNvPicPr>
             <a:picLocks noChangeAspect="1"/>
           </p:cNvPicPr>
@@ -7349,7 +8513,7 @@
           <a:blip r:embed="rId2">
             <a:extLst/>
           </a:blip>
-          <a:srcRect l="0" t="119" r="0" b="118"/>
+          <a:srcRect l="0" t="119" r="0" b="116"/>
           <a:stretch>
             <a:fillRect/>
           </a:stretch>
@@ -7357,7 +8521,7 @@
         <p:spPr>
           <a:xfrm>
             <a:off x="6085840" y="-10159"/>
-            <a:ext cx="6116321" cy="6868160"/>
+            <a:ext cx="6116323" cy="6868160"/>
           </a:xfrm>
           <a:prstGeom prst="rect">
             <a:avLst/>
@@ -7392,7 +8556,7 @@
       </p:grpSpPr>
       <p:sp>
         <p:nvSpPr>
-          <p:cNvPr id="183" name="Title 2"/>
+          <p:cNvPr id="206" name="Title 2"/>
           <p:cNvSpPr txBox="1"/>
           <p:nvPr>
             <p:ph type="title"/>
@@ -7420,13 +8584,17 @@
       </p:sp>
       <p:sp>
         <p:nvSpPr>
-          <p:cNvPr id="184" name="Content Placeholder 3"/>
+          <p:cNvPr id="207" name="Content Placeholder 3"/>
           <p:cNvSpPr txBox="1"/>
           <p:nvPr>
             <p:ph type="body" sz="quarter" idx="1"/>
           </p:nvPr>
         </p:nvSpPr>
         <p:spPr>
+          <a:xfrm>
+            <a:off x="914400" y="2844799"/>
+            <a:ext cx="5181600" cy="3128967"/>
+          </a:xfrm>
           <a:prstGeom prst="rect">
             <a:avLst/>
           </a:prstGeom>
@@ -7444,16 +8612,16 @@
       </p:sp>
       <p:sp>
         <p:nvSpPr>
-          <p:cNvPr id="185" name="Slide Number Placeholder 1"/>
+          <p:cNvPr id="208" name="Slide Number Placeholder 1"/>
           <p:cNvSpPr txBox="1"/>
           <p:nvPr>
-            <p:ph type="sldNum" sz="quarter" idx="2"/>
+            <p:ph type="sldNum" sz="quarter" idx="4294967295"/>
           </p:nvPr>
         </p:nvSpPr>
         <p:spPr>
           <a:xfrm>
-            <a:off x="914400" y="6259740"/>
-            <a:ext cx="188898" cy="269241"/>
+            <a:off x="914399" y="6259740"/>
+            <a:ext cx="188894" cy="269237"/>
           </a:xfrm>
           <a:prstGeom prst="rect">
             <a:avLst/>
@@ -7525,14 +8693,14 @@
     </a:clrScheme>
     <a:fontScheme name="Custom">
       <a:majorFont>
+        <a:latin typeface="Calibri"/>
+        <a:ea typeface="Calibri"/>
+        <a:cs typeface="Calibri"/>
+      </a:majorFont>
+      <a:minorFont>
         <a:latin typeface="Helvetica"/>
         <a:ea typeface="Helvetica"/>
         <a:cs typeface="Helvetica"/>
-      </a:majorFont>
-      <a:minorFont>
-        <a:latin typeface="Calibri"/>
-        <a:ea typeface="Calibri"/>
-        <a:cs typeface="Calibri"/>
       </a:minorFont>
     </a:fontScheme>
     <a:fmtScheme name="Custom">
@@ -7675,17 +8843,17 @@
         <a:solidFill>
           <a:srgbClr val="FFFFFF"/>
         </a:solidFill>
-        <a:ln w="12700" cap="flat">
+        <a:ln w="25400" cap="flat">
           <a:solidFill>
             <a:schemeClr val="accent1"/>
           </a:solidFill>
           <a:prstDash val="solid"/>
-          <a:miter lim="800000"/>
+          <a:round/>
         </a:ln>
         <a:effectLst/>
         <a:sp3d/>
       </a:spPr>
-      <a:bodyPr rot="0" spcFirstLastPara="1" vertOverflow="overflow" horzOverflow="overflow" vert="horz" wrap="square" lIns="45719" tIns="45719" rIns="45719" bIns="45719" numCol="1" spcCol="38100" rtlCol="0" anchor="ctr" upright="0">
+      <a:bodyPr rot="0" spcFirstLastPara="1" vertOverflow="overflow" horzOverflow="overflow" vert="horz" wrap="square" lIns="45718" tIns="45718" rIns="45718" bIns="45718" numCol="1" spcCol="38100" rtlCol="0" anchor="ctr" upright="0">
         <a:spAutoFit/>
       </a:bodyPr>
       <a:lstStyle>
@@ -7713,10 +8881,10 @@
             </a:solidFill>
             <a:effectLst/>
             <a:uFillTx/>
-            <a:latin typeface="Tenorite"/>
-            <a:ea typeface="Tenorite"/>
-            <a:cs typeface="Tenorite"/>
-            <a:sym typeface="Tenorite"/>
+            <a:latin typeface="+mj-lt"/>
+            <a:ea typeface="+mj-ea"/>
+            <a:cs typeface="+mj-cs"/>
+            <a:sym typeface="Calibri"/>
           </a:defRPr>
         </a:defPPr>
         <a:lvl1pPr marL="0" marR="0" indent="0" algn="l" defTabSz="914400" rtl="0" fontAlgn="auto" latinLnBrk="1" hangingPunct="0">
@@ -7964,12 +9132,12 @@
     <a:lnDef>
       <a:spPr>
         <a:noFill/>
-        <a:ln w="12700" cap="flat">
+        <a:ln w="25400" cap="flat">
           <a:solidFill>
             <a:schemeClr val="accent1"/>
           </a:solidFill>
           <a:prstDash val="solid"/>
-          <a:miter lim="800000"/>
+          <a:round/>
         </a:ln>
         <a:effectLst/>
         <a:sp3d/>
@@ -8256,7 +9424,7 @@
         <a:effectLst/>
         <a:sp3d/>
       </a:spPr>
-      <a:bodyPr rot="0" spcFirstLastPara="1" vertOverflow="overflow" horzOverflow="overflow" vert="horz" wrap="square" lIns="45719" tIns="45719" rIns="45719" bIns="45719" numCol="1" spcCol="38100" rtlCol="0" anchor="t" upright="0">
+      <a:bodyPr rot="0" spcFirstLastPara="1" vertOverflow="overflow" horzOverflow="overflow" vert="horz" wrap="square" lIns="45718" tIns="45718" rIns="45718" bIns="45718" numCol="1" spcCol="38100" rtlCol="0" anchor="t" upright="0">
         <a:spAutoFit/>
       </a:bodyPr>
       <a:lstStyle>
@@ -8284,10 +9452,10 @@
             </a:solidFill>
             <a:effectLst/>
             <a:uFillTx/>
-            <a:latin typeface="Tenorite"/>
-            <a:ea typeface="Tenorite"/>
-            <a:cs typeface="Tenorite"/>
-            <a:sym typeface="Tenorite"/>
+            <a:latin typeface="+mj-lt"/>
+            <a:ea typeface="+mj-ea"/>
+            <a:cs typeface="+mj-cs"/>
+            <a:sym typeface="Calibri"/>
           </a:defRPr>
         </a:defPPr>
         <a:lvl1pPr marL="0" marR="0" indent="0" algn="l" defTabSz="914400" rtl="0" fontAlgn="auto" latinLnBrk="1" hangingPunct="0">
@@ -8579,14 +9747,14 @@
     </a:clrScheme>
     <a:fontScheme name="Custom">
       <a:majorFont>
+        <a:latin typeface="Calibri"/>
+        <a:ea typeface="Calibri"/>
+        <a:cs typeface="Calibri"/>
+      </a:majorFont>
+      <a:minorFont>
         <a:latin typeface="Helvetica"/>
         <a:ea typeface="Helvetica"/>
         <a:cs typeface="Helvetica"/>
-      </a:majorFont>
-      <a:minorFont>
-        <a:latin typeface="Calibri"/>
-        <a:ea typeface="Calibri"/>
-        <a:cs typeface="Calibri"/>
       </a:minorFont>
     </a:fontScheme>
     <a:fmtScheme name="Custom">
@@ -8729,17 +9897,17 @@
         <a:solidFill>
           <a:srgbClr val="FFFFFF"/>
         </a:solidFill>
-        <a:ln w="12700" cap="flat">
+        <a:ln w="25400" cap="flat">
           <a:solidFill>
             <a:schemeClr val="accent1"/>
           </a:solidFill>
           <a:prstDash val="solid"/>
-          <a:miter lim="800000"/>
+          <a:round/>
         </a:ln>
         <a:effectLst/>
         <a:sp3d/>
       </a:spPr>
-      <a:bodyPr rot="0" spcFirstLastPara="1" vertOverflow="overflow" horzOverflow="overflow" vert="horz" wrap="square" lIns="45719" tIns="45719" rIns="45719" bIns="45719" numCol="1" spcCol="38100" rtlCol="0" anchor="ctr" upright="0">
+      <a:bodyPr rot="0" spcFirstLastPara="1" vertOverflow="overflow" horzOverflow="overflow" vert="horz" wrap="square" lIns="45718" tIns="45718" rIns="45718" bIns="45718" numCol="1" spcCol="38100" rtlCol="0" anchor="ctr" upright="0">
         <a:spAutoFit/>
       </a:bodyPr>
       <a:lstStyle>
@@ -8767,10 +9935,10 @@
             </a:solidFill>
             <a:effectLst/>
             <a:uFillTx/>
-            <a:latin typeface="Tenorite"/>
-            <a:ea typeface="Tenorite"/>
-            <a:cs typeface="Tenorite"/>
-            <a:sym typeface="Tenorite"/>
+            <a:latin typeface="+mj-lt"/>
+            <a:ea typeface="+mj-ea"/>
+            <a:cs typeface="+mj-cs"/>
+            <a:sym typeface="Calibri"/>
           </a:defRPr>
         </a:defPPr>
         <a:lvl1pPr marL="0" marR="0" indent="0" algn="l" defTabSz="914400" rtl="0" fontAlgn="auto" latinLnBrk="1" hangingPunct="0">
@@ -9018,12 +10186,12 @@
     <a:lnDef>
       <a:spPr>
         <a:noFill/>
-        <a:ln w="12700" cap="flat">
+        <a:ln w="25400" cap="flat">
           <a:solidFill>
             <a:schemeClr val="accent1"/>
           </a:solidFill>
           <a:prstDash val="solid"/>
-          <a:miter lim="800000"/>
+          <a:round/>
         </a:ln>
         <a:effectLst/>
         <a:sp3d/>
@@ -9310,7 +10478,7 @@
         <a:effectLst/>
         <a:sp3d/>
       </a:spPr>
-      <a:bodyPr rot="0" spcFirstLastPara="1" vertOverflow="overflow" horzOverflow="overflow" vert="horz" wrap="square" lIns="45719" tIns="45719" rIns="45719" bIns="45719" numCol="1" spcCol="38100" rtlCol="0" anchor="t" upright="0">
+      <a:bodyPr rot="0" spcFirstLastPara="1" vertOverflow="overflow" horzOverflow="overflow" vert="horz" wrap="square" lIns="45718" tIns="45718" rIns="45718" bIns="45718" numCol="1" spcCol="38100" rtlCol="0" anchor="t" upright="0">
         <a:spAutoFit/>
       </a:bodyPr>
       <a:lstStyle>
@@ -9338,10 +10506,10 @@
             </a:solidFill>
             <a:effectLst/>
             <a:uFillTx/>
-            <a:latin typeface="Tenorite"/>
-            <a:ea typeface="Tenorite"/>
-            <a:cs typeface="Tenorite"/>
-            <a:sym typeface="Tenorite"/>
+            <a:latin typeface="+mj-lt"/>
+            <a:ea typeface="+mj-ea"/>
+            <a:cs typeface="+mj-cs"/>
+            <a:sym typeface="Calibri"/>
           </a:defRPr>
         </a:defPPr>
         <a:lvl1pPr marL="0" marR="0" indent="0" algn="l" defTabSz="914400" rtl="0" fontAlgn="auto" latinLnBrk="1" hangingPunct="0">

</xml_diff>